<commit_message>
Actualizado el ppt de estructura de ficheros
</commit_message>
<xml_diff>
--- a/Estructura de ficheros.pptx
+++ b/Estructura de ficheros.pptx
@@ -6,6 +6,7 @@
   </p:sldMasterIdLst>
   <p:sldIdLst>
     <p:sldId id="256" r:id="rId2"/>
+    <p:sldId id="257" r:id="rId3"/>
   </p:sldIdLst>
   <p:sldSz cx="12192000" cy="6858000"/>
   <p:notesSz cx="6858000" cy="9144000"/>
@@ -104,6 +105,11 @@
       </a:defRPr>
     </a:lvl9pPr>
   </p:defaultTextStyle>
+  <p:extLst>
+    <p:ext uri="{EFAFB233-063F-42B5-8137-9DF3F51BA10A}">
+      <p15:sldGuideLst xmlns:p15="http://schemas.microsoft.com/office/powerpoint/2012/main"/>
+    </p:ext>
+  </p:extLst>
 </p:presentation>
 </file>
 
@@ -1308,8 +1314,13 @@
         <a:p>
           <a:r>
             <a:rPr lang="es-ES" dirty="0"/>
-            <a:t>Repositorios: Administrador y Abonos.</a:t>
+            <a:t>Repositorios: Administrador y </a:t>
           </a:r>
+          <a:r>
+            <a:rPr lang="es-ES" dirty="0" smtClean="0"/>
+            <a:t>Abonos.</a:t>
+          </a:r>
+          <a:endParaRPr lang="es-ES" dirty="0"/>
         </a:p>
       </dgm:t>
     </dgm:pt>
@@ -1344,8 +1355,13 @@
         <a:p>
           <a:r>
             <a:rPr lang="es-ES" dirty="0"/>
-            <a:t>Controladores: CRUD Clientes y Abonos.</a:t>
+            <a:t>Controladores: </a:t>
           </a:r>
+          <a:r>
+            <a:rPr lang="es-ES" dirty="0" smtClean="0"/>
+            <a:t>- </a:t>
+          </a:r>
+          <a:endParaRPr lang="es-ES" dirty="0"/>
         </a:p>
       </dgm:t>
     </dgm:pt>
@@ -1560,6 +1576,13 @@
         </dgm:presLayoutVars>
       </dgm:prSet>
       <dgm:spPr/>
+      <dgm:t>
+        <a:bodyPr/>
+        <a:lstStyle/>
+        <a:p>
+          <a:endParaRPr lang="es-ES"/>
+        </a:p>
+      </dgm:t>
     </dgm:pt>
     <dgm:pt modelId="{BFB4EAF4-F10B-4D60-801C-4408944E851F}" type="pres">
       <dgm:prSet presAssocID="{73120122-2709-4182-AD76-02CC96BCC8B7}" presName="parentLin" presStyleCnt="0"/>
@@ -1568,6 +1591,13 @@
     <dgm:pt modelId="{EC087E7B-F812-4F0C-BED4-586E26DAA13E}" type="pres">
       <dgm:prSet presAssocID="{73120122-2709-4182-AD76-02CC96BCC8B7}" presName="parentLeftMargin" presStyleLbl="node1" presStyleIdx="0" presStyleCnt="3"/>
       <dgm:spPr/>
+      <dgm:t>
+        <a:bodyPr/>
+        <a:lstStyle/>
+        <a:p>
+          <a:endParaRPr lang="es-ES"/>
+        </a:p>
+      </dgm:t>
     </dgm:pt>
     <dgm:pt modelId="{60DBA612-3706-4FD0-90E9-76F4BF841CBD}" type="pres">
       <dgm:prSet presAssocID="{73120122-2709-4182-AD76-02CC96BCC8B7}" presName="parentText" presStyleLbl="node1" presStyleIdx="0" presStyleCnt="3">
@@ -1577,6 +1607,13 @@
         </dgm:presLayoutVars>
       </dgm:prSet>
       <dgm:spPr/>
+      <dgm:t>
+        <a:bodyPr/>
+        <a:lstStyle/>
+        <a:p>
+          <a:endParaRPr lang="es-ES"/>
+        </a:p>
+      </dgm:t>
     </dgm:pt>
     <dgm:pt modelId="{7C7A22B4-5089-4B86-A158-CF03DBAD5DBF}" type="pres">
       <dgm:prSet presAssocID="{73120122-2709-4182-AD76-02CC96BCC8B7}" presName="negativeSpace" presStyleCnt="0"/>
@@ -1589,6 +1626,13 @@
         </dgm:presLayoutVars>
       </dgm:prSet>
       <dgm:spPr/>
+      <dgm:t>
+        <a:bodyPr/>
+        <a:lstStyle/>
+        <a:p>
+          <a:endParaRPr lang="es-ES"/>
+        </a:p>
+      </dgm:t>
     </dgm:pt>
     <dgm:pt modelId="{02062120-9D84-49FA-A5A2-CEC20153A14E}" type="pres">
       <dgm:prSet presAssocID="{AC32F9B7-2F73-4AFF-8CE5-6680D9EE2F8C}" presName="spaceBetweenRectangles" presStyleCnt="0"/>
@@ -1601,6 +1645,13 @@
     <dgm:pt modelId="{374EE56E-914E-4B35-BE9B-E25CE110FBF7}" type="pres">
       <dgm:prSet presAssocID="{C9E2A478-C852-4720-B19A-FE0F39D4BF93}" presName="parentLeftMargin" presStyleLbl="node1" presStyleIdx="0" presStyleCnt="3"/>
       <dgm:spPr/>
+      <dgm:t>
+        <a:bodyPr/>
+        <a:lstStyle/>
+        <a:p>
+          <a:endParaRPr lang="es-ES"/>
+        </a:p>
+      </dgm:t>
     </dgm:pt>
     <dgm:pt modelId="{DF4D1FA9-EECA-47B6-8A69-0DF882AC6FE7}" type="pres">
       <dgm:prSet presAssocID="{C9E2A478-C852-4720-B19A-FE0F39D4BF93}" presName="parentText" presStyleLbl="node1" presStyleIdx="1" presStyleCnt="3">
@@ -1610,6 +1661,13 @@
         </dgm:presLayoutVars>
       </dgm:prSet>
       <dgm:spPr/>
+      <dgm:t>
+        <a:bodyPr/>
+        <a:lstStyle/>
+        <a:p>
+          <a:endParaRPr lang="es-ES"/>
+        </a:p>
+      </dgm:t>
     </dgm:pt>
     <dgm:pt modelId="{D5E426A2-0FD3-4C93-8A03-75A152F30E08}" type="pres">
       <dgm:prSet presAssocID="{C9E2A478-C852-4720-B19A-FE0F39D4BF93}" presName="negativeSpace" presStyleCnt="0"/>
@@ -1622,6 +1680,13 @@
         </dgm:presLayoutVars>
       </dgm:prSet>
       <dgm:spPr/>
+      <dgm:t>
+        <a:bodyPr/>
+        <a:lstStyle/>
+        <a:p>
+          <a:endParaRPr lang="es-ES"/>
+        </a:p>
+      </dgm:t>
     </dgm:pt>
     <dgm:pt modelId="{57BF1A71-68C9-4495-9E61-B76488AE75C9}" type="pres">
       <dgm:prSet presAssocID="{2890695C-4AEC-4AA9-8F27-BB95647E5D5C}" presName="spaceBetweenRectangles" presStyleCnt="0"/>
@@ -1634,6 +1699,13 @@
     <dgm:pt modelId="{B124EB29-8B37-49D1-9DD8-474708A19D4E}" type="pres">
       <dgm:prSet presAssocID="{56B63760-9AED-41CB-AF5F-16709E095FA1}" presName="parentLeftMargin" presStyleLbl="node1" presStyleIdx="1" presStyleCnt="3"/>
       <dgm:spPr/>
+      <dgm:t>
+        <a:bodyPr/>
+        <a:lstStyle/>
+        <a:p>
+          <a:endParaRPr lang="es-ES"/>
+        </a:p>
+      </dgm:t>
     </dgm:pt>
     <dgm:pt modelId="{CE53C9A7-556A-4734-8C46-F0613282E106}" type="pres">
       <dgm:prSet presAssocID="{56B63760-9AED-41CB-AF5F-16709E095FA1}" presName="parentText" presStyleLbl="node1" presStyleIdx="2" presStyleCnt="3">
@@ -1643,6 +1715,13 @@
         </dgm:presLayoutVars>
       </dgm:prSet>
       <dgm:spPr/>
+      <dgm:t>
+        <a:bodyPr/>
+        <a:lstStyle/>
+        <a:p>
+          <a:endParaRPr lang="es-ES"/>
+        </a:p>
+      </dgm:t>
     </dgm:pt>
     <dgm:pt modelId="{AF9117AD-82A4-451C-899A-F89A0AE2D2EC}" type="pres">
       <dgm:prSet presAssocID="{56B63760-9AED-41CB-AF5F-16709E095FA1}" presName="negativeSpace" presStyleCnt="0"/>
@@ -1655,49 +1734,56 @@
         </dgm:presLayoutVars>
       </dgm:prSet>
       <dgm:spPr/>
+      <dgm:t>
+        <a:bodyPr/>
+        <a:lstStyle/>
+        <a:p>
+          <a:endParaRPr lang="es-ES"/>
+        </a:p>
+      </dgm:t>
     </dgm:pt>
   </dgm:ptLst>
   <dgm:cxnLst>
+    <dgm:cxn modelId="{FABA8753-1370-4BA1-881F-BC3110F31EA9}" srcId="{C9E2A478-C852-4720-B19A-FE0F39D4BF93}" destId="{58205C9B-0C64-4D62-AE92-5EC34C3CEB17}" srcOrd="4" destOrd="0" parTransId="{5A030048-E0F9-41AF-A83E-FDAC705CC9EB}" sibTransId="{2ED34CAA-E9F0-42BA-B6E6-6A054BC7DD15}"/>
+    <dgm:cxn modelId="{4FA9190F-34A9-4516-AC27-02788F22984A}" srcId="{C9E2A478-C852-4720-B19A-FE0F39D4BF93}" destId="{6A3C41A9-B46E-46AF-951D-41F55735CBE5}" srcOrd="1" destOrd="0" parTransId="{10675569-CB06-41DC-84A9-A85280C68296}" sibTransId="{2B4A1E5E-80C6-48FE-82A0-1E1434028DC5}"/>
     <dgm:cxn modelId="{CE597A08-A76A-486D-9E62-E4931BBC8121}" type="presOf" srcId="{9952B64D-35B4-4A90-BA05-A54D96AD7E27}" destId="{84BB7DC1-D3BF-4C80-A517-DEC7A1AF01B4}" srcOrd="0" destOrd="1" presId="urn:microsoft.com/office/officeart/2005/8/layout/list1"/>
+    <dgm:cxn modelId="{6E0450FE-65CD-4A7C-A12A-E132E55941E5}" srcId="{73120122-2709-4182-AD76-02CC96BCC8B7}" destId="{00338487-4D0E-414E-A8EF-AA19ACA05632}" srcOrd="3" destOrd="0" parTransId="{62263282-4D3A-4A43-A238-48D96D3D0F74}" sibTransId="{1BD2C9FD-A85C-4BE5-8112-486F8A0C81A7}"/>
+    <dgm:cxn modelId="{47AA7856-AB61-4146-A188-90B5131586E9}" srcId="{C9E2A478-C852-4720-B19A-FE0F39D4BF93}" destId="{BEBB5D8A-7B68-4D8A-8774-598CEFB0C4CC}" srcOrd="2" destOrd="0" parTransId="{BE45CA9C-435A-445F-A7E2-D09231820111}" sibTransId="{A88B506C-5C58-4135-B721-3683833CCC94}"/>
+    <dgm:cxn modelId="{08871435-646A-4877-8F60-6121A1F3FF15}" type="presOf" srcId="{58205C9B-0C64-4D62-AE92-5EC34C3CEB17}" destId="{44B76188-4E64-4727-B3F4-058BF77789BE}" srcOrd="0" destOrd="4" presId="urn:microsoft.com/office/officeart/2005/8/layout/list1"/>
+    <dgm:cxn modelId="{396050D9-7F0E-487D-9271-10266EABA623}" srcId="{56B63760-9AED-41CB-AF5F-16709E095FA1}" destId="{83288119-4301-43FF-A79E-DB5E09960B98}" srcOrd="0" destOrd="0" parTransId="{A74DF829-0524-4345-A0E3-4A03A240151B}" sibTransId="{8E376A16-7F12-4FC9-9F5C-1E5057B2F49F}"/>
+    <dgm:cxn modelId="{BF711958-E68E-4046-9A9D-A2F31459E182}" srcId="{2CE23626-8BE5-4BA6-9D01-EA8E82C6B013}" destId="{73120122-2709-4182-AD76-02CC96BCC8B7}" srcOrd="0" destOrd="0" parTransId="{F811D707-A518-4E15-BB40-FEA0F5A06D0B}" sibTransId="{AC32F9B7-2F73-4AFF-8CE5-6680D9EE2F8C}"/>
+    <dgm:cxn modelId="{47FE7720-117F-461C-9FAE-D78C402A5D1E}" type="presOf" srcId="{2CD2283B-BD0D-43A8-B0E7-896549D82BFF}" destId="{44B76188-4E64-4727-B3F4-058BF77789BE}" srcOrd="0" destOrd="3" presId="urn:microsoft.com/office/officeart/2005/8/layout/list1"/>
+    <dgm:cxn modelId="{E2847747-F738-420E-9FEB-5B3AD534428E}" type="presOf" srcId="{40C12849-3284-4795-9D8B-45E5EE745579}" destId="{B4B8B659-5257-419F-A1AF-48E591352005}" srcOrd="0" destOrd="2" presId="urn:microsoft.com/office/officeart/2005/8/layout/list1"/>
+    <dgm:cxn modelId="{9AC9A096-2A80-41DF-925F-5B529A9601A8}" type="presOf" srcId="{977813E2-34D5-4BD6-9755-458928DDE15D}" destId="{84BB7DC1-D3BF-4C80-A517-DEC7A1AF01B4}" srcOrd="0" destOrd="0" presId="urn:microsoft.com/office/officeart/2005/8/layout/list1"/>
+    <dgm:cxn modelId="{F0A41573-8FA3-4471-955A-D3D84C2F9BC0}" type="presOf" srcId="{6A3C41A9-B46E-46AF-951D-41F55735CBE5}" destId="{44B76188-4E64-4727-B3F4-058BF77789BE}" srcOrd="0" destOrd="1" presId="urn:microsoft.com/office/officeart/2005/8/layout/list1"/>
+    <dgm:cxn modelId="{E57511D6-6BD3-4FF7-BD8D-4C5DDD7B4505}" srcId="{2CE23626-8BE5-4BA6-9D01-EA8E82C6B013}" destId="{C9E2A478-C852-4720-B19A-FE0F39D4BF93}" srcOrd="1" destOrd="0" parTransId="{0529AFEE-184D-4BD0-A2FA-356A636D082C}" sibTransId="{2890695C-4AEC-4AA9-8F27-BB95647E5D5C}"/>
+    <dgm:cxn modelId="{10FCB39D-8381-495C-872D-3C7F0D24655C}" type="presOf" srcId="{0FA1A818-29E7-4AE7-B9E3-16A714BE7301}" destId="{84BB7DC1-D3BF-4C80-A517-DEC7A1AF01B4}" srcOrd="0" destOrd="4" presId="urn:microsoft.com/office/officeart/2005/8/layout/list1"/>
+    <dgm:cxn modelId="{842CE58D-B180-4597-9224-391AF8EE72E8}" srcId="{C9E2A478-C852-4720-B19A-FE0F39D4BF93}" destId="{EB615255-7E15-4C2A-938D-746E1DA258EE}" srcOrd="0" destOrd="0" parTransId="{32A0C684-B5FA-479B-A7F8-C260F34301C1}" sibTransId="{AF7DD3A2-1F29-4B45-9CAD-268D46B7476A}"/>
+    <dgm:cxn modelId="{1F81E2C3-30BA-4FD3-94F3-4A98FF1E8D2D}" type="presOf" srcId="{56B63760-9AED-41CB-AF5F-16709E095FA1}" destId="{CE53C9A7-556A-4734-8C46-F0613282E106}" srcOrd="1" destOrd="0" presId="urn:microsoft.com/office/officeart/2005/8/layout/list1"/>
+    <dgm:cxn modelId="{863596CC-7DA0-4E16-807B-A6EC6FCF03F5}" type="presOf" srcId="{D2FB84C3-900D-4BCB-8167-6FCC2010A9E8}" destId="{B4B8B659-5257-419F-A1AF-48E591352005}" srcOrd="0" destOrd="1" presId="urn:microsoft.com/office/officeart/2005/8/layout/list1"/>
+    <dgm:cxn modelId="{30466ADB-416D-4E22-9552-681D84B43888}" type="presOf" srcId="{73120122-2709-4182-AD76-02CC96BCC8B7}" destId="{60DBA612-3706-4FD0-90E9-76F4BF841CBD}" srcOrd="1" destOrd="0" presId="urn:microsoft.com/office/officeart/2005/8/layout/list1"/>
+    <dgm:cxn modelId="{C65409C1-3FCB-4E82-A859-E694BD371B34}" type="presOf" srcId="{C9E2A478-C852-4720-B19A-FE0F39D4BF93}" destId="{DF4D1FA9-EECA-47B6-8A69-0DF882AC6FE7}" srcOrd="1" destOrd="0" presId="urn:microsoft.com/office/officeart/2005/8/layout/list1"/>
+    <dgm:cxn modelId="{6D3BD27D-97BB-494C-A980-EEE567480C20}" srcId="{56B63760-9AED-41CB-AF5F-16709E095FA1}" destId="{AE3AD23A-2BBF-4805-BF13-55ECF2259953}" srcOrd="3" destOrd="0" parTransId="{081395F9-A8EE-482A-8CBD-14EAA51D9BB6}" sibTransId="{A30F1B3D-94CF-4AF6-8D22-F77574BCF8DC}"/>
+    <dgm:cxn modelId="{3DBEE6EE-187C-4C09-AD98-D067FF42E3FE}" srcId="{56B63760-9AED-41CB-AF5F-16709E095FA1}" destId="{B588F6BE-15D2-44A8-A032-DF8DC821A52F}" srcOrd="4" destOrd="0" parTransId="{35978181-B1D0-4994-8B17-7DC91A58BEBF}" sibTransId="{F4406C38-6810-467B-9D16-AE5C26297515}"/>
+    <dgm:cxn modelId="{CBB5BB37-3D91-4385-9F5A-63878D896069}" type="presOf" srcId="{CFDBA0D2-4657-46D4-9F65-3821319CD9F0}" destId="{84BB7DC1-D3BF-4C80-A517-DEC7A1AF01B4}" srcOrd="0" destOrd="2" presId="urn:microsoft.com/office/officeart/2005/8/layout/list1"/>
+    <dgm:cxn modelId="{8567D0FC-7E7E-475C-84B2-D45DCAD85339}" type="presOf" srcId="{83288119-4301-43FF-A79E-DB5E09960B98}" destId="{B4B8B659-5257-419F-A1AF-48E591352005}" srcOrd="0" destOrd="0" presId="urn:microsoft.com/office/officeart/2005/8/layout/list1"/>
+    <dgm:cxn modelId="{622090CE-A6A2-4D71-A715-661205C2E7E9}" type="presOf" srcId="{C9E2A478-C852-4720-B19A-FE0F39D4BF93}" destId="{374EE56E-914E-4B35-BE9B-E25CE110FBF7}" srcOrd="0" destOrd="0" presId="urn:microsoft.com/office/officeart/2005/8/layout/list1"/>
+    <dgm:cxn modelId="{C36E5F4C-E0CC-433E-B7C0-CDB94D629BD5}" type="presOf" srcId="{56B63760-9AED-41CB-AF5F-16709E095FA1}" destId="{B124EB29-8B37-49D1-9DD8-474708A19D4E}" srcOrd="0" destOrd="0" presId="urn:microsoft.com/office/officeart/2005/8/layout/list1"/>
     <dgm:cxn modelId="{EFFF8D0A-80E7-4D99-97E0-DC453DB8B810}" srcId="{2CE23626-8BE5-4BA6-9D01-EA8E82C6B013}" destId="{56B63760-9AED-41CB-AF5F-16709E095FA1}" srcOrd="2" destOrd="0" parTransId="{F99950AA-B95E-41C6-A478-ADAF2723D381}" sibTransId="{AA3C5196-9488-4662-ABE8-FB69D0D20286}"/>
-    <dgm:cxn modelId="{4FA9190F-34A9-4516-AC27-02788F22984A}" srcId="{C9E2A478-C852-4720-B19A-FE0F39D4BF93}" destId="{6A3C41A9-B46E-46AF-951D-41F55735CBE5}" srcOrd="1" destOrd="0" parTransId="{10675569-CB06-41DC-84A9-A85280C68296}" sibTransId="{2B4A1E5E-80C6-48FE-82A0-1E1434028DC5}"/>
-    <dgm:cxn modelId="{D4F64711-EAE7-4B56-A41F-41D6BD02D322}" type="presOf" srcId="{00338487-4D0E-414E-A8EF-AA19ACA05632}" destId="{84BB7DC1-D3BF-4C80-A517-DEC7A1AF01B4}" srcOrd="0" destOrd="3" presId="urn:microsoft.com/office/officeart/2005/8/layout/list1"/>
     <dgm:cxn modelId="{CF9DD111-A8D3-43B6-9071-1AC463F2CC02}" srcId="{73120122-2709-4182-AD76-02CC96BCC8B7}" destId="{9952B64D-35B4-4A90-BA05-A54D96AD7E27}" srcOrd="1" destOrd="0" parTransId="{476F3920-D8B2-4324-B611-5501B5F8F96D}" sibTransId="{EA4770B3-2DE0-4830-9B11-A1804E502B57}"/>
-    <dgm:cxn modelId="{3F93B414-05AB-411C-B14C-239B98A1B5D6}" type="presOf" srcId="{BEBB5D8A-7B68-4D8A-8774-598CEFB0C4CC}" destId="{44B76188-4E64-4727-B3F4-058BF77789BE}" srcOrd="0" destOrd="2" presId="urn:microsoft.com/office/officeart/2005/8/layout/list1"/>
-    <dgm:cxn modelId="{47FE7720-117F-461C-9FAE-D78C402A5D1E}" type="presOf" srcId="{2CD2283B-BD0D-43A8-B0E7-896549D82BFF}" destId="{44B76188-4E64-4727-B3F4-058BF77789BE}" srcOrd="0" destOrd="3" presId="urn:microsoft.com/office/officeart/2005/8/layout/list1"/>
-    <dgm:cxn modelId="{6B998D30-1F78-4B15-8652-EF7AEB8E758D}" type="presOf" srcId="{73120122-2709-4182-AD76-02CC96BCC8B7}" destId="{EC087E7B-F812-4F0C-BED4-586E26DAA13E}" srcOrd="0" destOrd="0" presId="urn:microsoft.com/office/officeart/2005/8/layout/list1"/>
-    <dgm:cxn modelId="{08871435-646A-4877-8F60-6121A1F3FF15}" type="presOf" srcId="{58205C9B-0C64-4D62-AE92-5EC34C3CEB17}" destId="{44B76188-4E64-4727-B3F4-058BF77789BE}" srcOrd="0" destOrd="4" presId="urn:microsoft.com/office/officeart/2005/8/layout/list1"/>
-    <dgm:cxn modelId="{EBCC0436-08C5-47E3-882B-78E105DB9823}" type="presOf" srcId="{2CE23626-8BE5-4BA6-9D01-EA8E82C6B013}" destId="{B3DD2D3B-CEA1-48C6-8AED-235085E3721A}" srcOrd="0" destOrd="0" presId="urn:microsoft.com/office/officeart/2005/8/layout/list1"/>
-    <dgm:cxn modelId="{CBB5BB37-3D91-4385-9F5A-63878D896069}" type="presOf" srcId="{CFDBA0D2-4657-46D4-9F65-3821319CD9F0}" destId="{84BB7DC1-D3BF-4C80-A517-DEC7A1AF01B4}" srcOrd="0" destOrd="2" presId="urn:microsoft.com/office/officeart/2005/8/layout/list1"/>
-    <dgm:cxn modelId="{0D7AD35C-1BB4-46B7-961F-D52DD8F76401}" srcId="{56B63760-9AED-41CB-AF5F-16709E095FA1}" destId="{D2FB84C3-900D-4BCB-8167-6FCC2010A9E8}" srcOrd="1" destOrd="0" parTransId="{A1F87C9F-2C62-4DC8-A563-47D5664DFEB6}" sibTransId="{5AD7492D-D0C8-4256-90F4-3BBC9B5F5D1A}"/>
     <dgm:cxn modelId="{4A54FD62-624E-4F59-813A-E850D120B62E}" srcId="{73120122-2709-4182-AD76-02CC96BCC8B7}" destId="{CFDBA0D2-4657-46D4-9F65-3821319CD9F0}" srcOrd="2" destOrd="0" parTransId="{D06F649A-AF9E-4B10-AC32-29BBF33149DA}" sibTransId="{88138875-2E86-4032-A4BB-4C9CB0DF3AF8}"/>
     <dgm:cxn modelId="{475CFE42-1C4C-4D06-8737-EB541F27F87B}" srcId="{73120122-2709-4182-AD76-02CC96BCC8B7}" destId="{0FA1A818-29E7-4AE7-B9E3-16A714BE7301}" srcOrd="4" destOrd="0" parTransId="{C1935D26-112A-4B6A-9F79-52F5060E354E}" sibTransId="{458EF357-0C66-45E6-B593-FDA305690D30}"/>
-    <dgm:cxn modelId="{E2847747-F738-420E-9FEB-5B3AD534428E}" type="presOf" srcId="{40C12849-3284-4795-9D8B-45E5EE745579}" destId="{B4B8B659-5257-419F-A1AF-48E591352005}" srcOrd="0" destOrd="2" presId="urn:microsoft.com/office/officeart/2005/8/layout/list1"/>
-    <dgm:cxn modelId="{C36E5F4C-E0CC-433E-B7C0-CDB94D629BD5}" type="presOf" srcId="{56B63760-9AED-41CB-AF5F-16709E095FA1}" destId="{B124EB29-8B37-49D1-9DD8-474708A19D4E}" srcOrd="0" destOrd="0" presId="urn:microsoft.com/office/officeart/2005/8/layout/list1"/>
-    <dgm:cxn modelId="{F0A41573-8FA3-4471-955A-D3D84C2F9BC0}" type="presOf" srcId="{6A3C41A9-B46E-46AF-951D-41F55735CBE5}" destId="{44B76188-4E64-4727-B3F4-058BF77789BE}" srcOrd="0" destOrd="1" presId="urn:microsoft.com/office/officeart/2005/8/layout/list1"/>
-    <dgm:cxn modelId="{FABA8753-1370-4BA1-881F-BC3110F31EA9}" srcId="{C9E2A478-C852-4720-B19A-FE0F39D4BF93}" destId="{58205C9B-0C64-4D62-AE92-5EC34C3CEB17}" srcOrd="4" destOrd="0" parTransId="{5A030048-E0F9-41AF-A83E-FDAC705CC9EB}" sibTransId="{2ED34CAA-E9F0-42BA-B6E6-6A054BC7DD15}"/>
-    <dgm:cxn modelId="{47AA7856-AB61-4146-A188-90B5131586E9}" srcId="{C9E2A478-C852-4720-B19A-FE0F39D4BF93}" destId="{BEBB5D8A-7B68-4D8A-8774-598CEFB0C4CC}" srcOrd="2" destOrd="0" parTransId="{BE45CA9C-435A-445F-A7E2-D09231820111}" sibTransId="{A88B506C-5C58-4135-B721-3683833CCC94}"/>
+    <dgm:cxn modelId="{90CB8C78-D632-4072-B51A-2B050EBC7DE7}" type="presOf" srcId="{AE3AD23A-2BBF-4805-BF13-55ECF2259953}" destId="{B4B8B659-5257-419F-A1AF-48E591352005}" srcOrd="0" destOrd="3" presId="urn:microsoft.com/office/officeart/2005/8/layout/list1"/>
+    <dgm:cxn modelId="{AE27B489-014D-45D0-A2F9-9383CB25DBB5}" srcId="{73120122-2709-4182-AD76-02CC96BCC8B7}" destId="{977813E2-34D5-4BD6-9755-458928DDE15D}" srcOrd="0" destOrd="0" parTransId="{08D75870-F450-43D3-83EF-8BD9BFCF2EF9}" sibTransId="{AEFD3197-55EF-4F04-B222-FC74CFFBFE21}"/>
+    <dgm:cxn modelId="{EBCC0436-08C5-47E3-882B-78E105DB9823}" type="presOf" srcId="{2CE23626-8BE5-4BA6-9D01-EA8E82C6B013}" destId="{B3DD2D3B-CEA1-48C6-8AED-235085E3721A}" srcOrd="0" destOrd="0" presId="urn:microsoft.com/office/officeart/2005/8/layout/list1"/>
+    <dgm:cxn modelId="{D4F64711-EAE7-4B56-A41F-41D6BD02D322}" type="presOf" srcId="{00338487-4D0E-414E-A8EF-AA19ACA05632}" destId="{84BB7DC1-D3BF-4C80-A517-DEC7A1AF01B4}" srcOrd="0" destOrd="3" presId="urn:microsoft.com/office/officeart/2005/8/layout/list1"/>
+    <dgm:cxn modelId="{BE196AF0-3EEF-4BD6-B1C9-AB02826778FB}" type="presOf" srcId="{EB615255-7E15-4C2A-938D-746E1DA258EE}" destId="{44B76188-4E64-4727-B3F4-058BF77789BE}" srcOrd="0" destOrd="0" presId="urn:microsoft.com/office/officeart/2005/8/layout/list1"/>
+    <dgm:cxn modelId="{0D7AD35C-1BB4-46B7-961F-D52DD8F76401}" srcId="{56B63760-9AED-41CB-AF5F-16709E095FA1}" destId="{D2FB84C3-900D-4BCB-8167-6FCC2010A9E8}" srcOrd="1" destOrd="0" parTransId="{A1F87C9F-2C62-4DC8-A563-47D5664DFEB6}" sibTransId="{5AD7492D-D0C8-4256-90F4-3BBC9B5F5D1A}"/>
     <dgm:cxn modelId="{952AC476-1AB8-494E-B769-650BAA16DD9D}" srcId="{56B63760-9AED-41CB-AF5F-16709E095FA1}" destId="{40C12849-3284-4795-9D8B-45E5EE745579}" srcOrd="2" destOrd="0" parTransId="{5F6636DD-6095-4499-B7B4-CB3AB6BCF815}" sibTransId="{B1549B31-8FE5-4D22-8476-5AB990275C68}"/>
-    <dgm:cxn modelId="{BF711958-E68E-4046-9A9D-A2F31459E182}" srcId="{2CE23626-8BE5-4BA6-9D01-EA8E82C6B013}" destId="{73120122-2709-4182-AD76-02CC96BCC8B7}" srcOrd="0" destOrd="0" parTransId="{F811D707-A518-4E15-BB40-FEA0F5A06D0B}" sibTransId="{AC32F9B7-2F73-4AFF-8CE5-6680D9EE2F8C}"/>
-    <dgm:cxn modelId="{90CB8C78-D632-4072-B51A-2B050EBC7DE7}" type="presOf" srcId="{AE3AD23A-2BBF-4805-BF13-55ECF2259953}" destId="{B4B8B659-5257-419F-A1AF-48E591352005}" srcOrd="0" destOrd="3" presId="urn:microsoft.com/office/officeart/2005/8/layout/list1"/>
-    <dgm:cxn modelId="{6D3BD27D-97BB-494C-A980-EEE567480C20}" srcId="{56B63760-9AED-41CB-AF5F-16709E095FA1}" destId="{AE3AD23A-2BBF-4805-BF13-55ECF2259953}" srcOrd="3" destOrd="0" parTransId="{081395F9-A8EE-482A-8CBD-14EAA51D9BB6}" sibTransId="{A30F1B3D-94CF-4AF6-8D22-F77574BCF8DC}"/>
-    <dgm:cxn modelId="{AE27B489-014D-45D0-A2F9-9383CB25DBB5}" srcId="{73120122-2709-4182-AD76-02CC96BCC8B7}" destId="{977813E2-34D5-4BD6-9755-458928DDE15D}" srcOrd="0" destOrd="0" parTransId="{08D75870-F450-43D3-83EF-8BD9BFCF2EF9}" sibTransId="{AEFD3197-55EF-4F04-B222-FC74CFFBFE21}"/>
-    <dgm:cxn modelId="{842CE58D-B180-4597-9224-391AF8EE72E8}" srcId="{C9E2A478-C852-4720-B19A-FE0F39D4BF93}" destId="{EB615255-7E15-4C2A-938D-746E1DA258EE}" srcOrd="0" destOrd="0" parTransId="{32A0C684-B5FA-479B-A7F8-C260F34301C1}" sibTransId="{AF7DD3A2-1F29-4B45-9CAD-268D46B7476A}"/>
-    <dgm:cxn modelId="{9AC9A096-2A80-41DF-925F-5B529A9601A8}" type="presOf" srcId="{977813E2-34D5-4BD6-9755-458928DDE15D}" destId="{84BB7DC1-D3BF-4C80-A517-DEC7A1AF01B4}" srcOrd="0" destOrd="0" presId="urn:microsoft.com/office/officeart/2005/8/layout/list1"/>
-    <dgm:cxn modelId="{10FCB39D-8381-495C-872D-3C7F0D24655C}" type="presOf" srcId="{0FA1A818-29E7-4AE7-B9E3-16A714BE7301}" destId="{84BB7DC1-D3BF-4C80-A517-DEC7A1AF01B4}" srcOrd="0" destOrd="4" presId="urn:microsoft.com/office/officeart/2005/8/layout/list1"/>
     <dgm:cxn modelId="{1751A4A5-FF82-479A-814A-CFAD05015E06}" srcId="{C9E2A478-C852-4720-B19A-FE0F39D4BF93}" destId="{2CD2283B-BD0D-43A8-B0E7-896549D82BFF}" srcOrd="3" destOrd="0" parTransId="{92031695-9A86-443D-A230-7152A7F22CFF}" sibTransId="{D2BBEBD7-0B24-4DE7-B0F0-8E0039AAB29F}"/>
     <dgm:cxn modelId="{E7DDB1C0-B090-43F9-B4F8-0B18FFED37D7}" type="presOf" srcId="{B588F6BE-15D2-44A8-A032-DF8DC821A52F}" destId="{B4B8B659-5257-419F-A1AF-48E591352005}" srcOrd="0" destOrd="4" presId="urn:microsoft.com/office/officeart/2005/8/layout/list1"/>
-    <dgm:cxn modelId="{C65409C1-3FCB-4E82-A859-E694BD371B34}" type="presOf" srcId="{C9E2A478-C852-4720-B19A-FE0F39D4BF93}" destId="{DF4D1FA9-EECA-47B6-8A69-0DF882AC6FE7}" srcOrd="1" destOrd="0" presId="urn:microsoft.com/office/officeart/2005/8/layout/list1"/>
-    <dgm:cxn modelId="{1F81E2C3-30BA-4FD3-94F3-4A98FF1E8D2D}" type="presOf" srcId="{56B63760-9AED-41CB-AF5F-16709E095FA1}" destId="{CE53C9A7-556A-4734-8C46-F0613282E106}" srcOrd="1" destOrd="0" presId="urn:microsoft.com/office/officeart/2005/8/layout/list1"/>
-    <dgm:cxn modelId="{863596CC-7DA0-4E16-807B-A6EC6FCF03F5}" type="presOf" srcId="{D2FB84C3-900D-4BCB-8167-6FCC2010A9E8}" destId="{B4B8B659-5257-419F-A1AF-48E591352005}" srcOrd="0" destOrd="1" presId="urn:microsoft.com/office/officeart/2005/8/layout/list1"/>
-    <dgm:cxn modelId="{622090CE-A6A2-4D71-A715-661205C2E7E9}" type="presOf" srcId="{C9E2A478-C852-4720-B19A-FE0F39D4BF93}" destId="{374EE56E-914E-4B35-BE9B-E25CE110FBF7}" srcOrd="0" destOrd="0" presId="urn:microsoft.com/office/officeart/2005/8/layout/list1"/>
-    <dgm:cxn modelId="{E57511D6-6BD3-4FF7-BD8D-4C5DDD7B4505}" srcId="{2CE23626-8BE5-4BA6-9D01-EA8E82C6B013}" destId="{C9E2A478-C852-4720-B19A-FE0F39D4BF93}" srcOrd="1" destOrd="0" parTransId="{0529AFEE-184D-4BD0-A2FA-356A636D082C}" sibTransId="{2890695C-4AEC-4AA9-8F27-BB95647E5D5C}"/>
-    <dgm:cxn modelId="{396050D9-7F0E-487D-9271-10266EABA623}" srcId="{56B63760-9AED-41CB-AF5F-16709E095FA1}" destId="{83288119-4301-43FF-A79E-DB5E09960B98}" srcOrd="0" destOrd="0" parTransId="{A74DF829-0524-4345-A0E3-4A03A240151B}" sibTransId="{8E376A16-7F12-4FC9-9F5C-1E5057B2F49F}"/>
-    <dgm:cxn modelId="{30466ADB-416D-4E22-9552-681D84B43888}" type="presOf" srcId="{73120122-2709-4182-AD76-02CC96BCC8B7}" destId="{60DBA612-3706-4FD0-90E9-76F4BF841CBD}" srcOrd="1" destOrd="0" presId="urn:microsoft.com/office/officeart/2005/8/layout/list1"/>
-    <dgm:cxn modelId="{3DBEE6EE-187C-4C09-AD98-D067FF42E3FE}" srcId="{56B63760-9AED-41CB-AF5F-16709E095FA1}" destId="{B588F6BE-15D2-44A8-A032-DF8DC821A52F}" srcOrd="4" destOrd="0" parTransId="{35978181-B1D0-4994-8B17-7DC91A58BEBF}" sibTransId="{F4406C38-6810-467B-9D16-AE5C26297515}"/>
-    <dgm:cxn modelId="{BE196AF0-3EEF-4BD6-B1C9-AB02826778FB}" type="presOf" srcId="{EB615255-7E15-4C2A-938D-746E1DA258EE}" destId="{44B76188-4E64-4727-B3F4-058BF77789BE}" srcOrd="0" destOrd="0" presId="urn:microsoft.com/office/officeart/2005/8/layout/list1"/>
-    <dgm:cxn modelId="{8567D0FC-7E7E-475C-84B2-D45DCAD85339}" type="presOf" srcId="{83288119-4301-43FF-A79E-DB5E09960B98}" destId="{B4B8B659-5257-419F-A1AF-48E591352005}" srcOrd="0" destOrd="0" presId="urn:microsoft.com/office/officeart/2005/8/layout/list1"/>
-    <dgm:cxn modelId="{6E0450FE-65CD-4A7C-A12A-E132E55941E5}" srcId="{73120122-2709-4182-AD76-02CC96BCC8B7}" destId="{00338487-4D0E-414E-A8EF-AA19ACA05632}" srcOrd="3" destOrd="0" parTransId="{62263282-4D3A-4A43-A238-48D96D3D0F74}" sibTransId="{1BD2C9FD-A85C-4BE5-8112-486F8A0C81A7}"/>
+    <dgm:cxn modelId="{6B998D30-1F78-4B15-8652-EF7AEB8E758D}" type="presOf" srcId="{73120122-2709-4182-AD76-02CC96BCC8B7}" destId="{EC087E7B-F812-4F0C-BED4-586E26DAA13E}" srcOrd="0" destOrd="0" presId="urn:microsoft.com/office/officeart/2005/8/layout/list1"/>
+    <dgm:cxn modelId="{3F93B414-05AB-411C-B14C-239B98A1B5D6}" type="presOf" srcId="{BEBB5D8A-7B68-4D8A-8774-598CEFB0C4CC}" destId="{44B76188-4E64-4727-B3F4-058BF77789BE}" srcOrd="0" destOrd="2" presId="urn:microsoft.com/office/officeart/2005/8/layout/list1"/>
     <dgm:cxn modelId="{386A7A5E-E08E-46D2-8DB0-1B2D28D8F417}" type="presParOf" srcId="{B3DD2D3B-CEA1-48C6-8AED-235085E3721A}" destId="{BFB4EAF4-F10B-4D60-801C-4408944E851F}" srcOrd="0" destOrd="0" presId="urn:microsoft.com/office/officeart/2005/8/layout/list1"/>
     <dgm:cxn modelId="{B80B5244-179C-484E-8CCE-47B2F7D99745}" type="presParOf" srcId="{BFB4EAF4-F10B-4D60-801C-4408944E851F}" destId="{EC087E7B-F812-4F0C-BED4-586E26DAA13E}" srcOrd="0" destOrd="0" presId="urn:microsoft.com/office/officeart/2005/8/layout/list1"/>
     <dgm:cxn modelId="{26864C14-64CD-47D9-9A8C-3E5C463AB4FF}" type="presParOf" srcId="{BFB4EAF4-F10B-4D60-801C-4408944E851F}" destId="{60DBA612-3706-4FD0-90E9-76F4BF841CBD}" srcOrd="1" destOrd="0" presId="urn:microsoft.com/office/officeart/2005/8/layout/list1"/>
@@ -1741,8 +1827,8 @@
       </dsp:nvSpPr>
       <dsp:spPr>
         <a:xfrm>
-          <a:off x="0" y="309268"/>
-          <a:ext cx="7583423" cy="1732500"/>
+          <a:off x="0" y="352366"/>
+          <a:ext cx="7583423" cy="1663200"/>
         </a:xfrm>
         <a:prstGeom prst="rect">
           <a:avLst/>
@@ -1782,12 +1868,12 @@
         <a:fontRef idx="minor"/>
       </dsp:style>
       <dsp:txBody>
-        <a:bodyPr spcFirstLastPara="0" vert="horz" wrap="square" lIns="588558" tIns="229108" rIns="588558" bIns="78232" numCol="1" spcCol="1270" anchor="t" anchorCtr="0">
+        <a:bodyPr spcFirstLastPara="0" vert="horz" wrap="square" lIns="588558" tIns="333248" rIns="588558" bIns="113792" numCol="1" spcCol="1270" anchor="t" anchorCtr="0">
           <a:noAutofit/>
         </a:bodyPr>
         <a:lstStyle/>
         <a:p>
-          <a:pPr marL="57150" lvl="1" indent="-57150" algn="l" defTabSz="488950">
+          <a:pPr marL="171450" lvl="1" indent="-171450" algn="l" defTabSz="711200">
             <a:lnSpc>
               <a:spcPct val="90000"/>
             </a:lnSpc>
@@ -1797,15 +1883,15 @@
             <a:spcAft>
               <a:spcPct val="15000"/>
             </a:spcAft>
-            <a:buChar char="•"/>
+            <a:buChar char="••"/>
           </a:pPr>
           <a:r>
-            <a:rPr lang="es-ES" sz="1100" kern="1200" dirty="0"/>
+            <a:rPr lang="es-ES" sz="1600" kern="1200" dirty="0"/>
             <a:t>Modelo: Plazas.</a:t>
           </a:r>
         </a:p>
         <a:p>
-          <a:pPr marL="57150" lvl="1" indent="-57150" algn="l" defTabSz="488950">
+          <a:pPr marL="171450" lvl="1" indent="-171450" algn="l" defTabSz="711200">
             <a:lnSpc>
               <a:spcPct val="90000"/>
             </a:lnSpc>
@@ -1815,15 +1901,15 @@
             <a:spcAft>
               <a:spcPct val="15000"/>
             </a:spcAft>
-            <a:buChar char="•"/>
+            <a:buChar char="••"/>
           </a:pPr>
           <a:r>
-            <a:rPr lang="es-ES" sz="1100" kern="1200" dirty="0"/>
+            <a:rPr lang="es-ES" sz="1600" kern="1200" dirty="0"/>
             <a:t>Vistas: Generar ticket y mapa del parking (en su caso).</a:t>
           </a:r>
         </a:p>
         <a:p>
-          <a:pPr marL="57150" lvl="1" indent="-57150" algn="l" defTabSz="488950">
+          <a:pPr marL="171450" lvl="1" indent="-171450" algn="l" defTabSz="711200">
             <a:lnSpc>
               <a:spcPct val="90000"/>
             </a:lnSpc>
@@ -1833,15 +1919,15 @@
             <a:spcAft>
               <a:spcPct val="15000"/>
             </a:spcAft>
-            <a:buChar char="•"/>
+            <a:buChar char="••"/>
           </a:pPr>
           <a:r>
-            <a:rPr lang="es-ES" sz="1100" kern="1200" dirty="0"/>
+            <a:rPr lang="es-ES" sz="1600" kern="1200" dirty="0"/>
             <a:t>Servicios: Aparcar y entregar.</a:t>
           </a:r>
         </a:p>
         <a:p>
-          <a:pPr marL="57150" lvl="1" indent="-57150" algn="l" defTabSz="488950">
+          <a:pPr marL="171450" lvl="1" indent="-171450" algn="l" defTabSz="711200">
             <a:lnSpc>
               <a:spcPct val="90000"/>
             </a:lnSpc>
@@ -1851,15 +1937,15 @@
             <a:spcAft>
               <a:spcPct val="15000"/>
             </a:spcAft>
-            <a:buChar char="•"/>
+            <a:buChar char="••"/>
           </a:pPr>
           <a:r>
-            <a:rPr lang="es-ES" sz="1100" kern="1200" dirty="0"/>
+            <a:rPr lang="es-ES" sz="1600" kern="1200" dirty="0"/>
             <a:t>Repositorios: Plazas y Vehículos.</a:t>
           </a:r>
         </a:p>
         <a:p>
-          <a:pPr marL="57150" lvl="1" indent="-57150" algn="l" defTabSz="488950">
+          <a:pPr marL="171450" lvl="1" indent="-171450" algn="l" defTabSz="711200">
             <a:lnSpc>
               <a:spcPct val="90000"/>
             </a:lnSpc>
@@ -1869,17 +1955,17 @@
             <a:spcAft>
               <a:spcPct val="15000"/>
             </a:spcAft>
-            <a:buChar char="•"/>
+            <a:buChar char="••"/>
           </a:pPr>
           <a:r>
-            <a:rPr lang="es-ES" sz="1100" kern="1200" dirty="0"/>
+            <a:rPr lang="es-ES" sz="1600" kern="1200" dirty="0"/>
             <a:t>Controladores: ¿?</a:t>
           </a:r>
         </a:p>
       </dsp:txBody>
       <dsp:txXfrm>
-        <a:off x="0" y="309268"/>
-        <a:ext cx="7583423" cy="1732500"/>
+        <a:off x="0" y="352366"/>
+        <a:ext cx="7583423" cy="1663200"/>
       </dsp:txXfrm>
     </dsp:sp>
     <dsp:sp modelId="{60DBA612-3706-4FD0-90E9-76F4BF841CBD}">
@@ -1889,8 +1975,8 @@
       </dsp:nvSpPr>
       <dsp:spPr>
         <a:xfrm>
-          <a:off x="379171" y="140202"/>
-          <a:ext cx="5308396" cy="324720"/>
+          <a:off x="379171" y="106452"/>
+          <a:ext cx="5308396" cy="472320"/>
         </a:xfrm>
         <a:prstGeom prst="roundRect">
           <a:avLst/>
@@ -1936,7 +2022,7 @@
         </a:bodyPr>
         <a:lstStyle/>
         <a:p>
-          <a:pPr marL="0" lvl="0" indent="0" algn="l" defTabSz="488950">
+          <a:pPr lvl="0" algn="l" defTabSz="711200">
             <a:lnSpc>
               <a:spcPct val="90000"/>
             </a:lnSpc>
@@ -1946,17 +2032,16 @@
             <a:spcAft>
               <a:spcPct val="35000"/>
             </a:spcAft>
-            <a:buNone/>
           </a:pPr>
           <a:r>
-            <a:rPr lang="es-ES" sz="1100" kern="1200" dirty="0"/>
+            <a:rPr lang="es-ES" sz="1600" kern="1200" dirty="0"/>
             <a:t>Parking</a:t>
           </a:r>
         </a:p>
       </dsp:txBody>
       <dsp:txXfrm>
-        <a:off x="395023" y="156054"/>
-        <a:ext cx="5276692" cy="293016"/>
+        <a:off x="402228" y="129509"/>
+        <a:ext cx="5262282" cy="426206"/>
       </dsp:txXfrm>
     </dsp:sp>
     <dsp:sp modelId="{44B76188-4E64-4727-B3F4-058BF77789BE}">
@@ -1966,8 +2051,8 @@
       </dsp:nvSpPr>
       <dsp:spPr>
         <a:xfrm>
-          <a:off x="0" y="2256822"/>
-          <a:ext cx="7583423" cy="1732500"/>
+          <a:off x="0" y="2328372"/>
+          <a:ext cx="7583423" cy="1663200"/>
         </a:xfrm>
         <a:prstGeom prst="rect">
           <a:avLst/>
@@ -2007,12 +2092,12 @@
         <a:fontRef idx="minor"/>
       </dsp:style>
       <dsp:txBody>
-        <a:bodyPr spcFirstLastPara="0" vert="horz" wrap="square" lIns="588558" tIns="229108" rIns="588558" bIns="78232" numCol="1" spcCol="1270" anchor="t" anchorCtr="0">
+        <a:bodyPr spcFirstLastPara="0" vert="horz" wrap="square" lIns="588558" tIns="333248" rIns="588558" bIns="113792" numCol="1" spcCol="1270" anchor="t" anchorCtr="0">
           <a:noAutofit/>
         </a:bodyPr>
         <a:lstStyle/>
         <a:p>
-          <a:pPr marL="57150" lvl="1" indent="-57150" algn="l" defTabSz="488950">
+          <a:pPr marL="171450" lvl="1" indent="-171450" algn="l" defTabSz="711200">
             <a:lnSpc>
               <a:spcPct val="90000"/>
             </a:lnSpc>
@@ -2022,15 +2107,15 @@
             <a:spcAft>
               <a:spcPct val="15000"/>
             </a:spcAft>
-            <a:buChar char="•"/>
+            <a:buChar char="••"/>
           </a:pPr>
           <a:r>
-            <a:rPr lang="es-ES" sz="1100" kern="1200" dirty="0"/>
+            <a:rPr lang="es-ES" sz="1600" kern="1200" dirty="0"/>
             <a:t>Modelo: Administrador y Abonos.</a:t>
           </a:r>
         </a:p>
         <a:p>
-          <a:pPr marL="57150" lvl="1" indent="-57150" algn="l" defTabSz="488950">
+          <a:pPr marL="171450" lvl="1" indent="-171450" algn="l" defTabSz="711200">
             <a:lnSpc>
               <a:spcPct val="90000"/>
             </a:lnSpc>
@@ -2040,15 +2125,15 @@
             <a:spcAft>
               <a:spcPct val="15000"/>
             </a:spcAft>
-            <a:buChar char="•"/>
+            <a:buChar char="••"/>
           </a:pPr>
           <a:r>
-            <a:rPr lang="es-ES" sz="1100" kern="1200" dirty="0"/>
+            <a:rPr lang="es-ES" sz="1600" kern="1200" dirty="0"/>
             <a:t>Vistas: Navegación del administrador.</a:t>
           </a:r>
         </a:p>
         <a:p>
-          <a:pPr marL="57150" lvl="1" indent="-57150" algn="l" defTabSz="488950">
+          <a:pPr marL="171450" lvl="1" indent="-171450" algn="l" defTabSz="711200">
             <a:lnSpc>
               <a:spcPct val="90000"/>
             </a:lnSpc>
@@ -2058,15 +2143,15 @@
             <a:spcAft>
               <a:spcPct val="15000"/>
             </a:spcAft>
-            <a:buChar char="•"/>
+            <a:buChar char="••"/>
           </a:pPr>
           <a:r>
-            <a:rPr lang="es-ES" sz="1100" kern="1200" dirty="0"/>
+            <a:rPr lang="es-ES" sz="1600" kern="1200" dirty="0"/>
             <a:t>Servicios: Consultar estado del parking, facturación y abonados.  </a:t>
           </a:r>
         </a:p>
         <a:p>
-          <a:pPr marL="57150" lvl="1" indent="-57150" algn="l" defTabSz="488950">
+          <a:pPr marL="171450" lvl="1" indent="-171450" algn="l" defTabSz="711200">
             <a:lnSpc>
               <a:spcPct val="90000"/>
             </a:lnSpc>
@@ -2076,15 +2161,20 @@
             <a:spcAft>
               <a:spcPct val="15000"/>
             </a:spcAft>
-            <a:buChar char="•"/>
+            <a:buChar char="••"/>
           </a:pPr>
           <a:r>
-            <a:rPr lang="es-ES" sz="1100" kern="1200" dirty="0"/>
-            <a:t>Repositorios: Administrador y Abonos.</a:t>
+            <a:rPr lang="es-ES" sz="1600" kern="1200" dirty="0"/>
+            <a:t>Repositorios: Administrador y </a:t>
           </a:r>
+          <a:r>
+            <a:rPr lang="es-ES" sz="1600" kern="1200" dirty="0" smtClean="0"/>
+            <a:t>Abonos.</a:t>
+          </a:r>
+          <a:endParaRPr lang="es-ES" sz="1600" kern="1200" dirty="0"/>
         </a:p>
         <a:p>
-          <a:pPr marL="57150" lvl="1" indent="-57150" algn="l" defTabSz="488950">
+          <a:pPr marL="171450" lvl="1" indent="-171450" algn="l" defTabSz="711200">
             <a:lnSpc>
               <a:spcPct val="90000"/>
             </a:lnSpc>
@@ -2094,17 +2184,22 @@
             <a:spcAft>
               <a:spcPct val="15000"/>
             </a:spcAft>
-            <a:buChar char="•"/>
+            <a:buChar char="••"/>
           </a:pPr>
           <a:r>
-            <a:rPr lang="es-ES" sz="1100" kern="1200" dirty="0"/>
-            <a:t>Controladores: CRUD Clientes y Abonos.</a:t>
+            <a:rPr lang="es-ES" sz="1600" kern="1200" dirty="0"/>
+            <a:t>Controladores: </a:t>
           </a:r>
+          <a:r>
+            <a:rPr lang="es-ES" sz="1600" kern="1200" dirty="0" smtClean="0"/>
+            <a:t>- </a:t>
+          </a:r>
+          <a:endParaRPr lang="es-ES" sz="1600" kern="1200" dirty="0"/>
         </a:p>
       </dsp:txBody>
       <dsp:txXfrm>
-        <a:off x="0" y="2256822"/>
-        <a:ext cx="7583423" cy="1732500"/>
+        <a:off x="0" y="2328372"/>
+        <a:ext cx="7583423" cy="1663200"/>
       </dsp:txXfrm>
     </dsp:sp>
     <dsp:sp modelId="{DF4D1FA9-EECA-47B6-8A69-0DF882AC6FE7}">
@@ -2114,8 +2209,8 @@
       </dsp:nvSpPr>
       <dsp:spPr>
         <a:xfrm>
-          <a:off x="379171" y="2094462"/>
-          <a:ext cx="5308396" cy="324720"/>
+          <a:off x="379171" y="2092212"/>
+          <a:ext cx="5308396" cy="472320"/>
         </a:xfrm>
         <a:prstGeom prst="roundRect">
           <a:avLst/>
@@ -2161,7 +2256,7 @@
         </a:bodyPr>
         <a:lstStyle/>
         <a:p>
-          <a:pPr marL="0" lvl="0" indent="0" algn="l" defTabSz="488950">
+          <a:pPr lvl="0" algn="l" defTabSz="711200">
             <a:lnSpc>
               <a:spcPct val="90000"/>
             </a:lnSpc>
@@ -2171,17 +2266,16 @@
             <a:spcAft>
               <a:spcPct val="35000"/>
             </a:spcAft>
-            <a:buNone/>
           </a:pPr>
           <a:r>
-            <a:rPr lang="es-ES" sz="1100" kern="1200" dirty="0"/>
+            <a:rPr lang="es-ES" sz="1600" kern="1200" dirty="0"/>
             <a:t>Administrador</a:t>
           </a:r>
         </a:p>
       </dsp:txBody>
       <dsp:txXfrm>
-        <a:off x="395023" y="2110314"/>
-        <a:ext cx="5276692" cy="293016"/>
+        <a:off x="402228" y="2115269"/>
+        <a:ext cx="5262282" cy="426206"/>
       </dsp:txXfrm>
     </dsp:sp>
     <dsp:sp modelId="{B4B8B659-5257-419F-A1AF-48E591352005}">
@@ -2191,8 +2285,8 @@
       </dsp:nvSpPr>
       <dsp:spPr>
         <a:xfrm>
-          <a:off x="0" y="4211082"/>
-          <a:ext cx="7583423" cy="1732500"/>
+          <a:off x="0" y="4314132"/>
+          <a:ext cx="7583423" cy="1663200"/>
         </a:xfrm>
         <a:prstGeom prst="rect">
           <a:avLst/>
@@ -2232,12 +2326,12 @@
         <a:fontRef idx="minor"/>
       </dsp:style>
       <dsp:txBody>
-        <a:bodyPr spcFirstLastPara="0" vert="horz" wrap="square" lIns="588558" tIns="229108" rIns="588558" bIns="78232" numCol="1" spcCol="1270" anchor="t" anchorCtr="0">
+        <a:bodyPr spcFirstLastPara="0" vert="horz" wrap="square" lIns="588558" tIns="333248" rIns="588558" bIns="113792" numCol="1" spcCol="1270" anchor="t" anchorCtr="0">
           <a:noAutofit/>
         </a:bodyPr>
         <a:lstStyle/>
         <a:p>
-          <a:pPr marL="57150" lvl="1" indent="-57150" algn="l" defTabSz="488950">
+          <a:pPr marL="171450" lvl="1" indent="-171450" algn="l" defTabSz="711200">
             <a:lnSpc>
               <a:spcPct val="90000"/>
             </a:lnSpc>
@@ -2247,15 +2341,15 @@
             <a:spcAft>
               <a:spcPct val="15000"/>
             </a:spcAft>
-            <a:buChar char="•"/>
+            <a:buChar char="••"/>
           </a:pPr>
           <a:r>
-            <a:rPr lang="es-ES" sz="1100" kern="1200" dirty="0"/>
+            <a:rPr lang="es-ES" sz="1600" kern="1200" dirty="0"/>
             <a:t>Modelo: Cliente y Vehículo.</a:t>
           </a:r>
         </a:p>
         <a:p>
-          <a:pPr marL="57150" lvl="1" indent="-57150" algn="l" defTabSz="488950">
+          <a:pPr marL="171450" lvl="1" indent="-171450" algn="l" defTabSz="711200">
             <a:lnSpc>
               <a:spcPct val="90000"/>
             </a:lnSpc>
@@ -2265,15 +2359,15 @@
             <a:spcAft>
               <a:spcPct val="15000"/>
             </a:spcAft>
-            <a:buChar char="•"/>
+            <a:buChar char="••"/>
           </a:pPr>
           <a:r>
-            <a:rPr lang="es-ES" sz="1100" kern="1200" dirty="0"/>
+            <a:rPr lang="es-ES" sz="1600" kern="1200" dirty="0"/>
             <a:t>Vistas: Navegación del cliente.</a:t>
           </a:r>
         </a:p>
         <a:p>
-          <a:pPr marL="57150" lvl="1" indent="-57150" algn="l" defTabSz="488950">
+          <a:pPr marL="171450" lvl="1" indent="-171450" algn="l" defTabSz="711200">
             <a:lnSpc>
               <a:spcPct val="90000"/>
             </a:lnSpc>
@@ -2283,15 +2377,15 @@
             <a:spcAft>
               <a:spcPct val="15000"/>
             </a:spcAft>
-            <a:buChar char="•"/>
+            <a:buChar char="••"/>
           </a:pPr>
           <a:r>
-            <a:rPr lang="es-ES" sz="1100" kern="1200" dirty="0"/>
+            <a:rPr lang="es-ES" sz="1600" kern="1200" dirty="0"/>
             <a:t>Servicios: Depositar y retirar vehículos.</a:t>
           </a:r>
         </a:p>
         <a:p>
-          <a:pPr marL="57150" lvl="1" indent="-57150" algn="l" defTabSz="488950">
+          <a:pPr marL="171450" lvl="1" indent="-171450" algn="l" defTabSz="711200">
             <a:lnSpc>
               <a:spcPct val="90000"/>
             </a:lnSpc>
@@ -2301,15 +2395,15 @@
             <a:spcAft>
               <a:spcPct val="15000"/>
             </a:spcAft>
-            <a:buChar char="•"/>
+            <a:buChar char="••"/>
           </a:pPr>
           <a:r>
-            <a:rPr lang="es-ES" sz="1100" kern="1200" dirty="0"/>
+            <a:rPr lang="es-ES" sz="1600" kern="1200" dirty="0"/>
             <a:t>Repositorios: Clientes abonados y Vehículos de clientes abonados. </a:t>
           </a:r>
         </a:p>
         <a:p>
-          <a:pPr marL="57150" lvl="1" indent="-57150" algn="l" defTabSz="488950">
+          <a:pPr marL="171450" lvl="1" indent="-171450" algn="l" defTabSz="711200">
             <a:lnSpc>
               <a:spcPct val="90000"/>
             </a:lnSpc>
@@ -2319,17 +2413,17 @@
             <a:spcAft>
               <a:spcPct val="15000"/>
             </a:spcAft>
-            <a:buChar char="•"/>
+            <a:buChar char="••"/>
           </a:pPr>
           <a:r>
-            <a:rPr lang="es-ES" sz="1100" kern="1200" dirty="0"/>
+            <a:rPr lang="es-ES" sz="1600" kern="1200" dirty="0"/>
             <a:t>Controladores: ¿?</a:t>
           </a:r>
         </a:p>
       </dsp:txBody>
       <dsp:txXfrm>
-        <a:off x="0" y="4211082"/>
-        <a:ext cx="7583423" cy="1732500"/>
+        <a:off x="0" y="4314132"/>
+        <a:ext cx="7583423" cy="1663200"/>
       </dsp:txXfrm>
     </dsp:sp>
     <dsp:sp modelId="{CE53C9A7-556A-4734-8C46-F0613282E106}">
@@ -2339,8 +2433,8 @@
       </dsp:nvSpPr>
       <dsp:spPr>
         <a:xfrm>
-          <a:off x="379171" y="4048722"/>
-          <a:ext cx="5308396" cy="324720"/>
+          <a:off x="379171" y="4077972"/>
+          <a:ext cx="5308396" cy="472320"/>
         </a:xfrm>
         <a:prstGeom prst="roundRect">
           <a:avLst/>
@@ -2386,7 +2480,7 @@
         </a:bodyPr>
         <a:lstStyle/>
         <a:p>
-          <a:pPr marL="0" lvl="0" indent="0" algn="l" defTabSz="488950">
+          <a:pPr lvl="0" algn="l" defTabSz="711200">
             <a:lnSpc>
               <a:spcPct val="90000"/>
             </a:lnSpc>
@@ -2396,17 +2490,16 @@
             <a:spcAft>
               <a:spcPct val="35000"/>
             </a:spcAft>
-            <a:buNone/>
           </a:pPr>
           <a:r>
-            <a:rPr lang="es-ES" sz="1100" kern="1200" dirty="0"/>
+            <a:rPr lang="es-ES" sz="1600" kern="1200" dirty="0"/>
             <a:t>Cliente</a:t>
           </a:r>
         </a:p>
       </dsp:txBody>
       <dsp:txXfrm>
-        <a:off x="395023" y="4064574"/>
-        <a:ext cx="5276692" cy="293016"/>
+        <a:off x="402228" y="4101029"/>
+        <a:ext cx="5262282" cy="426206"/>
       </dsp:txXfrm>
     </dsp:sp>
   </dsp:spTree>
@@ -3979,7 +4072,7 @@
           <a:p>
             <a:fld id="{12241623-A064-4BED-B073-BA4D61433402}" type="datetime1">
               <a:rPr lang="en-US" smtClean="0"/>
-              <a:t>11/10/2020</a:t>
+              <a:t>11/11/2020</a:t>
             </a:fld>
             <a:endParaRPr lang="en-US" dirty="0"/>
           </a:p>
@@ -4790,7 +4883,7 @@
           <a:p>
             <a:fld id="{6F86ED0C-1DA7-41F0-94CF-6218B1FEDFF1}" type="datetime1">
               <a:rPr lang="en-US" smtClean="0"/>
-              <a:t>11/10/2020</a:t>
+              <a:t>11/11/2020</a:t>
             </a:fld>
             <a:endParaRPr lang="en-US" dirty="0"/>
           </a:p>
@@ -4989,7 +5082,7 @@
           <a:p>
             <a:fld id="{EECF02AB-6034-4B88-BC5A-7C17CB0EF809}" type="datetime1">
               <a:rPr lang="en-US" smtClean="0"/>
-              <a:t>11/10/2020</a:t>
+              <a:t>11/11/2020</a:t>
             </a:fld>
             <a:endParaRPr lang="en-US" dirty="0"/>
           </a:p>
@@ -5224,7 +5317,7 @@
           <a:p>
             <a:fld id="{22F3E5F3-28EE-488F-BD53-B744C06C3DEC}" type="datetime1">
               <a:rPr lang="en-US" smtClean="0"/>
-              <a:t>11/10/2020</a:t>
+              <a:t>11/11/2020</a:t>
             </a:fld>
             <a:endParaRPr lang="en-US" dirty="0"/>
           </a:p>
@@ -7917,7 +8010,7 @@
           <a:p>
             <a:fld id="{E72EB70D-CD01-44DA-83B3-8FEB3383D307}" type="datetime1">
               <a:rPr lang="en-US" smtClean="0"/>
-              <a:t>11/10/2020</a:t>
+              <a:t>11/11/2020</a:t>
             </a:fld>
             <a:endParaRPr lang="en-US" dirty="0"/>
           </a:p>
@@ -8113,7 +8206,7 @@
           <a:p>
             <a:fld id="{D0158CFD-9357-46BE-A189-D637A67C8730}" type="datetime1">
               <a:rPr lang="en-US" smtClean="0"/>
-              <a:t>11/10/2020</a:t>
+              <a:t>11/11/2020</a:t>
             </a:fld>
             <a:endParaRPr lang="en-US" dirty="0"/>
           </a:p>
@@ -8502,7 +8595,7 @@
           <a:p>
             <a:fld id="{7B4742EE-B331-4632-BD10-A82FED6B6FC0}" type="datetime1">
               <a:rPr lang="en-US" smtClean="0"/>
-              <a:t>11/10/2020</a:t>
+              <a:t>11/11/2020</a:t>
             </a:fld>
             <a:endParaRPr lang="en-US" dirty="0"/>
           </a:p>
@@ -8668,7 +8761,7 @@
           <a:p>
             <a:fld id="{451BA835-D13F-49F4-8F11-5D576AC65FAD}" type="datetime1">
               <a:rPr lang="en-US" smtClean="0"/>
-              <a:t>11/10/2020</a:t>
+              <a:t>11/11/2020</a:t>
             </a:fld>
             <a:endParaRPr lang="en-US" dirty="0"/>
           </a:p>
@@ -8791,7 +8884,7 @@
           <a:p>
             <a:fld id="{ADBD1799-ACB5-4CB2-86A2-5C574F1C8706}" type="datetime1">
               <a:rPr lang="en-US" smtClean="0"/>
-              <a:t>11/10/2020</a:t>
+              <a:t>11/11/2020</a:t>
             </a:fld>
             <a:endParaRPr lang="en-US" dirty="0"/>
           </a:p>
@@ -9101,7 +9194,7 @@
           <a:p>
             <a:fld id="{ED5DD0D6-7A82-473E-879B-C6ECD6CCCFEC}" type="datetime1">
               <a:rPr lang="en-US" smtClean="0"/>
-              <a:t>11/10/2020</a:t>
+              <a:t>11/11/2020</a:t>
             </a:fld>
             <a:endParaRPr lang="en-US" dirty="0"/>
           </a:p>
@@ -9401,7 +9494,7 @@
           <a:p>
             <a:fld id="{D4605E03-BC17-41A7-854C-DFAB672737DC}" type="datetime1">
               <a:rPr lang="en-US" smtClean="0"/>
-              <a:t>11/10/2020</a:t>
+              <a:t>11/11/2020</a:t>
             </a:fld>
             <a:endParaRPr lang="en-US" dirty="0"/>
           </a:p>
@@ -9653,7 +9746,7 @@
           <a:p>
             <a:fld id="{C4408324-A84C-4A45-93B6-78D079CCE772}" type="datetime1">
               <a:rPr lang="en-US" smtClean="0"/>
-              <a:t>11/10/2020</a:t>
+              <a:t>11/11/2020</a:t>
             </a:fld>
             <a:endParaRPr lang="en-US" dirty="0"/>
           </a:p>
@@ -10151,7 +10244,7 @@
                 <a16:creationId xmlns:a16="http://schemas.microsoft.com/office/drawing/2014/main" id="{430127AE-B29E-4FDF-99D2-A2F1E7003F74}"/>
               </a:ext>
               <a:ext uri="{C183D7F6-B498-43B3-948B-1728B52AA6E4}">
-                <adec:decorative xmlns:adec="http://schemas.microsoft.com/office/drawing/2017/decorative" val="1"/>
+                <adec:decorative xmlns:adec="http://schemas.microsoft.com/office/drawing/2017/decorative" xmlns="" val="1"/>
               </a:ext>
             </a:extLst>
           </p:cNvPr>
@@ -10206,7 +10299,7 @@
                 <a16:creationId xmlns:a16="http://schemas.microsoft.com/office/drawing/2014/main" id="{3D5FBB81-B61B-416A-8F5D-A8DDF62530F1}"/>
               </a:ext>
               <a:ext uri="{C183D7F6-B498-43B3-948B-1728B52AA6E4}">
-                <adec:decorative xmlns:adec="http://schemas.microsoft.com/office/drawing/2017/decorative" val="1"/>
+                <adec:decorative xmlns:adec="http://schemas.microsoft.com/office/drawing/2017/decorative" xmlns="" val="1"/>
               </a:ext>
             </a:extLst>
           </p:cNvPr>
@@ -10363,7 +10456,7 @@
                 <a16:creationId xmlns:a16="http://schemas.microsoft.com/office/drawing/2014/main" id="{40C0D7D4-D83D-4C58-87D1-955F0A9173D7}"/>
               </a:ext>
               <a:ext uri="{C183D7F6-B498-43B3-948B-1728B52AA6E4}">
-                <adec:decorative xmlns:adec="http://schemas.microsoft.com/office/drawing/2017/decorative" val="1"/>
+                <adec:decorative xmlns:adec="http://schemas.microsoft.com/office/drawing/2017/decorative" xmlns="" val="1"/>
               </a:ext>
             </a:extLst>
           </p:cNvPr>
@@ -10540,7 +10633,7 @@
                 <a16:creationId xmlns:a16="http://schemas.microsoft.com/office/drawing/2014/main" id="{0BA56A81-C9DD-4EBA-9E13-32FFB51CFD45}"/>
               </a:ext>
               <a:ext uri="{C183D7F6-B498-43B3-948B-1728B52AA6E4}">
-                <adec:decorative xmlns:adec="http://schemas.microsoft.com/office/drawing/2017/decorative" val="1"/>
+                <adec:decorative xmlns:adec="http://schemas.microsoft.com/office/drawing/2017/decorative" xmlns="" val="1"/>
               </a:ext>
             </a:extLst>
           </p:cNvPr>
@@ -10712,7 +10805,7 @@
                 <a16:creationId xmlns:a16="http://schemas.microsoft.com/office/drawing/2014/main" id="{15F9A324-404E-4C5D-AFF0-C5D0D84182B0}"/>
               </a:ext>
               <a:ext uri="{C183D7F6-B498-43B3-948B-1728B52AA6E4}">
-                <adec:decorative xmlns:adec="http://schemas.microsoft.com/office/drawing/2017/decorative" val="1"/>
+                <adec:decorative xmlns:adec="http://schemas.microsoft.com/office/drawing/2017/decorative" xmlns="" val="1"/>
               </a:ext>
             </a:extLst>
           </p:cNvPr>
@@ -10930,7 +11023,7 @@
           <p:nvPr>
             <p:extLst>
               <p:ext uri="{D42A27DB-BD31-4B8C-83A1-F6EECF244321}">
-                <p14:modId xmlns:p14="http://schemas.microsoft.com/office/powerpoint/2010/main" val="1418259539"/>
+                <p14:modId xmlns:p14="http://schemas.microsoft.com/office/powerpoint/2010/main" val="4235098225"/>
               </p:ext>
             </p:extLst>
           </p:nvPr>
@@ -10949,6 +11042,104 @@
     <p:extLst>
       <p:ext uri="{BB962C8B-B14F-4D97-AF65-F5344CB8AC3E}">
         <p14:creationId xmlns:p14="http://schemas.microsoft.com/office/powerpoint/2010/main" val="3902414844"/>
+      </p:ext>
+    </p:extLst>
+  </p:cSld>
+  <p:clrMapOvr>
+    <a:masterClrMapping/>
+  </p:clrMapOvr>
+</p:sld>
+</file>
+
+<file path=ppt/slides/slide2.xml><?xml version="1.0" encoding="utf-8"?>
+<p:sld xmlns:a="http://schemas.openxmlformats.org/drawingml/2006/main" xmlns:r="http://schemas.openxmlformats.org/officeDocument/2006/relationships" xmlns:p="http://schemas.openxmlformats.org/presentationml/2006/main">
+  <p:cSld>
+    <p:spTree>
+      <p:nvGrpSpPr>
+        <p:cNvPr id="1" name=""/>
+        <p:cNvGrpSpPr/>
+        <p:nvPr/>
+      </p:nvGrpSpPr>
+      <p:grpSpPr>
+        <a:xfrm>
+          <a:off x="0" y="0"/>
+          <a:ext cx="0" cy="0"/>
+          <a:chOff x="0" y="0"/>
+          <a:chExt cx="0" cy="0"/>
+        </a:xfrm>
+      </p:grpSpPr>
+      <p:sp>
+        <p:nvSpPr>
+          <p:cNvPr id="2" name="Título 1"/>
+          <p:cNvSpPr>
+            <a:spLocks noGrp="1"/>
+          </p:cNvSpPr>
+          <p:nvPr>
+            <p:ph type="title"/>
+          </p:nvPr>
+        </p:nvSpPr>
+        <p:spPr/>
+        <p:txBody>
+          <a:bodyPr/>
+          <a:lstStyle/>
+          <a:p>
+            <a:r>
+              <a:rPr lang="es-ES" dirty="0" smtClean="0"/>
+              <a:t>Sugerencias Carlos</a:t>
+            </a:r>
+            <a:endParaRPr lang="es-ES" dirty="0"/>
+          </a:p>
+        </p:txBody>
+      </p:sp>
+      <p:sp>
+        <p:nvSpPr>
+          <p:cNvPr id="3" name="Marcador de contenido 2"/>
+          <p:cNvSpPr>
+            <a:spLocks noGrp="1"/>
+          </p:cNvSpPr>
+          <p:nvPr>
+            <p:ph idx="1"/>
+          </p:nvPr>
+        </p:nvSpPr>
+        <p:spPr/>
+        <p:txBody>
+          <a:bodyPr/>
+          <a:lstStyle/>
+          <a:p>
+            <a:r>
+              <a:rPr lang="es-ES" smtClean="0"/>
+              <a:t>Métodos </a:t>
+            </a:r>
+            <a:r>
+              <a:rPr lang="es-ES" dirty="0" err="1" smtClean="0"/>
+              <a:t>Crud</a:t>
+            </a:r>
+            <a:r>
+              <a:rPr lang="es-ES" dirty="0" smtClean="0"/>
+              <a:t> en Repositorio y los métodos CRUD de repositorio se llaman desde métodos de Servicio, por el tema del </a:t>
+            </a:r>
+            <a:r>
+              <a:rPr lang="es-ES" dirty="0"/>
+              <a:t>e</a:t>
+            </a:r>
+            <a:r>
+              <a:rPr lang="es-ES" dirty="0" smtClean="0"/>
+              <a:t>ncapsulamiento.</a:t>
+            </a:r>
+          </a:p>
+          <a:p>
+            <a:r>
+              <a:rPr lang="es-ES" dirty="0" smtClean="0"/>
+              <a:t>Controlador: métodos relacionados con la I/O de la consola (lectura y escritura). Además, se encargar de llamar a las vistas.</a:t>
+            </a:r>
+            <a:endParaRPr lang="es-ES" dirty="0"/>
+          </a:p>
+        </p:txBody>
+      </p:sp>
+    </p:spTree>
+    <p:extLst>
+      <p:ext uri="{BB962C8B-B14F-4D97-AF65-F5344CB8AC3E}">
+        <p14:creationId xmlns:p14="http://schemas.microsoft.com/office/powerpoint/2010/main" val="3681257213"/>
       </p:ext>
     </p:extLst>
   </p:cSld>

</xml_diff>

<commit_message>
Actualizada clase modelo Plaza. Trabajando los repositorios e importaciones de módulos
</commit_message>
<xml_diff>
--- a/Estructura de ficheros.pptx
+++ b/Estructura de ficheros.pptx
@@ -1026,7 +1026,7 @@
         <a:p>
           <a:r>
             <a:rPr lang="es-ES" dirty="0"/>
-            <a:t>Modelo: Plazas.</a:t>
+            <a:t>Modelo: Plazas y Tickets.</a:t>
           </a:r>
         </a:p>
       </dgm:t>
@@ -1134,7 +1134,7 @@
         <a:p>
           <a:r>
             <a:rPr lang="es-ES" dirty="0"/>
-            <a:t>Repositorios: Plazas y Vehículos.</a:t>
+            <a:t>Repositorios: Plazas, Vehículos y Tickets.</a:t>
           </a:r>
         </a:p>
       </dgm:t>
@@ -1170,13 +1170,8 @@
         <a:p>
           <a:r>
             <a:rPr lang="es-ES" dirty="0"/>
-            <a:t>Controladores: </a:t>
+            <a:t>Controladores: Llamar a la vistas y controla las entradas y salidas por consola.</a:t>
           </a:r>
-          <a:r>
-            <a:rPr lang="es-ES" dirty="0" smtClean="0"/>
-            <a:t>Llamar a la vistas y controla las entradas y salidas por consola.</a:t>
-          </a:r>
-          <a:endParaRPr lang="es-ES" dirty="0"/>
         </a:p>
       </dgm:t>
     </dgm:pt>
@@ -1319,13 +1314,8 @@
         <a:p>
           <a:r>
             <a:rPr lang="es-ES" dirty="0"/>
-            <a:t>Repositorios: Administrador y </a:t>
+            <a:t>Repositorios: Administrador y Abonos.</a:t>
           </a:r>
-          <a:r>
-            <a:rPr lang="es-ES" dirty="0" smtClean="0"/>
-            <a:t>Abonos.</a:t>
-          </a:r>
-          <a:endParaRPr lang="es-ES" dirty="0"/>
         </a:p>
       </dgm:t>
     </dgm:pt>
@@ -1360,13 +1350,8 @@
         <a:p>
           <a:r>
             <a:rPr lang="es-ES" dirty="0"/>
-            <a:t>Controladores: </a:t>
+            <a:t>Controladores: - </a:t>
           </a:r>
-          <a:r>
-            <a:rPr lang="es-ES" dirty="0" smtClean="0"/>
-            <a:t>- </a:t>
-          </a:r>
-          <a:endParaRPr lang="es-ES" dirty="0"/>
         </a:p>
       </dgm:t>
     </dgm:pt>
@@ -1545,13 +1530,8 @@
         <a:p>
           <a:r>
             <a:rPr lang="es-ES" dirty="0"/>
-            <a:t>Controladores: </a:t>
+            <a:t>Controladores: -</a:t>
           </a:r>
-          <a:r>
-            <a:rPr lang="es-ES" dirty="0" smtClean="0"/>
-            <a:t>-</a:t>
-          </a:r>
-          <a:endParaRPr lang="es-ES" dirty="0"/>
         </a:p>
       </dgm:t>
     </dgm:pt>
@@ -1586,13 +1566,6 @@
         </dgm:presLayoutVars>
       </dgm:prSet>
       <dgm:spPr/>
-      <dgm:t>
-        <a:bodyPr/>
-        <a:lstStyle/>
-        <a:p>
-          <a:endParaRPr lang="es-ES"/>
-        </a:p>
-      </dgm:t>
     </dgm:pt>
     <dgm:pt modelId="{BFB4EAF4-F10B-4D60-801C-4408944E851F}" type="pres">
       <dgm:prSet presAssocID="{73120122-2709-4182-AD76-02CC96BCC8B7}" presName="parentLin" presStyleCnt="0"/>
@@ -1601,13 +1574,6 @@
     <dgm:pt modelId="{EC087E7B-F812-4F0C-BED4-586E26DAA13E}" type="pres">
       <dgm:prSet presAssocID="{73120122-2709-4182-AD76-02CC96BCC8B7}" presName="parentLeftMargin" presStyleLbl="node1" presStyleIdx="0" presStyleCnt="3"/>
       <dgm:spPr/>
-      <dgm:t>
-        <a:bodyPr/>
-        <a:lstStyle/>
-        <a:p>
-          <a:endParaRPr lang="es-ES"/>
-        </a:p>
-      </dgm:t>
     </dgm:pt>
     <dgm:pt modelId="{60DBA612-3706-4FD0-90E9-76F4BF841CBD}" type="pres">
       <dgm:prSet presAssocID="{73120122-2709-4182-AD76-02CC96BCC8B7}" presName="parentText" presStyleLbl="node1" presStyleIdx="0" presStyleCnt="3">
@@ -1617,13 +1583,6 @@
         </dgm:presLayoutVars>
       </dgm:prSet>
       <dgm:spPr/>
-      <dgm:t>
-        <a:bodyPr/>
-        <a:lstStyle/>
-        <a:p>
-          <a:endParaRPr lang="es-ES"/>
-        </a:p>
-      </dgm:t>
     </dgm:pt>
     <dgm:pt modelId="{7C7A22B4-5089-4B86-A158-CF03DBAD5DBF}" type="pres">
       <dgm:prSet presAssocID="{73120122-2709-4182-AD76-02CC96BCC8B7}" presName="negativeSpace" presStyleCnt="0"/>
@@ -1636,13 +1595,6 @@
         </dgm:presLayoutVars>
       </dgm:prSet>
       <dgm:spPr/>
-      <dgm:t>
-        <a:bodyPr/>
-        <a:lstStyle/>
-        <a:p>
-          <a:endParaRPr lang="es-ES"/>
-        </a:p>
-      </dgm:t>
     </dgm:pt>
     <dgm:pt modelId="{02062120-9D84-49FA-A5A2-CEC20153A14E}" type="pres">
       <dgm:prSet presAssocID="{AC32F9B7-2F73-4AFF-8CE5-6680D9EE2F8C}" presName="spaceBetweenRectangles" presStyleCnt="0"/>
@@ -1655,13 +1607,6 @@
     <dgm:pt modelId="{374EE56E-914E-4B35-BE9B-E25CE110FBF7}" type="pres">
       <dgm:prSet presAssocID="{C9E2A478-C852-4720-B19A-FE0F39D4BF93}" presName="parentLeftMargin" presStyleLbl="node1" presStyleIdx="0" presStyleCnt="3"/>
       <dgm:spPr/>
-      <dgm:t>
-        <a:bodyPr/>
-        <a:lstStyle/>
-        <a:p>
-          <a:endParaRPr lang="es-ES"/>
-        </a:p>
-      </dgm:t>
     </dgm:pt>
     <dgm:pt modelId="{DF4D1FA9-EECA-47B6-8A69-0DF882AC6FE7}" type="pres">
       <dgm:prSet presAssocID="{C9E2A478-C852-4720-B19A-FE0F39D4BF93}" presName="parentText" presStyleLbl="node1" presStyleIdx="1" presStyleCnt="3">
@@ -1671,13 +1616,6 @@
         </dgm:presLayoutVars>
       </dgm:prSet>
       <dgm:spPr/>
-      <dgm:t>
-        <a:bodyPr/>
-        <a:lstStyle/>
-        <a:p>
-          <a:endParaRPr lang="es-ES"/>
-        </a:p>
-      </dgm:t>
     </dgm:pt>
     <dgm:pt modelId="{D5E426A2-0FD3-4C93-8A03-75A152F30E08}" type="pres">
       <dgm:prSet presAssocID="{C9E2A478-C852-4720-B19A-FE0F39D4BF93}" presName="negativeSpace" presStyleCnt="0"/>
@@ -1690,13 +1628,6 @@
         </dgm:presLayoutVars>
       </dgm:prSet>
       <dgm:spPr/>
-      <dgm:t>
-        <a:bodyPr/>
-        <a:lstStyle/>
-        <a:p>
-          <a:endParaRPr lang="es-ES"/>
-        </a:p>
-      </dgm:t>
     </dgm:pt>
     <dgm:pt modelId="{57BF1A71-68C9-4495-9E61-B76488AE75C9}" type="pres">
       <dgm:prSet presAssocID="{2890695C-4AEC-4AA9-8F27-BB95647E5D5C}" presName="spaceBetweenRectangles" presStyleCnt="0"/>
@@ -1709,13 +1640,6 @@
     <dgm:pt modelId="{B124EB29-8B37-49D1-9DD8-474708A19D4E}" type="pres">
       <dgm:prSet presAssocID="{56B63760-9AED-41CB-AF5F-16709E095FA1}" presName="parentLeftMargin" presStyleLbl="node1" presStyleIdx="1" presStyleCnt="3"/>
       <dgm:spPr/>
-      <dgm:t>
-        <a:bodyPr/>
-        <a:lstStyle/>
-        <a:p>
-          <a:endParaRPr lang="es-ES"/>
-        </a:p>
-      </dgm:t>
     </dgm:pt>
     <dgm:pt modelId="{CE53C9A7-556A-4734-8C46-F0613282E106}" type="pres">
       <dgm:prSet presAssocID="{56B63760-9AED-41CB-AF5F-16709E095FA1}" presName="parentText" presStyleLbl="node1" presStyleIdx="2" presStyleCnt="3">
@@ -1725,13 +1649,6 @@
         </dgm:presLayoutVars>
       </dgm:prSet>
       <dgm:spPr/>
-      <dgm:t>
-        <a:bodyPr/>
-        <a:lstStyle/>
-        <a:p>
-          <a:endParaRPr lang="es-ES"/>
-        </a:p>
-      </dgm:t>
     </dgm:pt>
     <dgm:pt modelId="{AF9117AD-82A4-451C-899A-F89A0AE2D2EC}" type="pres">
       <dgm:prSet presAssocID="{56B63760-9AED-41CB-AF5F-16709E095FA1}" presName="negativeSpace" presStyleCnt="0"/>
@@ -1744,56 +1661,49 @@
         </dgm:presLayoutVars>
       </dgm:prSet>
       <dgm:spPr/>
-      <dgm:t>
-        <a:bodyPr/>
-        <a:lstStyle/>
-        <a:p>
-          <a:endParaRPr lang="es-ES"/>
-        </a:p>
-      </dgm:t>
     </dgm:pt>
   </dgm:ptLst>
   <dgm:cxnLst>
+    <dgm:cxn modelId="{CE597A08-A76A-486D-9E62-E4931BBC8121}" type="presOf" srcId="{9952B64D-35B4-4A90-BA05-A54D96AD7E27}" destId="{84BB7DC1-D3BF-4C80-A517-DEC7A1AF01B4}" srcOrd="0" destOrd="1" presId="urn:microsoft.com/office/officeart/2005/8/layout/list1"/>
+    <dgm:cxn modelId="{EFFF8D0A-80E7-4D99-97E0-DC453DB8B810}" srcId="{2CE23626-8BE5-4BA6-9D01-EA8E82C6B013}" destId="{56B63760-9AED-41CB-AF5F-16709E095FA1}" srcOrd="2" destOrd="0" parTransId="{F99950AA-B95E-41C6-A478-ADAF2723D381}" sibTransId="{AA3C5196-9488-4662-ABE8-FB69D0D20286}"/>
+    <dgm:cxn modelId="{4FA9190F-34A9-4516-AC27-02788F22984A}" srcId="{C9E2A478-C852-4720-B19A-FE0F39D4BF93}" destId="{6A3C41A9-B46E-46AF-951D-41F55735CBE5}" srcOrd="1" destOrd="0" parTransId="{10675569-CB06-41DC-84A9-A85280C68296}" sibTransId="{2B4A1E5E-80C6-48FE-82A0-1E1434028DC5}"/>
+    <dgm:cxn modelId="{D4F64711-EAE7-4B56-A41F-41D6BD02D322}" type="presOf" srcId="{00338487-4D0E-414E-A8EF-AA19ACA05632}" destId="{84BB7DC1-D3BF-4C80-A517-DEC7A1AF01B4}" srcOrd="0" destOrd="3" presId="urn:microsoft.com/office/officeart/2005/8/layout/list1"/>
+    <dgm:cxn modelId="{CF9DD111-A8D3-43B6-9071-1AC463F2CC02}" srcId="{73120122-2709-4182-AD76-02CC96BCC8B7}" destId="{9952B64D-35B4-4A90-BA05-A54D96AD7E27}" srcOrd="1" destOrd="0" parTransId="{476F3920-D8B2-4324-B611-5501B5F8F96D}" sibTransId="{EA4770B3-2DE0-4830-9B11-A1804E502B57}"/>
+    <dgm:cxn modelId="{3F93B414-05AB-411C-B14C-239B98A1B5D6}" type="presOf" srcId="{BEBB5D8A-7B68-4D8A-8774-598CEFB0C4CC}" destId="{44B76188-4E64-4727-B3F4-058BF77789BE}" srcOrd="0" destOrd="2" presId="urn:microsoft.com/office/officeart/2005/8/layout/list1"/>
+    <dgm:cxn modelId="{47FE7720-117F-461C-9FAE-D78C402A5D1E}" type="presOf" srcId="{2CD2283B-BD0D-43A8-B0E7-896549D82BFF}" destId="{44B76188-4E64-4727-B3F4-058BF77789BE}" srcOrd="0" destOrd="3" presId="urn:microsoft.com/office/officeart/2005/8/layout/list1"/>
+    <dgm:cxn modelId="{6B998D30-1F78-4B15-8652-EF7AEB8E758D}" type="presOf" srcId="{73120122-2709-4182-AD76-02CC96BCC8B7}" destId="{EC087E7B-F812-4F0C-BED4-586E26DAA13E}" srcOrd="0" destOrd="0" presId="urn:microsoft.com/office/officeart/2005/8/layout/list1"/>
+    <dgm:cxn modelId="{08871435-646A-4877-8F60-6121A1F3FF15}" type="presOf" srcId="{58205C9B-0C64-4D62-AE92-5EC34C3CEB17}" destId="{44B76188-4E64-4727-B3F4-058BF77789BE}" srcOrd="0" destOrd="4" presId="urn:microsoft.com/office/officeart/2005/8/layout/list1"/>
+    <dgm:cxn modelId="{EBCC0436-08C5-47E3-882B-78E105DB9823}" type="presOf" srcId="{2CE23626-8BE5-4BA6-9D01-EA8E82C6B013}" destId="{B3DD2D3B-CEA1-48C6-8AED-235085E3721A}" srcOrd="0" destOrd="0" presId="urn:microsoft.com/office/officeart/2005/8/layout/list1"/>
+    <dgm:cxn modelId="{CBB5BB37-3D91-4385-9F5A-63878D896069}" type="presOf" srcId="{CFDBA0D2-4657-46D4-9F65-3821319CD9F0}" destId="{84BB7DC1-D3BF-4C80-A517-DEC7A1AF01B4}" srcOrd="0" destOrd="2" presId="urn:microsoft.com/office/officeart/2005/8/layout/list1"/>
+    <dgm:cxn modelId="{0D7AD35C-1BB4-46B7-961F-D52DD8F76401}" srcId="{56B63760-9AED-41CB-AF5F-16709E095FA1}" destId="{D2FB84C3-900D-4BCB-8167-6FCC2010A9E8}" srcOrd="1" destOrd="0" parTransId="{A1F87C9F-2C62-4DC8-A563-47D5664DFEB6}" sibTransId="{5AD7492D-D0C8-4256-90F4-3BBC9B5F5D1A}"/>
+    <dgm:cxn modelId="{4A54FD62-624E-4F59-813A-E850D120B62E}" srcId="{73120122-2709-4182-AD76-02CC96BCC8B7}" destId="{CFDBA0D2-4657-46D4-9F65-3821319CD9F0}" srcOrd="2" destOrd="0" parTransId="{D06F649A-AF9E-4B10-AC32-29BBF33149DA}" sibTransId="{88138875-2E86-4032-A4BB-4C9CB0DF3AF8}"/>
+    <dgm:cxn modelId="{475CFE42-1C4C-4D06-8737-EB541F27F87B}" srcId="{73120122-2709-4182-AD76-02CC96BCC8B7}" destId="{0FA1A818-29E7-4AE7-B9E3-16A714BE7301}" srcOrd="4" destOrd="0" parTransId="{C1935D26-112A-4B6A-9F79-52F5060E354E}" sibTransId="{458EF357-0C66-45E6-B593-FDA305690D30}"/>
+    <dgm:cxn modelId="{E2847747-F738-420E-9FEB-5B3AD534428E}" type="presOf" srcId="{40C12849-3284-4795-9D8B-45E5EE745579}" destId="{B4B8B659-5257-419F-A1AF-48E591352005}" srcOrd="0" destOrd="2" presId="urn:microsoft.com/office/officeart/2005/8/layout/list1"/>
+    <dgm:cxn modelId="{C36E5F4C-E0CC-433E-B7C0-CDB94D629BD5}" type="presOf" srcId="{56B63760-9AED-41CB-AF5F-16709E095FA1}" destId="{B124EB29-8B37-49D1-9DD8-474708A19D4E}" srcOrd="0" destOrd="0" presId="urn:microsoft.com/office/officeart/2005/8/layout/list1"/>
+    <dgm:cxn modelId="{F0A41573-8FA3-4471-955A-D3D84C2F9BC0}" type="presOf" srcId="{6A3C41A9-B46E-46AF-951D-41F55735CBE5}" destId="{44B76188-4E64-4727-B3F4-058BF77789BE}" srcOrd="0" destOrd="1" presId="urn:microsoft.com/office/officeart/2005/8/layout/list1"/>
     <dgm:cxn modelId="{FABA8753-1370-4BA1-881F-BC3110F31EA9}" srcId="{C9E2A478-C852-4720-B19A-FE0F39D4BF93}" destId="{58205C9B-0C64-4D62-AE92-5EC34C3CEB17}" srcOrd="4" destOrd="0" parTransId="{5A030048-E0F9-41AF-A83E-FDAC705CC9EB}" sibTransId="{2ED34CAA-E9F0-42BA-B6E6-6A054BC7DD15}"/>
-    <dgm:cxn modelId="{4FA9190F-34A9-4516-AC27-02788F22984A}" srcId="{C9E2A478-C852-4720-B19A-FE0F39D4BF93}" destId="{6A3C41A9-B46E-46AF-951D-41F55735CBE5}" srcOrd="1" destOrd="0" parTransId="{10675569-CB06-41DC-84A9-A85280C68296}" sibTransId="{2B4A1E5E-80C6-48FE-82A0-1E1434028DC5}"/>
-    <dgm:cxn modelId="{CE597A08-A76A-486D-9E62-E4931BBC8121}" type="presOf" srcId="{9952B64D-35B4-4A90-BA05-A54D96AD7E27}" destId="{84BB7DC1-D3BF-4C80-A517-DEC7A1AF01B4}" srcOrd="0" destOrd="1" presId="urn:microsoft.com/office/officeart/2005/8/layout/list1"/>
-    <dgm:cxn modelId="{6E0450FE-65CD-4A7C-A12A-E132E55941E5}" srcId="{73120122-2709-4182-AD76-02CC96BCC8B7}" destId="{00338487-4D0E-414E-A8EF-AA19ACA05632}" srcOrd="3" destOrd="0" parTransId="{62263282-4D3A-4A43-A238-48D96D3D0F74}" sibTransId="{1BD2C9FD-A85C-4BE5-8112-486F8A0C81A7}"/>
     <dgm:cxn modelId="{47AA7856-AB61-4146-A188-90B5131586E9}" srcId="{C9E2A478-C852-4720-B19A-FE0F39D4BF93}" destId="{BEBB5D8A-7B68-4D8A-8774-598CEFB0C4CC}" srcOrd="2" destOrd="0" parTransId="{BE45CA9C-435A-445F-A7E2-D09231820111}" sibTransId="{A88B506C-5C58-4135-B721-3683833CCC94}"/>
-    <dgm:cxn modelId="{08871435-646A-4877-8F60-6121A1F3FF15}" type="presOf" srcId="{58205C9B-0C64-4D62-AE92-5EC34C3CEB17}" destId="{44B76188-4E64-4727-B3F4-058BF77789BE}" srcOrd="0" destOrd="4" presId="urn:microsoft.com/office/officeart/2005/8/layout/list1"/>
-    <dgm:cxn modelId="{396050D9-7F0E-487D-9271-10266EABA623}" srcId="{56B63760-9AED-41CB-AF5F-16709E095FA1}" destId="{83288119-4301-43FF-A79E-DB5E09960B98}" srcOrd="0" destOrd="0" parTransId="{A74DF829-0524-4345-A0E3-4A03A240151B}" sibTransId="{8E376A16-7F12-4FC9-9F5C-1E5057B2F49F}"/>
+    <dgm:cxn modelId="{952AC476-1AB8-494E-B769-650BAA16DD9D}" srcId="{56B63760-9AED-41CB-AF5F-16709E095FA1}" destId="{40C12849-3284-4795-9D8B-45E5EE745579}" srcOrd="2" destOrd="0" parTransId="{5F6636DD-6095-4499-B7B4-CB3AB6BCF815}" sibTransId="{B1549B31-8FE5-4D22-8476-5AB990275C68}"/>
     <dgm:cxn modelId="{BF711958-E68E-4046-9A9D-A2F31459E182}" srcId="{2CE23626-8BE5-4BA6-9D01-EA8E82C6B013}" destId="{73120122-2709-4182-AD76-02CC96BCC8B7}" srcOrd="0" destOrd="0" parTransId="{F811D707-A518-4E15-BB40-FEA0F5A06D0B}" sibTransId="{AC32F9B7-2F73-4AFF-8CE5-6680D9EE2F8C}"/>
-    <dgm:cxn modelId="{47FE7720-117F-461C-9FAE-D78C402A5D1E}" type="presOf" srcId="{2CD2283B-BD0D-43A8-B0E7-896549D82BFF}" destId="{44B76188-4E64-4727-B3F4-058BF77789BE}" srcOrd="0" destOrd="3" presId="urn:microsoft.com/office/officeart/2005/8/layout/list1"/>
-    <dgm:cxn modelId="{E2847747-F738-420E-9FEB-5B3AD534428E}" type="presOf" srcId="{40C12849-3284-4795-9D8B-45E5EE745579}" destId="{B4B8B659-5257-419F-A1AF-48E591352005}" srcOrd="0" destOrd="2" presId="urn:microsoft.com/office/officeart/2005/8/layout/list1"/>
+    <dgm:cxn modelId="{90CB8C78-D632-4072-B51A-2B050EBC7DE7}" type="presOf" srcId="{AE3AD23A-2BBF-4805-BF13-55ECF2259953}" destId="{B4B8B659-5257-419F-A1AF-48E591352005}" srcOrd="0" destOrd="3" presId="urn:microsoft.com/office/officeart/2005/8/layout/list1"/>
+    <dgm:cxn modelId="{6D3BD27D-97BB-494C-A980-EEE567480C20}" srcId="{56B63760-9AED-41CB-AF5F-16709E095FA1}" destId="{AE3AD23A-2BBF-4805-BF13-55ECF2259953}" srcOrd="3" destOrd="0" parTransId="{081395F9-A8EE-482A-8CBD-14EAA51D9BB6}" sibTransId="{A30F1B3D-94CF-4AF6-8D22-F77574BCF8DC}"/>
+    <dgm:cxn modelId="{AE27B489-014D-45D0-A2F9-9383CB25DBB5}" srcId="{73120122-2709-4182-AD76-02CC96BCC8B7}" destId="{977813E2-34D5-4BD6-9755-458928DDE15D}" srcOrd="0" destOrd="0" parTransId="{08D75870-F450-43D3-83EF-8BD9BFCF2EF9}" sibTransId="{AEFD3197-55EF-4F04-B222-FC74CFFBFE21}"/>
+    <dgm:cxn modelId="{842CE58D-B180-4597-9224-391AF8EE72E8}" srcId="{C9E2A478-C852-4720-B19A-FE0F39D4BF93}" destId="{EB615255-7E15-4C2A-938D-746E1DA258EE}" srcOrd="0" destOrd="0" parTransId="{32A0C684-B5FA-479B-A7F8-C260F34301C1}" sibTransId="{AF7DD3A2-1F29-4B45-9CAD-268D46B7476A}"/>
     <dgm:cxn modelId="{9AC9A096-2A80-41DF-925F-5B529A9601A8}" type="presOf" srcId="{977813E2-34D5-4BD6-9755-458928DDE15D}" destId="{84BB7DC1-D3BF-4C80-A517-DEC7A1AF01B4}" srcOrd="0" destOrd="0" presId="urn:microsoft.com/office/officeart/2005/8/layout/list1"/>
-    <dgm:cxn modelId="{F0A41573-8FA3-4471-955A-D3D84C2F9BC0}" type="presOf" srcId="{6A3C41A9-B46E-46AF-951D-41F55735CBE5}" destId="{44B76188-4E64-4727-B3F4-058BF77789BE}" srcOrd="0" destOrd="1" presId="urn:microsoft.com/office/officeart/2005/8/layout/list1"/>
-    <dgm:cxn modelId="{E57511D6-6BD3-4FF7-BD8D-4C5DDD7B4505}" srcId="{2CE23626-8BE5-4BA6-9D01-EA8E82C6B013}" destId="{C9E2A478-C852-4720-B19A-FE0F39D4BF93}" srcOrd="1" destOrd="0" parTransId="{0529AFEE-184D-4BD0-A2FA-356A636D082C}" sibTransId="{2890695C-4AEC-4AA9-8F27-BB95647E5D5C}"/>
     <dgm:cxn modelId="{10FCB39D-8381-495C-872D-3C7F0D24655C}" type="presOf" srcId="{0FA1A818-29E7-4AE7-B9E3-16A714BE7301}" destId="{84BB7DC1-D3BF-4C80-A517-DEC7A1AF01B4}" srcOrd="0" destOrd="4" presId="urn:microsoft.com/office/officeart/2005/8/layout/list1"/>
-    <dgm:cxn modelId="{842CE58D-B180-4597-9224-391AF8EE72E8}" srcId="{C9E2A478-C852-4720-B19A-FE0F39D4BF93}" destId="{EB615255-7E15-4C2A-938D-746E1DA258EE}" srcOrd="0" destOrd="0" parTransId="{32A0C684-B5FA-479B-A7F8-C260F34301C1}" sibTransId="{AF7DD3A2-1F29-4B45-9CAD-268D46B7476A}"/>
+    <dgm:cxn modelId="{1751A4A5-FF82-479A-814A-CFAD05015E06}" srcId="{C9E2A478-C852-4720-B19A-FE0F39D4BF93}" destId="{2CD2283B-BD0D-43A8-B0E7-896549D82BFF}" srcOrd="3" destOrd="0" parTransId="{92031695-9A86-443D-A230-7152A7F22CFF}" sibTransId="{D2BBEBD7-0B24-4DE7-B0F0-8E0039AAB29F}"/>
+    <dgm:cxn modelId="{E7DDB1C0-B090-43F9-B4F8-0B18FFED37D7}" type="presOf" srcId="{B588F6BE-15D2-44A8-A032-DF8DC821A52F}" destId="{B4B8B659-5257-419F-A1AF-48E591352005}" srcOrd="0" destOrd="4" presId="urn:microsoft.com/office/officeart/2005/8/layout/list1"/>
+    <dgm:cxn modelId="{C65409C1-3FCB-4E82-A859-E694BD371B34}" type="presOf" srcId="{C9E2A478-C852-4720-B19A-FE0F39D4BF93}" destId="{DF4D1FA9-EECA-47B6-8A69-0DF882AC6FE7}" srcOrd="1" destOrd="0" presId="urn:microsoft.com/office/officeart/2005/8/layout/list1"/>
     <dgm:cxn modelId="{1F81E2C3-30BA-4FD3-94F3-4A98FF1E8D2D}" type="presOf" srcId="{56B63760-9AED-41CB-AF5F-16709E095FA1}" destId="{CE53C9A7-556A-4734-8C46-F0613282E106}" srcOrd="1" destOrd="0" presId="urn:microsoft.com/office/officeart/2005/8/layout/list1"/>
     <dgm:cxn modelId="{863596CC-7DA0-4E16-807B-A6EC6FCF03F5}" type="presOf" srcId="{D2FB84C3-900D-4BCB-8167-6FCC2010A9E8}" destId="{B4B8B659-5257-419F-A1AF-48E591352005}" srcOrd="0" destOrd="1" presId="urn:microsoft.com/office/officeart/2005/8/layout/list1"/>
+    <dgm:cxn modelId="{622090CE-A6A2-4D71-A715-661205C2E7E9}" type="presOf" srcId="{C9E2A478-C852-4720-B19A-FE0F39D4BF93}" destId="{374EE56E-914E-4B35-BE9B-E25CE110FBF7}" srcOrd="0" destOrd="0" presId="urn:microsoft.com/office/officeart/2005/8/layout/list1"/>
+    <dgm:cxn modelId="{E57511D6-6BD3-4FF7-BD8D-4C5DDD7B4505}" srcId="{2CE23626-8BE5-4BA6-9D01-EA8E82C6B013}" destId="{C9E2A478-C852-4720-B19A-FE0F39D4BF93}" srcOrd="1" destOrd="0" parTransId="{0529AFEE-184D-4BD0-A2FA-356A636D082C}" sibTransId="{2890695C-4AEC-4AA9-8F27-BB95647E5D5C}"/>
+    <dgm:cxn modelId="{396050D9-7F0E-487D-9271-10266EABA623}" srcId="{56B63760-9AED-41CB-AF5F-16709E095FA1}" destId="{83288119-4301-43FF-A79E-DB5E09960B98}" srcOrd="0" destOrd="0" parTransId="{A74DF829-0524-4345-A0E3-4A03A240151B}" sibTransId="{8E376A16-7F12-4FC9-9F5C-1E5057B2F49F}"/>
     <dgm:cxn modelId="{30466ADB-416D-4E22-9552-681D84B43888}" type="presOf" srcId="{73120122-2709-4182-AD76-02CC96BCC8B7}" destId="{60DBA612-3706-4FD0-90E9-76F4BF841CBD}" srcOrd="1" destOrd="0" presId="urn:microsoft.com/office/officeart/2005/8/layout/list1"/>
-    <dgm:cxn modelId="{C65409C1-3FCB-4E82-A859-E694BD371B34}" type="presOf" srcId="{C9E2A478-C852-4720-B19A-FE0F39D4BF93}" destId="{DF4D1FA9-EECA-47B6-8A69-0DF882AC6FE7}" srcOrd="1" destOrd="0" presId="urn:microsoft.com/office/officeart/2005/8/layout/list1"/>
-    <dgm:cxn modelId="{6D3BD27D-97BB-494C-A980-EEE567480C20}" srcId="{56B63760-9AED-41CB-AF5F-16709E095FA1}" destId="{AE3AD23A-2BBF-4805-BF13-55ECF2259953}" srcOrd="3" destOrd="0" parTransId="{081395F9-A8EE-482A-8CBD-14EAA51D9BB6}" sibTransId="{A30F1B3D-94CF-4AF6-8D22-F77574BCF8DC}"/>
     <dgm:cxn modelId="{3DBEE6EE-187C-4C09-AD98-D067FF42E3FE}" srcId="{56B63760-9AED-41CB-AF5F-16709E095FA1}" destId="{B588F6BE-15D2-44A8-A032-DF8DC821A52F}" srcOrd="4" destOrd="0" parTransId="{35978181-B1D0-4994-8B17-7DC91A58BEBF}" sibTransId="{F4406C38-6810-467B-9D16-AE5C26297515}"/>
-    <dgm:cxn modelId="{CBB5BB37-3D91-4385-9F5A-63878D896069}" type="presOf" srcId="{CFDBA0D2-4657-46D4-9F65-3821319CD9F0}" destId="{84BB7DC1-D3BF-4C80-A517-DEC7A1AF01B4}" srcOrd="0" destOrd="2" presId="urn:microsoft.com/office/officeart/2005/8/layout/list1"/>
+    <dgm:cxn modelId="{BE196AF0-3EEF-4BD6-B1C9-AB02826778FB}" type="presOf" srcId="{EB615255-7E15-4C2A-938D-746E1DA258EE}" destId="{44B76188-4E64-4727-B3F4-058BF77789BE}" srcOrd="0" destOrd="0" presId="urn:microsoft.com/office/officeart/2005/8/layout/list1"/>
     <dgm:cxn modelId="{8567D0FC-7E7E-475C-84B2-D45DCAD85339}" type="presOf" srcId="{83288119-4301-43FF-A79E-DB5E09960B98}" destId="{B4B8B659-5257-419F-A1AF-48E591352005}" srcOrd="0" destOrd="0" presId="urn:microsoft.com/office/officeart/2005/8/layout/list1"/>
-    <dgm:cxn modelId="{622090CE-A6A2-4D71-A715-661205C2E7E9}" type="presOf" srcId="{C9E2A478-C852-4720-B19A-FE0F39D4BF93}" destId="{374EE56E-914E-4B35-BE9B-E25CE110FBF7}" srcOrd="0" destOrd="0" presId="urn:microsoft.com/office/officeart/2005/8/layout/list1"/>
-    <dgm:cxn modelId="{C36E5F4C-E0CC-433E-B7C0-CDB94D629BD5}" type="presOf" srcId="{56B63760-9AED-41CB-AF5F-16709E095FA1}" destId="{B124EB29-8B37-49D1-9DD8-474708A19D4E}" srcOrd="0" destOrd="0" presId="urn:microsoft.com/office/officeart/2005/8/layout/list1"/>
-    <dgm:cxn modelId="{EFFF8D0A-80E7-4D99-97E0-DC453DB8B810}" srcId="{2CE23626-8BE5-4BA6-9D01-EA8E82C6B013}" destId="{56B63760-9AED-41CB-AF5F-16709E095FA1}" srcOrd="2" destOrd="0" parTransId="{F99950AA-B95E-41C6-A478-ADAF2723D381}" sibTransId="{AA3C5196-9488-4662-ABE8-FB69D0D20286}"/>
-    <dgm:cxn modelId="{CF9DD111-A8D3-43B6-9071-1AC463F2CC02}" srcId="{73120122-2709-4182-AD76-02CC96BCC8B7}" destId="{9952B64D-35B4-4A90-BA05-A54D96AD7E27}" srcOrd="1" destOrd="0" parTransId="{476F3920-D8B2-4324-B611-5501B5F8F96D}" sibTransId="{EA4770B3-2DE0-4830-9B11-A1804E502B57}"/>
-    <dgm:cxn modelId="{4A54FD62-624E-4F59-813A-E850D120B62E}" srcId="{73120122-2709-4182-AD76-02CC96BCC8B7}" destId="{CFDBA0D2-4657-46D4-9F65-3821319CD9F0}" srcOrd="2" destOrd="0" parTransId="{D06F649A-AF9E-4B10-AC32-29BBF33149DA}" sibTransId="{88138875-2E86-4032-A4BB-4C9CB0DF3AF8}"/>
-    <dgm:cxn modelId="{475CFE42-1C4C-4D06-8737-EB541F27F87B}" srcId="{73120122-2709-4182-AD76-02CC96BCC8B7}" destId="{0FA1A818-29E7-4AE7-B9E3-16A714BE7301}" srcOrd="4" destOrd="0" parTransId="{C1935D26-112A-4B6A-9F79-52F5060E354E}" sibTransId="{458EF357-0C66-45E6-B593-FDA305690D30}"/>
-    <dgm:cxn modelId="{90CB8C78-D632-4072-B51A-2B050EBC7DE7}" type="presOf" srcId="{AE3AD23A-2BBF-4805-BF13-55ECF2259953}" destId="{B4B8B659-5257-419F-A1AF-48E591352005}" srcOrd="0" destOrd="3" presId="urn:microsoft.com/office/officeart/2005/8/layout/list1"/>
-    <dgm:cxn modelId="{AE27B489-014D-45D0-A2F9-9383CB25DBB5}" srcId="{73120122-2709-4182-AD76-02CC96BCC8B7}" destId="{977813E2-34D5-4BD6-9755-458928DDE15D}" srcOrd="0" destOrd="0" parTransId="{08D75870-F450-43D3-83EF-8BD9BFCF2EF9}" sibTransId="{AEFD3197-55EF-4F04-B222-FC74CFFBFE21}"/>
-    <dgm:cxn modelId="{EBCC0436-08C5-47E3-882B-78E105DB9823}" type="presOf" srcId="{2CE23626-8BE5-4BA6-9D01-EA8E82C6B013}" destId="{B3DD2D3B-CEA1-48C6-8AED-235085E3721A}" srcOrd="0" destOrd="0" presId="urn:microsoft.com/office/officeart/2005/8/layout/list1"/>
-    <dgm:cxn modelId="{D4F64711-EAE7-4B56-A41F-41D6BD02D322}" type="presOf" srcId="{00338487-4D0E-414E-A8EF-AA19ACA05632}" destId="{84BB7DC1-D3BF-4C80-A517-DEC7A1AF01B4}" srcOrd="0" destOrd="3" presId="urn:microsoft.com/office/officeart/2005/8/layout/list1"/>
-    <dgm:cxn modelId="{BE196AF0-3EEF-4BD6-B1C9-AB02826778FB}" type="presOf" srcId="{EB615255-7E15-4C2A-938D-746E1DA258EE}" destId="{44B76188-4E64-4727-B3F4-058BF77789BE}" srcOrd="0" destOrd="0" presId="urn:microsoft.com/office/officeart/2005/8/layout/list1"/>
-    <dgm:cxn modelId="{0D7AD35C-1BB4-46B7-961F-D52DD8F76401}" srcId="{56B63760-9AED-41CB-AF5F-16709E095FA1}" destId="{D2FB84C3-900D-4BCB-8167-6FCC2010A9E8}" srcOrd="1" destOrd="0" parTransId="{A1F87C9F-2C62-4DC8-A563-47D5664DFEB6}" sibTransId="{5AD7492D-D0C8-4256-90F4-3BBC9B5F5D1A}"/>
-    <dgm:cxn modelId="{952AC476-1AB8-494E-B769-650BAA16DD9D}" srcId="{56B63760-9AED-41CB-AF5F-16709E095FA1}" destId="{40C12849-3284-4795-9D8B-45E5EE745579}" srcOrd="2" destOrd="0" parTransId="{5F6636DD-6095-4499-B7B4-CB3AB6BCF815}" sibTransId="{B1549B31-8FE5-4D22-8476-5AB990275C68}"/>
-    <dgm:cxn modelId="{1751A4A5-FF82-479A-814A-CFAD05015E06}" srcId="{C9E2A478-C852-4720-B19A-FE0F39D4BF93}" destId="{2CD2283B-BD0D-43A8-B0E7-896549D82BFF}" srcOrd="3" destOrd="0" parTransId="{92031695-9A86-443D-A230-7152A7F22CFF}" sibTransId="{D2BBEBD7-0B24-4DE7-B0F0-8E0039AAB29F}"/>
-    <dgm:cxn modelId="{E7DDB1C0-B090-43F9-B4F8-0B18FFED37D7}" type="presOf" srcId="{B588F6BE-15D2-44A8-A032-DF8DC821A52F}" destId="{B4B8B659-5257-419F-A1AF-48E591352005}" srcOrd="0" destOrd="4" presId="urn:microsoft.com/office/officeart/2005/8/layout/list1"/>
-    <dgm:cxn modelId="{6B998D30-1F78-4B15-8652-EF7AEB8E758D}" type="presOf" srcId="{73120122-2709-4182-AD76-02CC96BCC8B7}" destId="{EC087E7B-F812-4F0C-BED4-586E26DAA13E}" srcOrd="0" destOrd="0" presId="urn:microsoft.com/office/officeart/2005/8/layout/list1"/>
-    <dgm:cxn modelId="{3F93B414-05AB-411C-B14C-239B98A1B5D6}" type="presOf" srcId="{BEBB5D8A-7B68-4D8A-8774-598CEFB0C4CC}" destId="{44B76188-4E64-4727-B3F4-058BF77789BE}" srcOrd="0" destOrd="2" presId="urn:microsoft.com/office/officeart/2005/8/layout/list1"/>
+    <dgm:cxn modelId="{6E0450FE-65CD-4A7C-A12A-E132E55941E5}" srcId="{73120122-2709-4182-AD76-02CC96BCC8B7}" destId="{00338487-4D0E-414E-A8EF-AA19ACA05632}" srcOrd="3" destOrd="0" parTransId="{62263282-4D3A-4A43-A238-48D96D3D0F74}" sibTransId="{1BD2C9FD-A85C-4BE5-8112-486F8A0C81A7}"/>
     <dgm:cxn modelId="{386A7A5E-E08E-46D2-8DB0-1B2D28D8F417}" type="presParOf" srcId="{B3DD2D3B-CEA1-48C6-8AED-235085E3721A}" destId="{BFB4EAF4-F10B-4D60-801C-4408944E851F}" srcOrd="0" destOrd="0" presId="urn:microsoft.com/office/officeart/2005/8/layout/list1"/>
     <dgm:cxn modelId="{B80B5244-179C-484E-8CCE-47B2F7D99745}" type="presParOf" srcId="{BFB4EAF4-F10B-4D60-801C-4408944E851F}" destId="{EC087E7B-F812-4F0C-BED4-586E26DAA13E}" srcOrd="0" destOrd="0" presId="urn:microsoft.com/office/officeart/2005/8/layout/list1"/>
     <dgm:cxn modelId="{26864C14-64CD-47D9-9A8C-3E5C463AB4FF}" type="presParOf" srcId="{BFB4EAF4-F10B-4D60-801C-4408944E851F}" destId="{60DBA612-3706-4FD0-90E9-76F4BF841CBD}" srcOrd="1" destOrd="0" presId="urn:microsoft.com/office/officeart/2005/8/layout/list1"/>
@@ -1837,8 +1747,8 @@
       </dsp:nvSpPr>
       <dsp:spPr>
         <a:xfrm>
-          <a:off x="0" y="251566"/>
-          <a:ext cx="7583423" cy="1864800"/>
+          <a:off x="0" y="309268"/>
+          <a:ext cx="7583423" cy="1732500"/>
         </a:xfrm>
         <a:prstGeom prst="rect">
           <a:avLst/>
@@ -1878,12 +1788,12 @@
         <a:fontRef idx="minor"/>
       </dsp:style>
       <dsp:txBody>
-        <a:bodyPr spcFirstLastPara="0" vert="horz" wrap="square" lIns="588558" tIns="333248" rIns="588558" bIns="113792" numCol="1" spcCol="1270" anchor="t" anchorCtr="0">
+        <a:bodyPr spcFirstLastPara="0" vert="horz" wrap="square" lIns="588558" tIns="229108" rIns="588558" bIns="78232" numCol="1" spcCol="1270" anchor="t" anchorCtr="0">
           <a:noAutofit/>
         </a:bodyPr>
         <a:lstStyle/>
         <a:p>
-          <a:pPr marL="171450" lvl="1" indent="-171450" algn="l" defTabSz="711200">
+          <a:pPr marL="57150" lvl="1" indent="-57150" algn="l" defTabSz="488950">
             <a:lnSpc>
               <a:spcPct val="90000"/>
             </a:lnSpc>
@@ -1893,15 +1803,15 @@
             <a:spcAft>
               <a:spcPct val="15000"/>
             </a:spcAft>
-            <a:buChar char="••"/>
+            <a:buChar char="•"/>
           </a:pPr>
           <a:r>
-            <a:rPr lang="es-ES" sz="1600" kern="1200" dirty="0"/>
-            <a:t>Modelo: Plazas.</a:t>
+            <a:rPr lang="es-ES" sz="1100" kern="1200" dirty="0"/>
+            <a:t>Modelo: Plazas y Tickets.</a:t>
           </a:r>
         </a:p>
         <a:p>
-          <a:pPr marL="171450" lvl="1" indent="-171450" algn="l" defTabSz="711200">
+          <a:pPr marL="57150" lvl="1" indent="-57150" algn="l" defTabSz="488950">
             <a:lnSpc>
               <a:spcPct val="90000"/>
             </a:lnSpc>
@@ -1911,15 +1821,15 @@
             <a:spcAft>
               <a:spcPct val="15000"/>
             </a:spcAft>
-            <a:buChar char="••"/>
+            <a:buChar char="•"/>
           </a:pPr>
           <a:r>
-            <a:rPr lang="es-ES" sz="1600" kern="1200" dirty="0"/>
+            <a:rPr lang="es-ES" sz="1100" kern="1200" dirty="0"/>
             <a:t>Vistas: Generar ticket y mapa del parking (en su caso).</a:t>
           </a:r>
         </a:p>
         <a:p>
-          <a:pPr marL="171450" lvl="1" indent="-171450" algn="l" defTabSz="711200">
+          <a:pPr marL="57150" lvl="1" indent="-57150" algn="l" defTabSz="488950">
             <a:lnSpc>
               <a:spcPct val="90000"/>
             </a:lnSpc>
@@ -1929,15 +1839,15 @@
             <a:spcAft>
               <a:spcPct val="15000"/>
             </a:spcAft>
-            <a:buChar char="••"/>
+            <a:buChar char="•"/>
           </a:pPr>
           <a:r>
-            <a:rPr lang="es-ES" sz="1600" kern="1200" dirty="0"/>
+            <a:rPr lang="es-ES" sz="1100" kern="1200" dirty="0"/>
             <a:t>Servicios: Aparcar y entregar.</a:t>
           </a:r>
         </a:p>
         <a:p>
-          <a:pPr marL="171450" lvl="1" indent="-171450" algn="l" defTabSz="711200">
+          <a:pPr marL="57150" lvl="1" indent="-57150" algn="l" defTabSz="488950">
             <a:lnSpc>
               <a:spcPct val="90000"/>
             </a:lnSpc>
@@ -1947,15 +1857,15 @@
             <a:spcAft>
               <a:spcPct val="15000"/>
             </a:spcAft>
-            <a:buChar char="••"/>
+            <a:buChar char="•"/>
           </a:pPr>
           <a:r>
-            <a:rPr lang="es-ES" sz="1600" kern="1200" dirty="0"/>
-            <a:t>Repositorios: Plazas y Vehículos.</a:t>
+            <a:rPr lang="es-ES" sz="1100" kern="1200" dirty="0"/>
+            <a:t>Repositorios: Plazas, Vehículos y Tickets.</a:t>
           </a:r>
         </a:p>
         <a:p>
-          <a:pPr marL="171450" lvl="1" indent="-171450" algn="l" defTabSz="711200">
+          <a:pPr marL="57150" lvl="1" indent="-57150" algn="l" defTabSz="488950">
             <a:lnSpc>
               <a:spcPct val="90000"/>
             </a:lnSpc>
@@ -1965,22 +1875,17 @@
             <a:spcAft>
               <a:spcPct val="15000"/>
             </a:spcAft>
-            <a:buChar char="••"/>
+            <a:buChar char="•"/>
           </a:pPr>
           <a:r>
-            <a:rPr lang="es-ES" sz="1600" kern="1200" dirty="0"/>
-            <a:t>Controladores: </a:t>
+            <a:rPr lang="es-ES" sz="1100" kern="1200" dirty="0"/>
+            <a:t>Controladores: Llamar a la vistas y controla las entradas y salidas por consola.</a:t>
           </a:r>
-          <a:r>
-            <a:rPr lang="es-ES" sz="1600" kern="1200" dirty="0" smtClean="0"/>
-            <a:t>Llamar a la vistas y controla las entradas y salidas por consola.</a:t>
-          </a:r>
-          <a:endParaRPr lang="es-ES" sz="1600" kern="1200" dirty="0"/>
         </a:p>
       </dsp:txBody>
       <dsp:txXfrm>
-        <a:off x="0" y="251566"/>
-        <a:ext cx="7583423" cy="1864800"/>
+        <a:off x="0" y="309268"/>
+        <a:ext cx="7583423" cy="1732500"/>
       </dsp:txXfrm>
     </dsp:sp>
     <dsp:sp modelId="{60DBA612-3706-4FD0-90E9-76F4BF841CBD}">
@@ -1990,8 +1895,8 @@
       </dsp:nvSpPr>
       <dsp:spPr>
         <a:xfrm>
-          <a:off x="379171" y="5652"/>
-          <a:ext cx="5308396" cy="472320"/>
+          <a:off x="379171" y="140202"/>
+          <a:ext cx="5308396" cy="324720"/>
         </a:xfrm>
         <a:prstGeom prst="roundRect">
           <a:avLst/>
@@ -2037,7 +1942,7 @@
         </a:bodyPr>
         <a:lstStyle/>
         <a:p>
-          <a:pPr lvl="0" algn="l" defTabSz="711200">
+          <a:pPr marL="0" lvl="0" indent="0" algn="l" defTabSz="488950">
             <a:lnSpc>
               <a:spcPct val="90000"/>
             </a:lnSpc>
@@ -2047,16 +1952,17 @@
             <a:spcAft>
               <a:spcPct val="35000"/>
             </a:spcAft>
+            <a:buNone/>
           </a:pPr>
           <a:r>
-            <a:rPr lang="es-ES" sz="1600" kern="1200" dirty="0"/>
+            <a:rPr lang="es-ES" sz="1100" kern="1200" dirty="0"/>
             <a:t>Parking</a:t>
           </a:r>
         </a:p>
       </dsp:txBody>
       <dsp:txXfrm>
-        <a:off x="402228" y="28709"/>
-        <a:ext cx="5262282" cy="426206"/>
+        <a:off x="395023" y="156054"/>
+        <a:ext cx="5276692" cy="293016"/>
       </dsp:txXfrm>
     </dsp:sp>
     <dsp:sp modelId="{44B76188-4E64-4727-B3F4-058BF77789BE}">
@@ -2066,8 +1972,8 @@
       </dsp:nvSpPr>
       <dsp:spPr>
         <a:xfrm>
-          <a:off x="0" y="2429172"/>
-          <a:ext cx="7583423" cy="1663200"/>
+          <a:off x="0" y="2256822"/>
+          <a:ext cx="7583423" cy="1732500"/>
         </a:xfrm>
         <a:prstGeom prst="rect">
           <a:avLst/>
@@ -2107,12 +2013,12 @@
         <a:fontRef idx="minor"/>
       </dsp:style>
       <dsp:txBody>
-        <a:bodyPr spcFirstLastPara="0" vert="horz" wrap="square" lIns="588558" tIns="333248" rIns="588558" bIns="113792" numCol="1" spcCol="1270" anchor="t" anchorCtr="0">
+        <a:bodyPr spcFirstLastPara="0" vert="horz" wrap="square" lIns="588558" tIns="229108" rIns="588558" bIns="78232" numCol="1" spcCol="1270" anchor="t" anchorCtr="0">
           <a:noAutofit/>
         </a:bodyPr>
         <a:lstStyle/>
         <a:p>
-          <a:pPr marL="171450" lvl="1" indent="-171450" algn="l" defTabSz="711200">
+          <a:pPr marL="57150" lvl="1" indent="-57150" algn="l" defTabSz="488950">
             <a:lnSpc>
               <a:spcPct val="90000"/>
             </a:lnSpc>
@@ -2122,15 +2028,15 @@
             <a:spcAft>
               <a:spcPct val="15000"/>
             </a:spcAft>
-            <a:buChar char="••"/>
+            <a:buChar char="•"/>
           </a:pPr>
           <a:r>
-            <a:rPr lang="es-ES" sz="1600" kern="1200" dirty="0"/>
+            <a:rPr lang="es-ES" sz="1100" kern="1200" dirty="0"/>
             <a:t>Modelo: Administrador y Abonos.</a:t>
           </a:r>
         </a:p>
         <a:p>
-          <a:pPr marL="171450" lvl="1" indent="-171450" algn="l" defTabSz="711200">
+          <a:pPr marL="57150" lvl="1" indent="-57150" algn="l" defTabSz="488950">
             <a:lnSpc>
               <a:spcPct val="90000"/>
             </a:lnSpc>
@@ -2140,15 +2046,15 @@
             <a:spcAft>
               <a:spcPct val="15000"/>
             </a:spcAft>
-            <a:buChar char="••"/>
+            <a:buChar char="•"/>
           </a:pPr>
           <a:r>
-            <a:rPr lang="es-ES" sz="1600" kern="1200" dirty="0"/>
+            <a:rPr lang="es-ES" sz="1100" kern="1200" dirty="0"/>
             <a:t>Vistas: Navegación del administrador.</a:t>
           </a:r>
         </a:p>
         <a:p>
-          <a:pPr marL="171450" lvl="1" indent="-171450" algn="l" defTabSz="711200">
+          <a:pPr marL="57150" lvl="1" indent="-57150" algn="l" defTabSz="488950">
             <a:lnSpc>
               <a:spcPct val="90000"/>
             </a:lnSpc>
@@ -2158,15 +2064,15 @@
             <a:spcAft>
               <a:spcPct val="15000"/>
             </a:spcAft>
-            <a:buChar char="••"/>
+            <a:buChar char="•"/>
           </a:pPr>
           <a:r>
-            <a:rPr lang="es-ES" sz="1600" kern="1200" dirty="0"/>
+            <a:rPr lang="es-ES" sz="1100" kern="1200" dirty="0"/>
             <a:t>Servicios: Consultar estado del parking, facturación y abonados.  </a:t>
           </a:r>
         </a:p>
         <a:p>
-          <a:pPr marL="171450" lvl="1" indent="-171450" algn="l" defTabSz="711200">
+          <a:pPr marL="57150" lvl="1" indent="-57150" algn="l" defTabSz="488950">
             <a:lnSpc>
               <a:spcPct val="90000"/>
             </a:lnSpc>
@@ -2176,20 +2082,15 @@
             <a:spcAft>
               <a:spcPct val="15000"/>
             </a:spcAft>
-            <a:buChar char="••"/>
+            <a:buChar char="•"/>
           </a:pPr>
           <a:r>
-            <a:rPr lang="es-ES" sz="1600" kern="1200" dirty="0"/>
-            <a:t>Repositorios: Administrador y </a:t>
+            <a:rPr lang="es-ES" sz="1100" kern="1200" dirty="0"/>
+            <a:t>Repositorios: Administrador y Abonos.</a:t>
           </a:r>
-          <a:r>
-            <a:rPr lang="es-ES" sz="1600" kern="1200" dirty="0" smtClean="0"/>
-            <a:t>Abonos.</a:t>
-          </a:r>
-          <a:endParaRPr lang="es-ES" sz="1600" kern="1200" dirty="0"/>
         </a:p>
         <a:p>
-          <a:pPr marL="171450" lvl="1" indent="-171450" algn="l" defTabSz="711200">
+          <a:pPr marL="57150" lvl="1" indent="-57150" algn="l" defTabSz="488950">
             <a:lnSpc>
               <a:spcPct val="90000"/>
             </a:lnSpc>
@@ -2199,22 +2100,17 @@
             <a:spcAft>
               <a:spcPct val="15000"/>
             </a:spcAft>
-            <a:buChar char="••"/>
+            <a:buChar char="•"/>
           </a:pPr>
           <a:r>
-            <a:rPr lang="es-ES" sz="1600" kern="1200" dirty="0"/>
-            <a:t>Controladores: </a:t>
+            <a:rPr lang="es-ES" sz="1100" kern="1200" dirty="0"/>
+            <a:t>Controladores: - </a:t>
           </a:r>
-          <a:r>
-            <a:rPr lang="es-ES" sz="1600" kern="1200" dirty="0" smtClean="0"/>
-            <a:t>- </a:t>
-          </a:r>
-          <a:endParaRPr lang="es-ES" sz="1600" kern="1200" dirty="0"/>
         </a:p>
       </dsp:txBody>
       <dsp:txXfrm>
-        <a:off x="0" y="2429172"/>
-        <a:ext cx="7583423" cy="1663200"/>
+        <a:off x="0" y="2256822"/>
+        <a:ext cx="7583423" cy="1732500"/>
       </dsp:txXfrm>
     </dsp:sp>
     <dsp:sp modelId="{DF4D1FA9-EECA-47B6-8A69-0DF882AC6FE7}">
@@ -2224,8 +2120,8 @@
       </dsp:nvSpPr>
       <dsp:spPr>
         <a:xfrm>
-          <a:off x="379171" y="2193012"/>
-          <a:ext cx="5308396" cy="472320"/>
+          <a:off x="379171" y="2094462"/>
+          <a:ext cx="5308396" cy="324720"/>
         </a:xfrm>
         <a:prstGeom prst="roundRect">
           <a:avLst/>
@@ -2271,7 +2167,7 @@
         </a:bodyPr>
         <a:lstStyle/>
         <a:p>
-          <a:pPr lvl="0" algn="l" defTabSz="711200">
+          <a:pPr marL="0" lvl="0" indent="0" algn="l" defTabSz="488950">
             <a:lnSpc>
               <a:spcPct val="90000"/>
             </a:lnSpc>
@@ -2281,16 +2177,17 @@
             <a:spcAft>
               <a:spcPct val="35000"/>
             </a:spcAft>
+            <a:buNone/>
           </a:pPr>
           <a:r>
-            <a:rPr lang="es-ES" sz="1600" kern="1200" dirty="0"/>
+            <a:rPr lang="es-ES" sz="1100" kern="1200" dirty="0"/>
             <a:t>Administrador</a:t>
           </a:r>
         </a:p>
       </dsp:txBody>
       <dsp:txXfrm>
-        <a:off x="402228" y="2216069"/>
-        <a:ext cx="5262282" cy="426206"/>
+        <a:off x="395023" y="2110314"/>
+        <a:ext cx="5276692" cy="293016"/>
       </dsp:txXfrm>
     </dsp:sp>
     <dsp:sp modelId="{B4B8B659-5257-419F-A1AF-48E591352005}">
@@ -2300,8 +2197,8 @@
       </dsp:nvSpPr>
       <dsp:spPr>
         <a:xfrm>
-          <a:off x="0" y="4414932"/>
-          <a:ext cx="7583423" cy="1663200"/>
+          <a:off x="0" y="4211082"/>
+          <a:ext cx="7583423" cy="1732500"/>
         </a:xfrm>
         <a:prstGeom prst="rect">
           <a:avLst/>
@@ -2341,12 +2238,12 @@
         <a:fontRef idx="minor"/>
       </dsp:style>
       <dsp:txBody>
-        <a:bodyPr spcFirstLastPara="0" vert="horz" wrap="square" lIns="588558" tIns="333248" rIns="588558" bIns="113792" numCol="1" spcCol="1270" anchor="t" anchorCtr="0">
+        <a:bodyPr spcFirstLastPara="0" vert="horz" wrap="square" lIns="588558" tIns="229108" rIns="588558" bIns="78232" numCol="1" spcCol="1270" anchor="t" anchorCtr="0">
           <a:noAutofit/>
         </a:bodyPr>
         <a:lstStyle/>
         <a:p>
-          <a:pPr marL="171450" lvl="1" indent="-171450" algn="l" defTabSz="711200">
+          <a:pPr marL="57150" lvl="1" indent="-57150" algn="l" defTabSz="488950">
             <a:lnSpc>
               <a:spcPct val="90000"/>
             </a:lnSpc>
@@ -2356,15 +2253,15 @@
             <a:spcAft>
               <a:spcPct val="15000"/>
             </a:spcAft>
-            <a:buChar char="••"/>
+            <a:buChar char="•"/>
           </a:pPr>
           <a:r>
-            <a:rPr lang="es-ES" sz="1600" kern="1200" dirty="0"/>
+            <a:rPr lang="es-ES" sz="1100" kern="1200" dirty="0"/>
             <a:t>Modelo: Cliente y Vehículo.</a:t>
           </a:r>
         </a:p>
         <a:p>
-          <a:pPr marL="171450" lvl="1" indent="-171450" algn="l" defTabSz="711200">
+          <a:pPr marL="57150" lvl="1" indent="-57150" algn="l" defTabSz="488950">
             <a:lnSpc>
               <a:spcPct val="90000"/>
             </a:lnSpc>
@@ -2374,15 +2271,15 @@
             <a:spcAft>
               <a:spcPct val="15000"/>
             </a:spcAft>
-            <a:buChar char="••"/>
+            <a:buChar char="•"/>
           </a:pPr>
           <a:r>
-            <a:rPr lang="es-ES" sz="1600" kern="1200" dirty="0"/>
+            <a:rPr lang="es-ES" sz="1100" kern="1200" dirty="0"/>
             <a:t>Vistas: Navegación del cliente.</a:t>
           </a:r>
         </a:p>
         <a:p>
-          <a:pPr marL="171450" lvl="1" indent="-171450" algn="l" defTabSz="711200">
+          <a:pPr marL="57150" lvl="1" indent="-57150" algn="l" defTabSz="488950">
             <a:lnSpc>
               <a:spcPct val="90000"/>
             </a:lnSpc>
@@ -2392,15 +2289,15 @@
             <a:spcAft>
               <a:spcPct val="15000"/>
             </a:spcAft>
-            <a:buChar char="••"/>
+            <a:buChar char="•"/>
           </a:pPr>
           <a:r>
-            <a:rPr lang="es-ES" sz="1600" kern="1200" dirty="0"/>
+            <a:rPr lang="es-ES" sz="1100" kern="1200" dirty="0"/>
             <a:t>Servicios: Depositar y retirar vehículos.</a:t>
           </a:r>
         </a:p>
         <a:p>
-          <a:pPr marL="171450" lvl="1" indent="-171450" algn="l" defTabSz="711200">
+          <a:pPr marL="57150" lvl="1" indent="-57150" algn="l" defTabSz="488950">
             <a:lnSpc>
               <a:spcPct val="90000"/>
             </a:lnSpc>
@@ -2410,15 +2307,15 @@
             <a:spcAft>
               <a:spcPct val="15000"/>
             </a:spcAft>
-            <a:buChar char="••"/>
+            <a:buChar char="•"/>
           </a:pPr>
           <a:r>
-            <a:rPr lang="es-ES" sz="1600" kern="1200" dirty="0"/>
+            <a:rPr lang="es-ES" sz="1100" kern="1200" dirty="0"/>
             <a:t>Repositorios: Clientes abonados y Vehículos de clientes abonados. </a:t>
           </a:r>
         </a:p>
         <a:p>
-          <a:pPr marL="171450" lvl="1" indent="-171450" algn="l" defTabSz="711200">
+          <a:pPr marL="57150" lvl="1" indent="-57150" algn="l" defTabSz="488950">
             <a:lnSpc>
               <a:spcPct val="90000"/>
             </a:lnSpc>
@@ -2428,22 +2325,17 @@
             <a:spcAft>
               <a:spcPct val="15000"/>
             </a:spcAft>
-            <a:buChar char="••"/>
+            <a:buChar char="•"/>
           </a:pPr>
           <a:r>
-            <a:rPr lang="es-ES" sz="1600" kern="1200" dirty="0"/>
-            <a:t>Controladores: </a:t>
+            <a:rPr lang="es-ES" sz="1100" kern="1200" dirty="0"/>
+            <a:t>Controladores: -</a:t>
           </a:r>
-          <a:r>
-            <a:rPr lang="es-ES" sz="1600" kern="1200" dirty="0" smtClean="0"/>
-            <a:t>-</a:t>
-          </a:r>
-          <a:endParaRPr lang="es-ES" sz="1600" kern="1200" dirty="0"/>
         </a:p>
       </dsp:txBody>
       <dsp:txXfrm>
-        <a:off x="0" y="4414932"/>
-        <a:ext cx="7583423" cy="1663200"/>
+        <a:off x="0" y="4211082"/>
+        <a:ext cx="7583423" cy="1732500"/>
       </dsp:txXfrm>
     </dsp:sp>
     <dsp:sp modelId="{CE53C9A7-556A-4734-8C46-F0613282E106}">
@@ -2453,8 +2345,8 @@
       </dsp:nvSpPr>
       <dsp:spPr>
         <a:xfrm>
-          <a:off x="379171" y="4178772"/>
-          <a:ext cx="5308396" cy="472320"/>
+          <a:off x="379171" y="4048722"/>
+          <a:ext cx="5308396" cy="324720"/>
         </a:xfrm>
         <a:prstGeom prst="roundRect">
           <a:avLst/>
@@ -2500,7 +2392,7 @@
         </a:bodyPr>
         <a:lstStyle/>
         <a:p>
-          <a:pPr lvl="0" algn="l" defTabSz="711200">
+          <a:pPr marL="0" lvl="0" indent="0" algn="l" defTabSz="488950">
             <a:lnSpc>
               <a:spcPct val="90000"/>
             </a:lnSpc>
@@ -2510,16 +2402,17 @@
             <a:spcAft>
               <a:spcPct val="35000"/>
             </a:spcAft>
+            <a:buNone/>
           </a:pPr>
           <a:r>
-            <a:rPr lang="es-ES" sz="1600" kern="1200" dirty="0"/>
+            <a:rPr lang="es-ES" sz="1100" kern="1200" dirty="0"/>
             <a:t>Cliente</a:t>
           </a:r>
         </a:p>
       </dsp:txBody>
       <dsp:txXfrm>
-        <a:off x="402228" y="4201829"/>
-        <a:ext cx="5262282" cy="426206"/>
+        <a:off x="395023" y="4064574"/>
+        <a:ext cx="5276692" cy="293016"/>
       </dsp:txXfrm>
     </dsp:sp>
   </dsp:spTree>
@@ -10264,7 +10157,7 @@
                 <a16:creationId xmlns:a16="http://schemas.microsoft.com/office/drawing/2014/main" id="{430127AE-B29E-4FDF-99D2-A2F1E7003F74}"/>
               </a:ext>
               <a:ext uri="{C183D7F6-B498-43B3-948B-1728B52AA6E4}">
-                <adec:decorative xmlns="" xmlns:adec="http://schemas.microsoft.com/office/drawing/2017/decorative" val="1"/>
+                <adec:decorative xmlns:adec="http://schemas.microsoft.com/office/drawing/2017/decorative" val="1"/>
               </a:ext>
             </a:extLst>
           </p:cNvPr>
@@ -10319,7 +10212,7 @@
                 <a16:creationId xmlns:a16="http://schemas.microsoft.com/office/drawing/2014/main" id="{3D5FBB81-B61B-416A-8F5D-A8DDF62530F1}"/>
               </a:ext>
               <a:ext uri="{C183D7F6-B498-43B3-948B-1728B52AA6E4}">
-                <adec:decorative xmlns="" xmlns:adec="http://schemas.microsoft.com/office/drawing/2017/decorative" val="1"/>
+                <adec:decorative xmlns:adec="http://schemas.microsoft.com/office/drawing/2017/decorative" val="1"/>
               </a:ext>
             </a:extLst>
           </p:cNvPr>
@@ -10476,7 +10369,7 @@
                 <a16:creationId xmlns:a16="http://schemas.microsoft.com/office/drawing/2014/main" id="{40C0D7D4-D83D-4C58-87D1-955F0A9173D7}"/>
               </a:ext>
               <a:ext uri="{C183D7F6-B498-43B3-948B-1728B52AA6E4}">
-                <adec:decorative xmlns="" xmlns:adec="http://schemas.microsoft.com/office/drawing/2017/decorative" val="1"/>
+                <adec:decorative xmlns:adec="http://schemas.microsoft.com/office/drawing/2017/decorative" val="1"/>
               </a:ext>
             </a:extLst>
           </p:cNvPr>
@@ -10653,7 +10546,7 @@
                 <a16:creationId xmlns:a16="http://schemas.microsoft.com/office/drawing/2014/main" id="{0BA56A81-C9DD-4EBA-9E13-32FFB51CFD45}"/>
               </a:ext>
               <a:ext uri="{C183D7F6-B498-43B3-948B-1728B52AA6E4}">
-                <adec:decorative xmlns="" xmlns:adec="http://schemas.microsoft.com/office/drawing/2017/decorative" val="1"/>
+                <adec:decorative xmlns:adec="http://schemas.microsoft.com/office/drawing/2017/decorative" val="1"/>
               </a:ext>
             </a:extLst>
           </p:cNvPr>
@@ -10825,7 +10718,7 @@
                 <a16:creationId xmlns:a16="http://schemas.microsoft.com/office/drawing/2014/main" id="{15F9A324-404E-4C5D-AFF0-C5D0D84182B0}"/>
               </a:ext>
               <a:ext uri="{C183D7F6-B498-43B3-948B-1728B52AA6E4}">
-                <adec:decorative xmlns="" xmlns:adec="http://schemas.microsoft.com/office/drawing/2017/decorative" val="1"/>
+                <adec:decorative xmlns:adec="http://schemas.microsoft.com/office/drawing/2017/decorative" val="1"/>
               </a:ext>
             </a:extLst>
           </p:cNvPr>
@@ -11043,7 +10936,7 @@
           <p:nvPr>
             <p:extLst>
               <p:ext uri="{D42A27DB-BD31-4B8C-83A1-F6EECF244321}">
-                <p14:modId xmlns:p14="http://schemas.microsoft.com/office/powerpoint/2010/main" val="20509700"/>
+                <p14:modId xmlns:p14="http://schemas.microsoft.com/office/powerpoint/2010/main" val="643765366"/>
               </p:ext>
             </p:extLst>
           </p:nvPr>
@@ -11104,10 +10997,9 @@
           <a:lstStyle/>
           <a:p>
             <a:r>
-              <a:rPr lang="es-ES" dirty="0" smtClean="0"/>
+              <a:rPr lang="es-ES" dirty="0"/>
               <a:t>Sugerencias Carlos</a:t>
             </a:r>
-            <a:endParaRPr lang="es-ES" dirty="0"/>
           </a:p>
         </p:txBody>
       </p:sp>
@@ -11127,32 +11019,23 @@
           <a:lstStyle/>
           <a:p>
             <a:r>
-              <a:rPr lang="es-ES" smtClean="0"/>
+              <a:rPr lang="es-ES"/>
               <a:t>Métodos </a:t>
             </a:r>
             <a:r>
-              <a:rPr lang="es-ES" dirty="0" err="1" smtClean="0"/>
+              <a:rPr lang="es-ES" dirty="0" err="1"/>
               <a:t>Crud</a:t>
             </a:r>
             <a:r>
-              <a:rPr lang="es-ES" dirty="0" smtClean="0"/>
-              <a:t> en Repositorio y los métodos CRUD de repositorio se llaman desde métodos de Servicio, por el tema del </a:t>
-            </a:r>
-            <a:r>
               <a:rPr lang="es-ES" dirty="0"/>
-              <a:t>e</a:t>
-            </a:r>
-            <a:r>
-              <a:rPr lang="es-ES" dirty="0" smtClean="0"/>
-              <a:t>ncapsulamiento.</a:t>
+              <a:t> en Repositorio y los métodos CRUD de repositorio se llaman desde métodos de Servicio, por el tema del encapsulamiento.</a:t>
             </a:r>
           </a:p>
           <a:p>
             <a:r>
-              <a:rPr lang="es-ES" dirty="0" smtClean="0"/>
+              <a:rPr lang="es-ES" dirty="0"/>
               <a:t>Controlador: métodos relacionados con la I/O de la consola (lectura y escritura). Además, se encargar de llamar a las vistas.</a:t>
             </a:r>
-            <a:endParaRPr lang="es-ES" dirty="0"/>
           </a:p>
         </p:txBody>
       </p:sp>

</xml_diff>

<commit_message>
Añadido menú ppal, generación de ticket, asignación de plaza a no abonados y mostrar al admin el estado de las plazas
</commit_message>
<xml_diff>
--- a/Estructura de ficheros.pptx
+++ b/Estructura de ficheros.pptx
@@ -1026,7 +1026,15 @@
         <a:p>
           <a:r>
             <a:rPr lang="es-ES" dirty="0"/>
-            <a:t>Modelo: Plazas y Tickets.</a:t>
+            <a:t>Modelo</a:t>
+          </a:r>
+          <a:r>
+            <a:rPr lang="es-ES"/>
+            <a:t>: Parking, Plazas </a:t>
+          </a:r>
+          <a:r>
+            <a:rPr lang="es-ES" dirty="0"/>
+            <a:t>y Tickets.</a:t>
           </a:r>
         </a:p>
       </dgm:t>
@@ -1807,7 +1815,15 @@
           </a:pPr>
           <a:r>
             <a:rPr lang="es-ES" sz="1100" kern="1200" dirty="0"/>
-            <a:t>Modelo: Plazas y Tickets.</a:t>
+            <a:t>Modelo</a:t>
+          </a:r>
+          <a:r>
+            <a:rPr lang="es-ES" sz="1100" kern="1200"/>
+            <a:t>: Parking, Plazas </a:t>
+          </a:r>
+          <a:r>
+            <a:rPr lang="es-ES" sz="1100" kern="1200" dirty="0"/>
+            <a:t>y Tickets.</a:t>
           </a:r>
         </a:p>
         <a:p>
@@ -3985,7 +4001,7 @@
           <a:p>
             <a:fld id="{12241623-A064-4BED-B073-BA4D61433402}" type="datetime1">
               <a:rPr lang="en-US" smtClean="0"/>
-              <a:t>11/11/2020</a:t>
+              <a:t>11/12/2020</a:t>
             </a:fld>
             <a:endParaRPr lang="en-US" dirty="0"/>
           </a:p>
@@ -4796,7 +4812,7 @@
           <a:p>
             <a:fld id="{6F86ED0C-1DA7-41F0-94CF-6218B1FEDFF1}" type="datetime1">
               <a:rPr lang="en-US" smtClean="0"/>
-              <a:t>11/11/2020</a:t>
+              <a:t>11/12/2020</a:t>
             </a:fld>
             <a:endParaRPr lang="en-US" dirty="0"/>
           </a:p>
@@ -4995,7 +5011,7 @@
           <a:p>
             <a:fld id="{EECF02AB-6034-4B88-BC5A-7C17CB0EF809}" type="datetime1">
               <a:rPr lang="en-US" smtClean="0"/>
-              <a:t>11/11/2020</a:t>
+              <a:t>11/12/2020</a:t>
             </a:fld>
             <a:endParaRPr lang="en-US" dirty="0"/>
           </a:p>
@@ -5230,7 +5246,7 @@
           <a:p>
             <a:fld id="{22F3E5F3-28EE-488F-BD53-B744C06C3DEC}" type="datetime1">
               <a:rPr lang="en-US" smtClean="0"/>
-              <a:t>11/11/2020</a:t>
+              <a:t>11/12/2020</a:t>
             </a:fld>
             <a:endParaRPr lang="en-US" dirty="0"/>
           </a:p>
@@ -7923,7 +7939,7 @@
           <a:p>
             <a:fld id="{E72EB70D-CD01-44DA-83B3-8FEB3383D307}" type="datetime1">
               <a:rPr lang="en-US" smtClean="0"/>
-              <a:t>11/11/2020</a:t>
+              <a:t>11/12/2020</a:t>
             </a:fld>
             <a:endParaRPr lang="en-US" dirty="0"/>
           </a:p>
@@ -8119,7 +8135,7 @@
           <a:p>
             <a:fld id="{D0158CFD-9357-46BE-A189-D637A67C8730}" type="datetime1">
               <a:rPr lang="en-US" smtClean="0"/>
-              <a:t>11/11/2020</a:t>
+              <a:t>11/12/2020</a:t>
             </a:fld>
             <a:endParaRPr lang="en-US" dirty="0"/>
           </a:p>
@@ -8508,7 +8524,7 @@
           <a:p>
             <a:fld id="{7B4742EE-B331-4632-BD10-A82FED6B6FC0}" type="datetime1">
               <a:rPr lang="en-US" smtClean="0"/>
-              <a:t>11/11/2020</a:t>
+              <a:t>11/12/2020</a:t>
             </a:fld>
             <a:endParaRPr lang="en-US" dirty="0"/>
           </a:p>
@@ -8674,7 +8690,7 @@
           <a:p>
             <a:fld id="{451BA835-D13F-49F4-8F11-5D576AC65FAD}" type="datetime1">
               <a:rPr lang="en-US" smtClean="0"/>
-              <a:t>11/11/2020</a:t>
+              <a:t>11/12/2020</a:t>
             </a:fld>
             <a:endParaRPr lang="en-US" dirty="0"/>
           </a:p>
@@ -8797,7 +8813,7 @@
           <a:p>
             <a:fld id="{ADBD1799-ACB5-4CB2-86A2-5C574F1C8706}" type="datetime1">
               <a:rPr lang="en-US" smtClean="0"/>
-              <a:t>11/11/2020</a:t>
+              <a:t>11/12/2020</a:t>
             </a:fld>
             <a:endParaRPr lang="en-US" dirty="0"/>
           </a:p>
@@ -9107,7 +9123,7 @@
           <a:p>
             <a:fld id="{ED5DD0D6-7A82-473E-879B-C6ECD6CCCFEC}" type="datetime1">
               <a:rPr lang="en-US" smtClean="0"/>
-              <a:t>11/11/2020</a:t>
+              <a:t>11/12/2020</a:t>
             </a:fld>
             <a:endParaRPr lang="en-US" dirty="0"/>
           </a:p>
@@ -9407,7 +9423,7 @@
           <a:p>
             <a:fld id="{D4605E03-BC17-41A7-854C-DFAB672737DC}" type="datetime1">
               <a:rPr lang="en-US" smtClean="0"/>
-              <a:t>11/11/2020</a:t>
+              <a:t>11/12/2020</a:t>
             </a:fld>
             <a:endParaRPr lang="en-US" dirty="0"/>
           </a:p>
@@ -9659,7 +9675,7 @@
           <a:p>
             <a:fld id="{C4408324-A84C-4A45-93B6-78D079CCE772}" type="datetime1">
               <a:rPr lang="en-US" smtClean="0"/>
-              <a:t>11/11/2020</a:t>
+              <a:t>11/12/2020</a:t>
             </a:fld>
             <a:endParaRPr lang="en-US" dirty="0"/>
           </a:p>
@@ -10936,7 +10952,7 @@
           <p:nvPr>
             <p:extLst>
               <p:ext uri="{D42A27DB-BD31-4B8C-83A1-F6EECF244321}">
-                <p14:modId xmlns:p14="http://schemas.microsoft.com/office/powerpoint/2010/main" val="643765366"/>
+                <p14:modId xmlns:p14="http://schemas.microsoft.com/office/powerpoint/2010/main" val="3195117136"/>
               </p:ext>
             </p:extLst>
           </p:nvPr>

</xml_diff>

<commit_message>
Actualizado la imagen de  estructura de ficheros para una mejor visión global del proyecto y eliminada una carpeta vacía innecesaria del proyecto.
</commit_message>
<xml_diff>
--- a/Estructura de ficheros.pptx
+++ b/Estructura de ficheros.pptx
@@ -1026,15 +1026,19 @@
         <a:p>
           <a:r>
             <a:rPr lang="es-ES" dirty="0"/>
-            <a:t>Modelo</a:t>
+            <a:t>Modelo: </a:t>
           </a:r>
           <a:r>
-            <a:rPr lang="es-ES"/>
-            <a:t>: Parking, Plazas </a:t>
+            <a:rPr lang="es-ES" b="0" dirty="0">
+              <a:solidFill>
+                <a:schemeClr val="tx1"/>
+              </a:solidFill>
+            </a:rPr>
+            <a:t>Parking</a:t>
           </a:r>
           <a:r>
             <a:rPr lang="es-ES" dirty="0"/>
-            <a:t>y Tickets.</a:t>
+            <a:t>, Plazas y Tickets.</a:t>
           </a:r>
         </a:p>
       </dgm:t>
@@ -1169,42 +1173,6 @@
         </a:p>
       </dgm:t>
     </dgm:pt>
-    <dgm:pt modelId="{0FA1A818-29E7-4AE7-B9E3-16A714BE7301}">
-      <dgm:prSet phldrT="[Texto]"/>
-      <dgm:spPr/>
-      <dgm:t>
-        <a:bodyPr/>
-        <a:lstStyle/>
-        <a:p>
-          <a:r>
-            <a:rPr lang="es-ES" dirty="0"/>
-            <a:t>Controladores: Llamar a la vistas y controla las entradas y salidas por consola.</a:t>
-          </a:r>
-        </a:p>
-      </dgm:t>
-    </dgm:pt>
-    <dgm:pt modelId="{C1935D26-112A-4B6A-9F79-52F5060E354E}" type="parTrans" cxnId="{475CFE42-1C4C-4D06-8737-EB541F27F87B}">
-      <dgm:prSet/>
-      <dgm:spPr/>
-      <dgm:t>
-        <a:bodyPr/>
-        <a:lstStyle/>
-        <a:p>
-          <a:endParaRPr lang="es-ES"/>
-        </a:p>
-      </dgm:t>
-    </dgm:pt>
-    <dgm:pt modelId="{458EF357-0C66-45E6-B593-FDA305690D30}" type="sibTrans" cxnId="{475CFE42-1C4C-4D06-8737-EB541F27F87B}">
-      <dgm:prSet/>
-      <dgm:spPr/>
-      <dgm:t>
-        <a:bodyPr/>
-        <a:lstStyle/>
-        <a:p>
-          <a:endParaRPr lang="es-ES"/>
-        </a:p>
-      </dgm:t>
-    </dgm:pt>
     <dgm:pt modelId="{EB615255-7E15-4C2A-938D-746E1DA258EE}">
       <dgm:prSet phldrT="[Texto]"/>
       <dgm:spPr/>
@@ -1286,7 +1254,7 @@
         <a:p>
           <a:r>
             <a:rPr lang="es-ES" dirty="0"/>
-            <a:t>Servicios: Consultar estado del parking, facturación y abonados.  </a:t>
+            <a:t>Servicios: Consultar estado del parking, facturación y gestión de abonados.  </a:t>
           </a:r>
         </a:p>
       </dgm:t>
@@ -1339,42 +1307,6 @@
       </dgm:t>
     </dgm:pt>
     <dgm:pt modelId="{D2BBEBD7-0B24-4DE7-B0F0-8E0039AAB29F}" type="sibTrans" cxnId="{1751A4A5-FF82-479A-814A-CFAD05015E06}">
-      <dgm:prSet/>
-      <dgm:spPr/>
-      <dgm:t>
-        <a:bodyPr/>
-        <a:lstStyle/>
-        <a:p>
-          <a:endParaRPr lang="es-ES"/>
-        </a:p>
-      </dgm:t>
-    </dgm:pt>
-    <dgm:pt modelId="{58205C9B-0C64-4D62-AE92-5EC34C3CEB17}">
-      <dgm:prSet phldrT="[Texto]"/>
-      <dgm:spPr/>
-      <dgm:t>
-        <a:bodyPr/>
-        <a:lstStyle/>
-        <a:p>
-          <a:r>
-            <a:rPr lang="es-ES" dirty="0"/>
-            <a:t>Controladores: - </a:t>
-          </a:r>
-        </a:p>
-      </dgm:t>
-    </dgm:pt>
-    <dgm:pt modelId="{5A030048-E0F9-41AF-A83E-FDAC705CC9EB}" type="parTrans" cxnId="{FABA8753-1370-4BA1-881F-BC3110F31EA9}">
-      <dgm:prSet/>
-      <dgm:spPr/>
-      <dgm:t>
-        <a:bodyPr/>
-        <a:lstStyle/>
-        <a:p>
-          <a:endParaRPr lang="es-ES"/>
-        </a:p>
-      </dgm:t>
-    </dgm:pt>
-    <dgm:pt modelId="{2ED34CAA-E9F0-42BA-B6E6-6A054BC7DD15}" type="sibTrans" cxnId="{FABA8753-1370-4BA1-881F-BC3110F31EA9}">
       <dgm:prSet/>
       <dgm:spPr/>
       <dgm:t>
@@ -1529,7 +1461,7 @@
         </a:p>
       </dgm:t>
     </dgm:pt>
-    <dgm:pt modelId="{B588F6BE-15D2-44A8-A032-DF8DC821A52F}">
+    <dgm:pt modelId="{F3C66161-F5C1-4B0A-9D65-E46194D45613}">
       <dgm:prSet phldrT="[Texto]"/>
       <dgm:spPr/>
       <dgm:t>
@@ -1538,32 +1470,40 @@
         <a:p>
           <a:r>
             <a:rPr lang="es-ES" dirty="0"/>
-            <a:t>Controladores: -</a:t>
+            <a:t>Utilidades</a:t>
           </a:r>
         </a:p>
       </dgm:t>
     </dgm:pt>
-    <dgm:pt modelId="{35978181-B1D0-4994-8B17-7DC91A58BEBF}" type="parTrans" cxnId="{3DBEE6EE-187C-4C09-AD98-D067FF42E3FE}">
+    <dgm:pt modelId="{D786E661-15A4-4F15-A4AA-DFA69ED62057}" type="parTrans" cxnId="{064B2552-95C7-4316-872D-C5921BA3167C}">
       <dgm:prSet/>
+      <dgm:spPr/>
+    </dgm:pt>
+    <dgm:pt modelId="{86FECC01-F6EE-462D-BE27-7648E669DB5B}" type="sibTrans" cxnId="{064B2552-95C7-4316-872D-C5921BA3167C}">
+      <dgm:prSet/>
+      <dgm:spPr/>
+    </dgm:pt>
+    <dgm:pt modelId="{CC21565C-83F0-4C72-876A-5D0900A083FC}">
+      <dgm:prSet phldrT="[Texto]"/>
       <dgm:spPr/>
       <dgm:t>
         <a:bodyPr/>
         <a:lstStyle/>
         <a:p>
-          <a:endParaRPr lang="es-ES"/>
+          <a:r>
+            <a:rPr lang="es-ES" dirty="0"/>
+            <a:t>Único fichero JS con diversos métodos con funcionalidades genéricas: generar DNI, PIN, Matrícula y números aleatorios.</a:t>
+          </a:r>
         </a:p>
       </dgm:t>
     </dgm:pt>
-    <dgm:pt modelId="{F4406C38-6810-467B-9D16-AE5C26297515}" type="sibTrans" cxnId="{3DBEE6EE-187C-4C09-AD98-D067FF42E3FE}">
+    <dgm:pt modelId="{118DAC1E-791E-4F54-8FC8-FD76E04FAC58}" type="parTrans" cxnId="{79824322-3F0A-44ED-B6D4-61C99EC74AAC}">
       <dgm:prSet/>
       <dgm:spPr/>
-      <dgm:t>
-        <a:bodyPr/>
-        <a:lstStyle/>
-        <a:p>
-          <a:endParaRPr lang="es-ES"/>
-        </a:p>
-      </dgm:t>
+    </dgm:pt>
+    <dgm:pt modelId="{5312F21A-0523-49AF-9E00-045AEC511ECD}" type="sibTrans" cxnId="{79824322-3F0A-44ED-B6D4-61C99EC74AAC}">
+      <dgm:prSet/>
+      <dgm:spPr/>
     </dgm:pt>
     <dgm:pt modelId="{B3DD2D3B-CEA1-48C6-8AED-235085E3721A}" type="pres">
       <dgm:prSet presAssocID="{2CE23626-8BE5-4BA6-9D01-EA8E82C6B013}" presName="linear" presStyleCnt="0">
@@ -1580,11 +1520,11 @@
       <dgm:spPr/>
     </dgm:pt>
     <dgm:pt modelId="{EC087E7B-F812-4F0C-BED4-586E26DAA13E}" type="pres">
-      <dgm:prSet presAssocID="{73120122-2709-4182-AD76-02CC96BCC8B7}" presName="parentLeftMargin" presStyleLbl="node1" presStyleIdx="0" presStyleCnt="3"/>
+      <dgm:prSet presAssocID="{73120122-2709-4182-AD76-02CC96BCC8B7}" presName="parentLeftMargin" presStyleLbl="node1" presStyleIdx="0" presStyleCnt="4"/>
       <dgm:spPr/>
     </dgm:pt>
     <dgm:pt modelId="{60DBA612-3706-4FD0-90E9-76F4BF841CBD}" type="pres">
-      <dgm:prSet presAssocID="{73120122-2709-4182-AD76-02CC96BCC8B7}" presName="parentText" presStyleLbl="node1" presStyleIdx="0" presStyleCnt="3">
+      <dgm:prSet presAssocID="{73120122-2709-4182-AD76-02CC96BCC8B7}" presName="parentText" presStyleLbl="node1" presStyleIdx="0" presStyleCnt="4">
         <dgm:presLayoutVars>
           <dgm:chMax val="0"/>
           <dgm:bulletEnabled val="1"/>
@@ -1597,7 +1537,7 @@
       <dgm:spPr/>
     </dgm:pt>
     <dgm:pt modelId="{84BB7DC1-D3BF-4C80-A517-DEC7A1AF01B4}" type="pres">
-      <dgm:prSet presAssocID="{73120122-2709-4182-AD76-02CC96BCC8B7}" presName="childText" presStyleLbl="conFgAcc1" presStyleIdx="0" presStyleCnt="3" custLinFactNeighborX="218" custLinFactNeighborY="11289">
+      <dgm:prSet presAssocID="{73120122-2709-4182-AD76-02CC96BCC8B7}" presName="childText" presStyleLbl="conFgAcc1" presStyleIdx="0" presStyleCnt="4" custLinFactNeighborX="218" custLinFactNeighborY="11289">
         <dgm:presLayoutVars>
           <dgm:bulletEnabled val="1"/>
         </dgm:presLayoutVars>
@@ -1613,11 +1553,11 @@
       <dgm:spPr/>
     </dgm:pt>
     <dgm:pt modelId="{374EE56E-914E-4B35-BE9B-E25CE110FBF7}" type="pres">
-      <dgm:prSet presAssocID="{C9E2A478-C852-4720-B19A-FE0F39D4BF93}" presName="parentLeftMargin" presStyleLbl="node1" presStyleIdx="0" presStyleCnt="3"/>
+      <dgm:prSet presAssocID="{C9E2A478-C852-4720-B19A-FE0F39D4BF93}" presName="parentLeftMargin" presStyleLbl="node1" presStyleIdx="0" presStyleCnt="4"/>
       <dgm:spPr/>
     </dgm:pt>
     <dgm:pt modelId="{DF4D1FA9-EECA-47B6-8A69-0DF882AC6FE7}" type="pres">
-      <dgm:prSet presAssocID="{C9E2A478-C852-4720-B19A-FE0F39D4BF93}" presName="parentText" presStyleLbl="node1" presStyleIdx="1" presStyleCnt="3">
+      <dgm:prSet presAssocID="{C9E2A478-C852-4720-B19A-FE0F39D4BF93}" presName="parentText" presStyleLbl="node1" presStyleIdx="1" presStyleCnt="4">
         <dgm:presLayoutVars>
           <dgm:chMax val="0"/>
           <dgm:bulletEnabled val="1"/>
@@ -1630,7 +1570,7 @@
       <dgm:spPr/>
     </dgm:pt>
     <dgm:pt modelId="{44B76188-4E64-4727-B3F4-058BF77789BE}" type="pres">
-      <dgm:prSet presAssocID="{C9E2A478-C852-4720-B19A-FE0F39D4BF93}" presName="childText" presStyleLbl="conFgAcc1" presStyleIdx="1" presStyleCnt="3">
+      <dgm:prSet presAssocID="{C9E2A478-C852-4720-B19A-FE0F39D4BF93}" presName="childText" presStyleLbl="conFgAcc1" presStyleIdx="1" presStyleCnt="4">
         <dgm:presLayoutVars>
           <dgm:bulletEnabled val="1"/>
         </dgm:presLayoutVars>
@@ -1646,11 +1586,11 @@
       <dgm:spPr/>
     </dgm:pt>
     <dgm:pt modelId="{B124EB29-8B37-49D1-9DD8-474708A19D4E}" type="pres">
-      <dgm:prSet presAssocID="{56B63760-9AED-41CB-AF5F-16709E095FA1}" presName="parentLeftMargin" presStyleLbl="node1" presStyleIdx="1" presStyleCnt="3"/>
+      <dgm:prSet presAssocID="{56B63760-9AED-41CB-AF5F-16709E095FA1}" presName="parentLeftMargin" presStyleLbl="node1" presStyleIdx="1" presStyleCnt="4"/>
       <dgm:spPr/>
     </dgm:pt>
     <dgm:pt modelId="{CE53C9A7-556A-4734-8C46-F0613282E106}" type="pres">
-      <dgm:prSet presAssocID="{56B63760-9AED-41CB-AF5F-16709E095FA1}" presName="parentText" presStyleLbl="node1" presStyleIdx="2" presStyleCnt="3">
+      <dgm:prSet presAssocID="{56B63760-9AED-41CB-AF5F-16709E095FA1}" presName="parentText" presStyleLbl="node1" presStyleIdx="2" presStyleCnt="4">
         <dgm:presLayoutVars>
           <dgm:chMax val="0"/>
           <dgm:bulletEnabled val="1"/>
@@ -1663,7 +1603,40 @@
       <dgm:spPr/>
     </dgm:pt>
     <dgm:pt modelId="{B4B8B659-5257-419F-A1AF-48E591352005}" type="pres">
-      <dgm:prSet presAssocID="{56B63760-9AED-41CB-AF5F-16709E095FA1}" presName="childText" presStyleLbl="conFgAcc1" presStyleIdx="2" presStyleCnt="3">
+      <dgm:prSet presAssocID="{56B63760-9AED-41CB-AF5F-16709E095FA1}" presName="childText" presStyleLbl="conFgAcc1" presStyleIdx="2" presStyleCnt="4">
+        <dgm:presLayoutVars>
+          <dgm:bulletEnabled val="1"/>
+        </dgm:presLayoutVars>
+      </dgm:prSet>
+      <dgm:spPr/>
+    </dgm:pt>
+    <dgm:pt modelId="{027933E7-74C6-4EEE-944E-244C7625B494}" type="pres">
+      <dgm:prSet presAssocID="{AA3C5196-9488-4662-ABE8-FB69D0D20286}" presName="spaceBetweenRectangles" presStyleCnt="0"/>
+      <dgm:spPr/>
+    </dgm:pt>
+    <dgm:pt modelId="{76D5B002-DE6E-4E5E-B396-0A16454BBEA1}" type="pres">
+      <dgm:prSet presAssocID="{F3C66161-F5C1-4B0A-9D65-E46194D45613}" presName="parentLin" presStyleCnt="0"/>
+      <dgm:spPr/>
+    </dgm:pt>
+    <dgm:pt modelId="{4BBD8D77-C62C-4449-938C-BA45EF2F612A}" type="pres">
+      <dgm:prSet presAssocID="{F3C66161-F5C1-4B0A-9D65-E46194D45613}" presName="parentLeftMargin" presStyleLbl="node1" presStyleIdx="2" presStyleCnt="4"/>
+      <dgm:spPr/>
+    </dgm:pt>
+    <dgm:pt modelId="{26658028-81D9-4CFC-B3BD-901C6F3F3AF2}" type="pres">
+      <dgm:prSet presAssocID="{F3C66161-F5C1-4B0A-9D65-E46194D45613}" presName="parentText" presStyleLbl="node1" presStyleIdx="3" presStyleCnt="4">
+        <dgm:presLayoutVars>
+          <dgm:chMax val="0"/>
+          <dgm:bulletEnabled val="1"/>
+        </dgm:presLayoutVars>
+      </dgm:prSet>
+      <dgm:spPr/>
+    </dgm:pt>
+    <dgm:pt modelId="{AA0B1D2E-80E4-45ED-A3C6-79C17F13FA69}" type="pres">
+      <dgm:prSet presAssocID="{F3C66161-F5C1-4B0A-9D65-E46194D45613}" presName="negativeSpace" presStyleCnt="0"/>
+      <dgm:spPr/>
+    </dgm:pt>
+    <dgm:pt modelId="{560A0D66-EF10-4F00-BED6-227F08CA442B}" type="pres">
+      <dgm:prSet presAssocID="{F3C66161-F5C1-4B0A-9D65-E46194D45613}" presName="childText" presStyleLbl="conFgAcc1" presStyleIdx="3" presStyleCnt="4">
         <dgm:presLayoutVars>
           <dgm:bulletEnabled val="1"/>
         </dgm:presLayoutVars>
@@ -1679,17 +1652,18 @@
     <dgm:cxn modelId="{CF9DD111-A8D3-43B6-9071-1AC463F2CC02}" srcId="{73120122-2709-4182-AD76-02CC96BCC8B7}" destId="{9952B64D-35B4-4A90-BA05-A54D96AD7E27}" srcOrd="1" destOrd="0" parTransId="{476F3920-D8B2-4324-B611-5501B5F8F96D}" sibTransId="{EA4770B3-2DE0-4830-9B11-A1804E502B57}"/>
     <dgm:cxn modelId="{3F93B414-05AB-411C-B14C-239B98A1B5D6}" type="presOf" srcId="{BEBB5D8A-7B68-4D8A-8774-598CEFB0C4CC}" destId="{44B76188-4E64-4727-B3F4-058BF77789BE}" srcOrd="0" destOrd="2" presId="urn:microsoft.com/office/officeart/2005/8/layout/list1"/>
     <dgm:cxn modelId="{47FE7720-117F-461C-9FAE-D78C402A5D1E}" type="presOf" srcId="{2CD2283B-BD0D-43A8-B0E7-896549D82BFF}" destId="{44B76188-4E64-4727-B3F4-058BF77789BE}" srcOrd="0" destOrd="3" presId="urn:microsoft.com/office/officeart/2005/8/layout/list1"/>
+    <dgm:cxn modelId="{79824322-3F0A-44ED-B6D4-61C99EC74AAC}" srcId="{F3C66161-F5C1-4B0A-9D65-E46194D45613}" destId="{CC21565C-83F0-4C72-876A-5D0900A083FC}" srcOrd="0" destOrd="0" parTransId="{118DAC1E-791E-4F54-8FC8-FD76E04FAC58}" sibTransId="{5312F21A-0523-49AF-9E00-045AEC511ECD}"/>
     <dgm:cxn modelId="{6B998D30-1F78-4B15-8652-EF7AEB8E758D}" type="presOf" srcId="{73120122-2709-4182-AD76-02CC96BCC8B7}" destId="{EC087E7B-F812-4F0C-BED4-586E26DAA13E}" srcOrd="0" destOrd="0" presId="urn:microsoft.com/office/officeart/2005/8/layout/list1"/>
-    <dgm:cxn modelId="{08871435-646A-4877-8F60-6121A1F3FF15}" type="presOf" srcId="{58205C9B-0C64-4D62-AE92-5EC34C3CEB17}" destId="{44B76188-4E64-4727-B3F4-058BF77789BE}" srcOrd="0" destOrd="4" presId="urn:microsoft.com/office/officeart/2005/8/layout/list1"/>
     <dgm:cxn modelId="{EBCC0436-08C5-47E3-882B-78E105DB9823}" type="presOf" srcId="{2CE23626-8BE5-4BA6-9D01-EA8E82C6B013}" destId="{B3DD2D3B-CEA1-48C6-8AED-235085E3721A}" srcOrd="0" destOrd="0" presId="urn:microsoft.com/office/officeart/2005/8/layout/list1"/>
     <dgm:cxn modelId="{CBB5BB37-3D91-4385-9F5A-63878D896069}" type="presOf" srcId="{CFDBA0D2-4657-46D4-9F65-3821319CD9F0}" destId="{84BB7DC1-D3BF-4C80-A517-DEC7A1AF01B4}" srcOrd="0" destOrd="2" presId="urn:microsoft.com/office/officeart/2005/8/layout/list1"/>
     <dgm:cxn modelId="{0D7AD35C-1BB4-46B7-961F-D52DD8F76401}" srcId="{56B63760-9AED-41CB-AF5F-16709E095FA1}" destId="{D2FB84C3-900D-4BCB-8167-6FCC2010A9E8}" srcOrd="1" destOrd="0" parTransId="{A1F87C9F-2C62-4DC8-A563-47D5664DFEB6}" sibTransId="{5AD7492D-D0C8-4256-90F4-3BBC9B5F5D1A}"/>
+    <dgm:cxn modelId="{9D917B60-16B2-4E41-B5A3-65DF41671937}" type="presOf" srcId="{F3C66161-F5C1-4B0A-9D65-E46194D45613}" destId="{26658028-81D9-4CFC-B3BD-901C6F3F3AF2}" srcOrd="1" destOrd="0" presId="urn:microsoft.com/office/officeart/2005/8/layout/list1"/>
     <dgm:cxn modelId="{4A54FD62-624E-4F59-813A-E850D120B62E}" srcId="{73120122-2709-4182-AD76-02CC96BCC8B7}" destId="{CFDBA0D2-4657-46D4-9F65-3821319CD9F0}" srcOrd="2" destOrd="0" parTransId="{D06F649A-AF9E-4B10-AC32-29BBF33149DA}" sibTransId="{88138875-2E86-4032-A4BB-4C9CB0DF3AF8}"/>
-    <dgm:cxn modelId="{475CFE42-1C4C-4D06-8737-EB541F27F87B}" srcId="{73120122-2709-4182-AD76-02CC96BCC8B7}" destId="{0FA1A818-29E7-4AE7-B9E3-16A714BE7301}" srcOrd="4" destOrd="0" parTransId="{C1935D26-112A-4B6A-9F79-52F5060E354E}" sibTransId="{458EF357-0C66-45E6-B593-FDA305690D30}"/>
     <dgm:cxn modelId="{E2847747-F738-420E-9FEB-5B3AD534428E}" type="presOf" srcId="{40C12849-3284-4795-9D8B-45E5EE745579}" destId="{B4B8B659-5257-419F-A1AF-48E591352005}" srcOrd="0" destOrd="2" presId="urn:microsoft.com/office/officeart/2005/8/layout/list1"/>
+    <dgm:cxn modelId="{3C09D049-E6E0-4142-BE1B-19C4C95AFFB2}" type="presOf" srcId="{F3C66161-F5C1-4B0A-9D65-E46194D45613}" destId="{4BBD8D77-C62C-4449-938C-BA45EF2F612A}" srcOrd="0" destOrd="0" presId="urn:microsoft.com/office/officeart/2005/8/layout/list1"/>
     <dgm:cxn modelId="{C36E5F4C-E0CC-433E-B7C0-CDB94D629BD5}" type="presOf" srcId="{56B63760-9AED-41CB-AF5F-16709E095FA1}" destId="{B124EB29-8B37-49D1-9DD8-474708A19D4E}" srcOrd="0" destOrd="0" presId="urn:microsoft.com/office/officeart/2005/8/layout/list1"/>
+    <dgm:cxn modelId="{064B2552-95C7-4316-872D-C5921BA3167C}" srcId="{2CE23626-8BE5-4BA6-9D01-EA8E82C6B013}" destId="{F3C66161-F5C1-4B0A-9D65-E46194D45613}" srcOrd="3" destOrd="0" parTransId="{D786E661-15A4-4F15-A4AA-DFA69ED62057}" sibTransId="{86FECC01-F6EE-462D-BE27-7648E669DB5B}"/>
     <dgm:cxn modelId="{F0A41573-8FA3-4471-955A-D3D84C2F9BC0}" type="presOf" srcId="{6A3C41A9-B46E-46AF-951D-41F55735CBE5}" destId="{44B76188-4E64-4727-B3F4-058BF77789BE}" srcOrd="0" destOrd="1" presId="urn:microsoft.com/office/officeart/2005/8/layout/list1"/>
-    <dgm:cxn modelId="{FABA8753-1370-4BA1-881F-BC3110F31EA9}" srcId="{C9E2A478-C852-4720-B19A-FE0F39D4BF93}" destId="{58205C9B-0C64-4D62-AE92-5EC34C3CEB17}" srcOrd="4" destOrd="0" parTransId="{5A030048-E0F9-41AF-A83E-FDAC705CC9EB}" sibTransId="{2ED34CAA-E9F0-42BA-B6E6-6A054BC7DD15}"/>
     <dgm:cxn modelId="{47AA7856-AB61-4146-A188-90B5131586E9}" srcId="{C9E2A478-C852-4720-B19A-FE0F39D4BF93}" destId="{BEBB5D8A-7B68-4D8A-8774-598CEFB0C4CC}" srcOrd="2" destOrd="0" parTransId="{BE45CA9C-435A-445F-A7E2-D09231820111}" sibTransId="{A88B506C-5C58-4135-B721-3683833CCC94}"/>
     <dgm:cxn modelId="{952AC476-1AB8-494E-B769-650BAA16DD9D}" srcId="{56B63760-9AED-41CB-AF5F-16709E095FA1}" destId="{40C12849-3284-4795-9D8B-45E5EE745579}" srcOrd="2" destOrd="0" parTransId="{5F6636DD-6095-4499-B7B4-CB3AB6BCF815}" sibTransId="{B1549B31-8FE5-4D22-8476-5AB990275C68}"/>
     <dgm:cxn modelId="{BF711958-E68E-4046-9A9D-A2F31459E182}" srcId="{2CE23626-8BE5-4BA6-9D01-EA8E82C6B013}" destId="{73120122-2709-4182-AD76-02CC96BCC8B7}" srcOrd="0" destOrd="0" parTransId="{F811D707-A518-4E15-BB40-FEA0F5A06D0B}" sibTransId="{AC32F9B7-2F73-4AFF-8CE5-6680D9EE2F8C}"/>
@@ -1698,9 +1672,8 @@
     <dgm:cxn modelId="{AE27B489-014D-45D0-A2F9-9383CB25DBB5}" srcId="{73120122-2709-4182-AD76-02CC96BCC8B7}" destId="{977813E2-34D5-4BD6-9755-458928DDE15D}" srcOrd="0" destOrd="0" parTransId="{08D75870-F450-43D3-83EF-8BD9BFCF2EF9}" sibTransId="{AEFD3197-55EF-4F04-B222-FC74CFFBFE21}"/>
     <dgm:cxn modelId="{842CE58D-B180-4597-9224-391AF8EE72E8}" srcId="{C9E2A478-C852-4720-B19A-FE0F39D4BF93}" destId="{EB615255-7E15-4C2A-938D-746E1DA258EE}" srcOrd="0" destOrd="0" parTransId="{32A0C684-B5FA-479B-A7F8-C260F34301C1}" sibTransId="{AF7DD3A2-1F29-4B45-9CAD-268D46B7476A}"/>
     <dgm:cxn modelId="{9AC9A096-2A80-41DF-925F-5B529A9601A8}" type="presOf" srcId="{977813E2-34D5-4BD6-9755-458928DDE15D}" destId="{84BB7DC1-D3BF-4C80-A517-DEC7A1AF01B4}" srcOrd="0" destOrd="0" presId="urn:microsoft.com/office/officeart/2005/8/layout/list1"/>
-    <dgm:cxn modelId="{10FCB39D-8381-495C-872D-3C7F0D24655C}" type="presOf" srcId="{0FA1A818-29E7-4AE7-B9E3-16A714BE7301}" destId="{84BB7DC1-D3BF-4C80-A517-DEC7A1AF01B4}" srcOrd="0" destOrd="4" presId="urn:microsoft.com/office/officeart/2005/8/layout/list1"/>
     <dgm:cxn modelId="{1751A4A5-FF82-479A-814A-CFAD05015E06}" srcId="{C9E2A478-C852-4720-B19A-FE0F39D4BF93}" destId="{2CD2283B-BD0D-43A8-B0E7-896549D82BFF}" srcOrd="3" destOrd="0" parTransId="{92031695-9A86-443D-A230-7152A7F22CFF}" sibTransId="{D2BBEBD7-0B24-4DE7-B0F0-8E0039AAB29F}"/>
-    <dgm:cxn modelId="{E7DDB1C0-B090-43F9-B4F8-0B18FFED37D7}" type="presOf" srcId="{B588F6BE-15D2-44A8-A032-DF8DC821A52F}" destId="{B4B8B659-5257-419F-A1AF-48E591352005}" srcOrd="0" destOrd="4" presId="urn:microsoft.com/office/officeart/2005/8/layout/list1"/>
+    <dgm:cxn modelId="{BE929BBC-F4D9-434E-BEC9-10156DE1AC7E}" type="presOf" srcId="{CC21565C-83F0-4C72-876A-5D0900A083FC}" destId="{560A0D66-EF10-4F00-BED6-227F08CA442B}" srcOrd="0" destOrd="0" presId="urn:microsoft.com/office/officeart/2005/8/layout/list1"/>
     <dgm:cxn modelId="{C65409C1-3FCB-4E82-A859-E694BD371B34}" type="presOf" srcId="{C9E2A478-C852-4720-B19A-FE0F39D4BF93}" destId="{DF4D1FA9-EECA-47B6-8A69-0DF882AC6FE7}" srcOrd="1" destOrd="0" presId="urn:microsoft.com/office/officeart/2005/8/layout/list1"/>
     <dgm:cxn modelId="{1F81E2C3-30BA-4FD3-94F3-4A98FF1E8D2D}" type="presOf" srcId="{56B63760-9AED-41CB-AF5F-16709E095FA1}" destId="{CE53C9A7-556A-4734-8C46-F0613282E106}" srcOrd="1" destOrd="0" presId="urn:microsoft.com/office/officeart/2005/8/layout/list1"/>
     <dgm:cxn modelId="{863596CC-7DA0-4E16-807B-A6EC6FCF03F5}" type="presOf" srcId="{D2FB84C3-900D-4BCB-8167-6FCC2010A9E8}" destId="{B4B8B659-5257-419F-A1AF-48E591352005}" srcOrd="0" destOrd="1" presId="urn:microsoft.com/office/officeart/2005/8/layout/list1"/>
@@ -1708,7 +1681,6 @@
     <dgm:cxn modelId="{E57511D6-6BD3-4FF7-BD8D-4C5DDD7B4505}" srcId="{2CE23626-8BE5-4BA6-9D01-EA8E82C6B013}" destId="{C9E2A478-C852-4720-B19A-FE0F39D4BF93}" srcOrd="1" destOrd="0" parTransId="{0529AFEE-184D-4BD0-A2FA-356A636D082C}" sibTransId="{2890695C-4AEC-4AA9-8F27-BB95647E5D5C}"/>
     <dgm:cxn modelId="{396050D9-7F0E-487D-9271-10266EABA623}" srcId="{56B63760-9AED-41CB-AF5F-16709E095FA1}" destId="{83288119-4301-43FF-A79E-DB5E09960B98}" srcOrd="0" destOrd="0" parTransId="{A74DF829-0524-4345-A0E3-4A03A240151B}" sibTransId="{8E376A16-7F12-4FC9-9F5C-1E5057B2F49F}"/>
     <dgm:cxn modelId="{30466ADB-416D-4E22-9552-681D84B43888}" type="presOf" srcId="{73120122-2709-4182-AD76-02CC96BCC8B7}" destId="{60DBA612-3706-4FD0-90E9-76F4BF841CBD}" srcOrd="1" destOrd="0" presId="urn:microsoft.com/office/officeart/2005/8/layout/list1"/>
-    <dgm:cxn modelId="{3DBEE6EE-187C-4C09-AD98-D067FF42E3FE}" srcId="{56B63760-9AED-41CB-AF5F-16709E095FA1}" destId="{B588F6BE-15D2-44A8-A032-DF8DC821A52F}" srcOrd="4" destOrd="0" parTransId="{35978181-B1D0-4994-8B17-7DC91A58BEBF}" sibTransId="{F4406C38-6810-467B-9D16-AE5C26297515}"/>
     <dgm:cxn modelId="{BE196AF0-3EEF-4BD6-B1C9-AB02826778FB}" type="presOf" srcId="{EB615255-7E15-4C2A-938D-746E1DA258EE}" destId="{44B76188-4E64-4727-B3F4-058BF77789BE}" srcOrd="0" destOrd="0" presId="urn:microsoft.com/office/officeart/2005/8/layout/list1"/>
     <dgm:cxn modelId="{8567D0FC-7E7E-475C-84B2-D45DCAD85339}" type="presOf" srcId="{83288119-4301-43FF-A79E-DB5E09960B98}" destId="{B4B8B659-5257-419F-A1AF-48E591352005}" srcOrd="0" destOrd="0" presId="urn:microsoft.com/office/officeart/2005/8/layout/list1"/>
     <dgm:cxn modelId="{6E0450FE-65CD-4A7C-A12A-E132E55941E5}" srcId="{73120122-2709-4182-AD76-02CC96BCC8B7}" destId="{00338487-4D0E-414E-A8EF-AA19ACA05632}" srcOrd="3" destOrd="0" parTransId="{62263282-4D3A-4A43-A238-48D96D3D0F74}" sibTransId="{1BD2C9FD-A85C-4BE5-8112-486F8A0C81A7}"/>
@@ -1729,6 +1701,12 @@
     <dgm:cxn modelId="{EAE8AED5-AC25-49ED-9A18-B459E5B24760}" type="presParOf" srcId="{74E58841-2991-469E-ADE0-1F419FE4628C}" destId="{CE53C9A7-556A-4734-8C46-F0613282E106}" srcOrd="1" destOrd="0" presId="urn:microsoft.com/office/officeart/2005/8/layout/list1"/>
     <dgm:cxn modelId="{1AA6F6B0-E55A-4AC3-8A46-1F7FE8091F72}" type="presParOf" srcId="{B3DD2D3B-CEA1-48C6-8AED-235085E3721A}" destId="{AF9117AD-82A4-451C-899A-F89A0AE2D2EC}" srcOrd="9" destOrd="0" presId="urn:microsoft.com/office/officeart/2005/8/layout/list1"/>
     <dgm:cxn modelId="{281C27F1-B1CA-4E60-B608-4BBD4A4E0819}" type="presParOf" srcId="{B3DD2D3B-CEA1-48C6-8AED-235085E3721A}" destId="{B4B8B659-5257-419F-A1AF-48E591352005}" srcOrd="10" destOrd="0" presId="urn:microsoft.com/office/officeart/2005/8/layout/list1"/>
+    <dgm:cxn modelId="{E3EE9802-ED20-4138-B7F9-98E7B709D576}" type="presParOf" srcId="{B3DD2D3B-CEA1-48C6-8AED-235085E3721A}" destId="{027933E7-74C6-4EEE-944E-244C7625B494}" srcOrd="11" destOrd="0" presId="urn:microsoft.com/office/officeart/2005/8/layout/list1"/>
+    <dgm:cxn modelId="{07A7C6AC-BB4E-4436-96FE-8E6BC4B7C66A}" type="presParOf" srcId="{B3DD2D3B-CEA1-48C6-8AED-235085E3721A}" destId="{76D5B002-DE6E-4E5E-B396-0A16454BBEA1}" srcOrd="12" destOrd="0" presId="urn:microsoft.com/office/officeart/2005/8/layout/list1"/>
+    <dgm:cxn modelId="{2CDCE645-5FCA-4534-BD16-D8E12F8D1DFA}" type="presParOf" srcId="{76D5B002-DE6E-4E5E-B396-0A16454BBEA1}" destId="{4BBD8D77-C62C-4449-938C-BA45EF2F612A}" srcOrd="0" destOrd="0" presId="urn:microsoft.com/office/officeart/2005/8/layout/list1"/>
+    <dgm:cxn modelId="{6AE978C6-6479-430C-8EB2-0D5CED8D09E4}" type="presParOf" srcId="{76D5B002-DE6E-4E5E-B396-0A16454BBEA1}" destId="{26658028-81D9-4CFC-B3BD-901C6F3F3AF2}" srcOrd="1" destOrd="0" presId="urn:microsoft.com/office/officeart/2005/8/layout/list1"/>
+    <dgm:cxn modelId="{5D5996EF-6617-4ACD-BFB6-8EFE66B0E666}" type="presParOf" srcId="{B3DD2D3B-CEA1-48C6-8AED-235085E3721A}" destId="{AA0B1D2E-80E4-45ED-A3C6-79C17F13FA69}" srcOrd="13" destOrd="0" presId="urn:microsoft.com/office/officeart/2005/8/layout/list1"/>
+    <dgm:cxn modelId="{5B0CC2BD-7EFF-47D7-B428-1F43D12EEC5C}" type="presParOf" srcId="{B3DD2D3B-CEA1-48C6-8AED-235085E3721A}" destId="{560A0D66-EF10-4F00-BED6-227F08CA442B}" srcOrd="14" destOrd="0" presId="urn:microsoft.com/office/officeart/2005/8/layout/list1"/>
   </dgm:cxnLst>
   <dgm:bg/>
   <dgm:whole/>
@@ -1755,8 +1733,8 @@
       </dsp:nvSpPr>
       <dsp:spPr>
         <a:xfrm>
-          <a:off x="0" y="309268"/>
-          <a:ext cx="7583423" cy="1732500"/>
+          <a:off x="0" y="259025"/>
+          <a:ext cx="7583423" cy="1420650"/>
         </a:xfrm>
         <a:prstGeom prst="rect">
           <a:avLst/>
@@ -1815,15 +1793,19 @@
           </a:pPr>
           <a:r>
             <a:rPr lang="es-ES" sz="1100" kern="1200" dirty="0"/>
-            <a:t>Modelo</a:t>
+            <a:t>Modelo: </a:t>
           </a:r>
           <a:r>
-            <a:rPr lang="es-ES" sz="1100" kern="1200"/>
-            <a:t>: Parking, Plazas </a:t>
+            <a:rPr lang="es-ES" sz="1100" b="0" kern="1200" dirty="0">
+              <a:solidFill>
+                <a:schemeClr val="tx1"/>
+              </a:solidFill>
+            </a:rPr>
+            <a:t>Parking</a:t>
           </a:r>
           <a:r>
             <a:rPr lang="es-ES" sz="1100" kern="1200" dirty="0"/>
-            <a:t>y Tickets.</a:t>
+            <a:t>, Plazas y Tickets.</a:t>
           </a:r>
         </a:p>
         <a:p>
@@ -1880,28 +1862,10 @@
             <a:t>Repositorios: Plazas, Vehículos y Tickets.</a:t>
           </a:r>
         </a:p>
-        <a:p>
-          <a:pPr marL="57150" lvl="1" indent="-57150" algn="l" defTabSz="488950">
-            <a:lnSpc>
-              <a:spcPct val="90000"/>
-            </a:lnSpc>
-            <a:spcBef>
-              <a:spcPct val="0"/>
-            </a:spcBef>
-            <a:spcAft>
-              <a:spcPct val="15000"/>
-            </a:spcAft>
-            <a:buChar char="•"/>
-          </a:pPr>
-          <a:r>
-            <a:rPr lang="es-ES" sz="1100" kern="1200" dirty="0"/>
-            <a:t>Controladores: Llamar a la vistas y controla las entradas y salidas por consola.</a:t>
-          </a:r>
-        </a:p>
       </dsp:txBody>
       <dsp:txXfrm>
-        <a:off x="0" y="309268"/>
-        <a:ext cx="7583423" cy="1732500"/>
+        <a:off x="0" y="259025"/>
+        <a:ext cx="7583423" cy="1420650"/>
       </dsp:txXfrm>
     </dsp:sp>
     <dsp:sp modelId="{60DBA612-3706-4FD0-90E9-76F4BF841CBD}">
@@ -1911,7 +1875,7 @@
       </dsp:nvSpPr>
       <dsp:spPr>
         <a:xfrm>
-          <a:off x="379171" y="140202"/>
+          <a:off x="379171" y="89959"/>
           <a:ext cx="5308396" cy="324720"/>
         </a:xfrm>
         <a:prstGeom prst="roundRect">
@@ -1977,7 +1941,7 @@
         </a:p>
       </dsp:txBody>
       <dsp:txXfrm>
-        <a:off x="395023" y="156054"/>
+        <a:off x="395023" y="105811"/>
         <a:ext cx="5276692" cy="293016"/>
       </dsp:txXfrm>
     </dsp:sp>
@@ -1988,8 +1952,8 @@
       </dsp:nvSpPr>
       <dsp:spPr>
         <a:xfrm>
-          <a:off x="0" y="2256822"/>
-          <a:ext cx="7583423" cy="1732500"/>
+          <a:off x="0" y="1894729"/>
+          <a:ext cx="7583423" cy="1420650"/>
         </a:xfrm>
         <a:prstGeom prst="rect">
           <a:avLst/>
@@ -2006,9 +1970,9 @@
         <a:ln w="12700" cap="flat" cmpd="sng" algn="ctr">
           <a:solidFill>
             <a:schemeClr val="accent2">
-              <a:hueOff val="-398442"/>
-              <a:satOff val="6385"/>
-              <a:lumOff val="5784"/>
+              <a:hueOff val="-265628"/>
+              <a:satOff val="4257"/>
+              <a:lumOff val="3856"/>
               <a:alphaOff val="0"/>
             </a:schemeClr>
           </a:solidFill>
@@ -2084,7 +2048,7 @@
           </a:pPr>
           <a:r>
             <a:rPr lang="es-ES" sz="1100" kern="1200" dirty="0"/>
-            <a:t>Servicios: Consultar estado del parking, facturación y abonados.  </a:t>
+            <a:t>Servicios: Consultar estado del parking, facturación y gestión de abonados.  </a:t>
           </a:r>
         </a:p>
         <a:p>
@@ -2105,28 +2069,10 @@
             <a:t>Repositorios: Administrador y Abonos.</a:t>
           </a:r>
         </a:p>
-        <a:p>
-          <a:pPr marL="57150" lvl="1" indent="-57150" algn="l" defTabSz="488950">
-            <a:lnSpc>
-              <a:spcPct val="90000"/>
-            </a:lnSpc>
-            <a:spcBef>
-              <a:spcPct val="0"/>
-            </a:spcBef>
-            <a:spcAft>
-              <a:spcPct val="15000"/>
-            </a:spcAft>
-            <a:buChar char="•"/>
-          </a:pPr>
-          <a:r>
-            <a:rPr lang="es-ES" sz="1100" kern="1200" dirty="0"/>
-            <a:t>Controladores: - </a:t>
-          </a:r>
-        </a:p>
       </dsp:txBody>
       <dsp:txXfrm>
-        <a:off x="0" y="2256822"/>
-        <a:ext cx="7583423" cy="1732500"/>
+        <a:off x="0" y="1894729"/>
+        <a:ext cx="7583423" cy="1420650"/>
       </dsp:txXfrm>
     </dsp:sp>
     <dsp:sp modelId="{DF4D1FA9-EECA-47B6-8A69-0DF882AC6FE7}">
@@ -2136,7 +2082,7 @@
       </dsp:nvSpPr>
       <dsp:spPr>
         <a:xfrm>
-          <a:off x="379171" y="2094462"/>
+          <a:off x="379171" y="1732369"/>
           <a:ext cx="5308396" cy="324720"/>
         </a:xfrm>
         <a:prstGeom prst="roundRect">
@@ -2144,9 +2090,9 @@
         </a:prstGeom>
         <a:solidFill>
           <a:schemeClr val="accent2">
-            <a:hueOff val="-398442"/>
-            <a:satOff val="6385"/>
-            <a:lumOff val="5784"/>
+            <a:hueOff val="-265628"/>
+            <a:satOff val="4257"/>
+            <a:lumOff val="3856"/>
             <a:alphaOff val="0"/>
           </a:schemeClr>
         </a:solidFill>
@@ -2202,7 +2148,7 @@
         </a:p>
       </dsp:txBody>
       <dsp:txXfrm>
-        <a:off x="395023" y="2110314"/>
+        <a:off x="395023" y="1748221"/>
         <a:ext cx="5276692" cy="293016"/>
       </dsp:txXfrm>
     </dsp:sp>
@@ -2213,8 +2159,8 @@
       </dsp:nvSpPr>
       <dsp:spPr>
         <a:xfrm>
-          <a:off x="0" y="4211082"/>
-          <a:ext cx="7583423" cy="1732500"/>
+          <a:off x="0" y="3537139"/>
+          <a:ext cx="7583423" cy="1420650"/>
         </a:xfrm>
         <a:prstGeom prst="rect">
           <a:avLst/>
@@ -2231,9 +2177,9 @@
         <a:ln w="12700" cap="flat" cmpd="sng" algn="ctr">
           <a:solidFill>
             <a:schemeClr val="accent2">
-              <a:hueOff val="-796883"/>
-              <a:satOff val="12770"/>
-              <a:lumOff val="11569"/>
+              <a:hueOff val="-531255"/>
+              <a:satOff val="8513"/>
+              <a:lumOff val="7713"/>
               <a:alphaOff val="0"/>
             </a:schemeClr>
           </a:solidFill>
@@ -2330,6 +2276,141 @@
             <a:t>Repositorios: Clientes abonados y Vehículos de clientes abonados. </a:t>
           </a:r>
         </a:p>
+      </dsp:txBody>
+      <dsp:txXfrm>
+        <a:off x="0" y="3537139"/>
+        <a:ext cx="7583423" cy="1420650"/>
+      </dsp:txXfrm>
+    </dsp:sp>
+    <dsp:sp modelId="{CE53C9A7-556A-4734-8C46-F0613282E106}">
+      <dsp:nvSpPr>
+        <dsp:cNvPr id="0" name=""/>
+        <dsp:cNvSpPr/>
+      </dsp:nvSpPr>
+      <dsp:spPr>
+        <a:xfrm>
+          <a:off x="379171" y="3374779"/>
+          <a:ext cx="5308396" cy="324720"/>
+        </a:xfrm>
+        <a:prstGeom prst="roundRect">
+          <a:avLst/>
+        </a:prstGeom>
+        <a:solidFill>
+          <a:schemeClr val="accent2">
+            <a:hueOff val="-531255"/>
+            <a:satOff val="8513"/>
+            <a:lumOff val="7713"/>
+            <a:alphaOff val="0"/>
+          </a:schemeClr>
+        </a:solidFill>
+        <a:ln w="19050" cap="flat" cmpd="sng" algn="ctr">
+          <a:solidFill>
+            <a:schemeClr val="lt1">
+              <a:hueOff val="0"/>
+              <a:satOff val="0"/>
+              <a:lumOff val="0"/>
+              <a:alphaOff val="0"/>
+            </a:schemeClr>
+          </a:solidFill>
+          <a:prstDash val="solid"/>
+        </a:ln>
+        <a:effectLst/>
+      </dsp:spPr>
+      <dsp:style>
+        <a:lnRef idx="3">
+          <a:scrgbClr r="0" g="0" b="0"/>
+        </a:lnRef>
+        <a:fillRef idx="1">
+          <a:scrgbClr r="0" g="0" b="0"/>
+        </a:fillRef>
+        <a:effectRef idx="1">
+          <a:scrgbClr r="0" g="0" b="0"/>
+        </a:effectRef>
+        <a:fontRef idx="minor">
+          <a:schemeClr val="lt1"/>
+        </a:fontRef>
+      </dsp:style>
+      <dsp:txBody>
+        <a:bodyPr spcFirstLastPara="0" vert="horz" wrap="square" lIns="200645" tIns="0" rIns="200645" bIns="0" numCol="1" spcCol="1270" anchor="ctr" anchorCtr="0">
+          <a:noAutofit/>
+        </a:bodyPr>
+        <a:lstStyle/>
+        <a:p>
+          <a:pPr marL="0" lvl="0" indent="0" algn="l" defTabSz="488950">
+            <a:lnSpc>
+              <a:spcPct val="90000"/>
+            </a:lnSpc>
+            <a:spcBef>
+              <a:spcPct val="0"/>
+            </a:spcBef>
+            <a:spcAft>
+              <a:spcPct val="35000"/>
+            </a:spcAft>
+            <a:buNone/>
+          </a:pPr>
+          <a:r>
+            <a:rPr lang="es-ES" sz="1100" kern="1200" dirty="0"/>
+            <a:t>Cliente</a:t>
+          </a:r>
+        </a:p>
+      </dsp:txBody>
+      <dsp:txXfrm>
+        <a:off x="395023" y="3390631"/>
+        <a:ext cx="5276692" cy="293016"/>
+      </dsp:txXfrm>
+    </dsp:sp>
+    <dsp:sp modelId="{560A0D66-EF10-4F00-BED6-227F08CA442B}">
+      <dsp:nvSpPr>
+        <dsp:cNvPr id="0" name=""/>
+        <dsp:cNvSpPr/>
+      </dsp:nvSpPr>
+      <dsp:spPr>
+        <a:xfrm>
+          <a:off x="0" y="5179550"/>
+          <a:ext cx="7583423" cy="814274"/>
+        </a:xfrm>
+        <a:prstGeom prst="rect">
+          <a:avLst/>
+        </a:prstGeom>
+        <a:solidFill>
+          <a:schemeClr val="lt1">
+            <a:alpha val="90000"/>
+            <a:hueOff val="0"/>
+            <a:satOff val="0"/>
+            <a:lumOff val="0"/>
+            <a:alphaOff val="0"/>
+          </a:schemeClr>
+        </a:solidFill>
+        <a:ln w="12700" cap="flat" cmpd="sng" algn="ctr">
+          <a:solidFill>
+            <a:schemeClr val="accent2">
+              <a:hueOff val="-796883"/>
+              <a:satOff val="12770"/>
+              <a:lumOff val="11569"/>
+              <a:alphaOff val="0"/>
+            </a:schemeClr>
+          </a:solidFill>
+          <a:prstDash val="solid"/>
+        </a:ln>
+        <a:effectLst/>
+      </dsp:spPr>
+      <dsp:style>
+        <a:lnRef idx="2">
+          <a:scrgbClr r="0" g="0" b="0"/>
+        </a:lnRef>
+        <a:fillRef idx="1">
+          <a:scrgbClr r="0" g="0" b="0"/>
+        </a:fillRef>
+        <a:effectRef idx="0">
+          <a:scrgbClr r="0" g="0" b="0"/>
+        </a:effectRef>
+        <a:fontRef idx="minor"/>
+      </dsp:style>
+      <dsp:txBody>
+        <a:bodyPr spcFirstLastPara="0" vert="horz" wrap="square" lIns="588558" tIns="229108" rIns="588558" bIns="78232" numCol="1" spcCol="1270" anchor="t" anchorCtr="0">
+          <a:noAutofit/>
+        </a:bodyPr>
+        <a:lstStyle/>
         <a:p>
           <a:pPr marL="57150" lvl="1" indent="-57150" algn="l" defTabSz="488950">
             <a:lnSpc>
@@ -2345,23 +2426,23 @@
           </a:pPr>
           <a:r>
             <a:rPr lang="es-ES" sz="1100" kern="1200" dirty="0"/>
-            <a:t>Controladores: -</a:t>
+            <a:t>Único fichero JS con diversos métodos con funcionalidades genéricas: generar DNI, PIN, Matrícula y números aleatorios.</a:t>
           </a:r>
         </a:p>
       </dsp:txBody>
       <dsp:txXfrm>
-        <a:off x="0" y="4211082"/>
-        <a:ext cx="7583423" cy="1732500"/>
+        <a:off x="0" y="5179550"/>
+        <a:ext cx="7583423" cy="814274"/>
       </dsp:txXfrm>
     </dsp:sp>
-    <dsp:sp modelId="{CE53C9A7-556A-4734-8C46-F0613282E106}">
+    <dsp:sp modelId="{26658028-81D9-4CFC-B3BD-901C6F3F3AF2}">
       <dsp:nvSpPr>
         <dsp:cNvPr id="0" name=""/>
         <dsp:cNvSpPr/>
       </dsp:nvSpPr>
       <dsp:spPr>
         <a:xfrm>
-          <a:off x="379171" y="4048722"/>
+          <a:off x="379171" y="5017189"/>
           <a:ext cx="5308396" cy="324720"/>
         </a:xfrm>
         <a:prstGeom prst="roundRect">
@@ -2422,12 +2503,12 @@
           </a:pPr>
           <a:r>
             <a:rPr lang="es-ES" sz="1100" kern="1200" dirty="0"/>
-            <a:t>Cliente</a:t>
+            <a:t>Utilidades</a:t>
           </a:r>
         </a:p>
       </dsp:txBody>
       <dsp:txXfrm>
-        <a:off x="395023" y="4064574"/>
+        <a:off x="395023" y="5033041"/>
         <a:ext cx="5276692" cy="293016"/>
       </dsp:txXfrm>
     </dsp:sp>
@@ -4001,7 +4082,7 @@
           <a:p>
             <a:fld id="{12241623-A064-4BED-B073-BA4D61433402}" type="datetime1">
               <a:rPr lang="en-US" smtClean="0"/>
-              <a:t>11/12/2020</a:t>
+              <a:t>11/14/2020</a:t>
             </a:fld>
             <a:endParaRPr lang="en-US" dirty="0"/>
           </a:p>
@@ -4812,7 +4893,7 @@
           <a:p>
             <a:fld id="{6F86ED0C-1DA7-41F0-94CF-6218B1FEDFF1}" type="datetime1">
               <a:rPr lang="en-US" smtClean="0"/>
-              <a:t>11/12/2020</a:t>
+              <a:t>11/14/2020</a:t>
             </a:fld>
             <a:endParaRPr lang="en-US" dirty="0"/>
           </a:p>
@@ -5011,7 +5092,7 @@
           <a:p>
             <a:fld id="{EECF02AB-6034-4B88-BC5A-7C17CB0EF809}" type="datetime1">
               <a:rPr lang="en-US" smtClean="0"/>
-              <a:t>11/12/2020</a:t>
+              <a:t>11/14/2020</a:t>
             </a:fld>
             <a:endParaRPr lang="en-US" dirty="0"/>
           </a:p>
@@ -5246,7 +5327,7 @@
           <a:p>
             <a:fld id="{22F3E5F3-28EE-488F-BD53-B744C06C3DEC}" type="datetime1">
               <a:rPr lang="en-US" smtClean="0"/>
-              <a:t>11/12/2020</a:t>
+              <a:t>11/14/2020</a:t>
             </a:fld>
             <a:endParaRPr lang="en-US" dirty="0"/>
           </a:p>
@@ -7939,7 +8020,7 @@
           <a:p>
             <a:fld id="{E72EB70D-CD01-44DA-83B3-8FEB3383D307}" type="datetime1">
               <a:rPr lang="en-US" smtClean="0"/>
-              <a:t>11/12/2020</a:t>
+              <a:t>11/14/2020</a:t>
             </a:fld>
             <a:endParaRPr lang="en-US" dirty="0"/>
           </a:p>
@@ -8135,7 +8216,7 @@
           <a:p>
             <a:fld id="{D0158CFD-9357-46BE-A189-D637A67C8730}" type="datetime1">
               <a:rPr lang="en-US" smtClean="0"/>
-              <a:t>11/12/2020</a:t>
+              <a:t>11/14/2020</a:t>
             </a:fld>
             <a:endParaRPr lang="en-US" dirty="0"/>
           </a:p>
@@ -8524,7 +8605,7 @@
           <a:p>
             <a:fld id="{7B4742EE-B331-4632-BD10-A82FED6B6FC0}" type="datetime1">
               <a:rPr lang="en-US" smtClean="0"/>
-              <a:t>11/12/2020</a:t>
+              <a:t>11/14/2020</a:t>
             </a:fld>
             <a:endParaRPr lang="en-US" dirty="0"/>
           </a:p>
@@ -8690,7 +8771,7 @@
           <a:p>
             <a:fld id="{451BA835-D13F-49F4-8F11-5D576AC65FAD}" type="datetime1">
               <a:rPr lang="en-US" smtClean="0"/>
-              <a:t>11/12/2020</a:t>
+              <a:t>11/14/2020</a:t>
             </a:fld>
             <a:endParaRPr lang="en-US" dirty="0"/>
           </a:p>
@@ -8813,7 +8894,7 @@
           <a:p>
             <a:fld id="{ADBD1799-ACB5-4CB2-86A2-5C574F1C8706}" type="datetime1">
               <a:rPr lang="en-US" smtClean="0"/>
-              <a:t>11/12/2020</a:t>
+              <a:t>11/14/2020</a:t>
             </a:fld>
             <a:endParaRPr lang="en-US" dirty="0"/>
           </a:p>
@@ -9123,7 +9204,7 @@
           <a:p>
             <a:fld id="{ED5DD0D6-7A82-473E-879B-C6ECD6CCCFEC}" type="datetime1">
               <a:rPr lang="en-US" smtClean="0"/>
-              <a:t>11/12/2020</a:t>
+              <a:t>11/14/2020</a:t>
             </a:fld>
             <a:endParaRPr lang="en-US" dirty="0"/>
           </a:p>
@@ -9423,7 +9504,7 @@
           <a:p>
             <a:fld id="{D4605E03-BC17-41A7-854C-DFAB672737DC}" type="datetime1">
               <a:rPr lang="en-US" smtClean="0"/>
-              <a:t>11/12/2020</a:t>
+              <a:t>11/14/2020</a:t>
             </a:fld>
             <a:endParaRPr lang="en-US" dirty="0"/>
           </a:p>
@@ -9675,7 +9756,7 @@
           <a:p>
             <a:fld id="{C4408324-A84C-4A45-93B6-78D079CCE772}" type="datetime1">
               <a:rPr lang="en-US" smtClean="0"/>
-              <a:t>11/12/2020</a:t>
+              <a:t>11/14/2020</a:t>
             </a:fld>
             <a:endParaRPr lang="en-US" dirty="0"/>
           </a:p>
@@ -10952,7 +11033,7 @@
           <p:nvPr>
             <p:extLst>
               <p:ext uri="{D42A27DB-BD31-4B8C-83A1-F6EECF244321}">
-                <p14:modId xmlns:p14="http://schemas.microsoft.com/office/powerpoint/2010/main" val="3195117136"/>
+                <p14:modId xmlns:p14="http://schemas.microsoft.com/office/powerpoint/2010/main" val="2183581471"/>
               </p:ext>
             </p:extLst>
           </p:nvPr>

</xml_diff>